<commit_message>
Univariate Analysis and code cleanup
</commit_message>
<xml_diff>
--- a/Lending_Club_Case_Study.pptx
+++ b/Lending_Club_Case_Study.pptx
@@ -4,34 +4,39 @@
   <p:sldMasterIdLst>
     <p:sldMasterId id="2147483746" r:id="rId1"/>
   </p:sldMasterIdLst>
+  <p:notesMasterIdLst>
+    <p:notesMasterId r:id="rId31"/>
+  </p:notesMasterIdLst>
   <p:sldIdLst>
     <p:sldId id="256" r:id="rId2"/>
     <p:sldId id="257" r:id="rId3"/>
     <p:sldId id="258" r:id="rId4"/>
-    <p:sldId id="10809" r:id="rId5"/>
-    <p:sldId id="10810" r:id="rId6"/>
-    <p:sldId id="10819" r:id="rId7"/>
-    <p:sldId id="10820" r:id="rId8"/>
-    <p:sldId id="10813" r:id="rId9"/>
-    <p:sldId id="10821" r:id="rId10"/>
-    <p:sldId id="10814" r:id="rId11"/>
-    <p:sldId id="10822" r:id="rId12"/>
-    <p:sldId id="10816" r:id="rId13"/>
-    <p:sldId id="10823" r:id="rId14"/>
-    <p:sldId id="10817" r:id="rId15"/>
-    <p:sldId id="10824" r:id="rId16"/>
-    <p:sldId id="10818" r:id="rId17"/>
-    <p:sldId id="10811" r:id="rId18"/>
-    <p:sldId id="10825" r:id="rId19"/>
-    <p:sldId id="10826" r:id="rId20"/>
-    <p:sldId id="10827" r:id="rId21"/>
-    <p:sldId id="10828" r:id="rId22"/>
-    <p:sldId id="10829" r:id="rId23"/>
-    <p:sldId id="10830" r:id="rId24"/>
-    <p:sldId id="10831" r:id="rId25"/>
-    <p:sldId id="10832" r:id="rId26"/>
-    <p:sldId id="10812" r:id="rId27"/>
-    <p:sldId id="10815" r:id="rId28"/>
+    <p:sldId id="10833" r:id="rId5"/>
+    <p:sldId id="10809" r:id="rId6"/>
+    <p:sldId id="10834" r:id="rId7"/>
+    <p:sldId id="10810" r:id="rId8"/>
+    <p:sldId id="10819" r:id="rId9"/>
+    <p:sldId id="10820" r:id="rId10"/>
+    <p:sldId id="10813" r:id="rId11"/>
+    <p:sldId id="10821" r:id="rId12"/>
+    <p:sldId id="10814" r:id="rId13"/>
+    <p:sldId id="10822" r:id="rId14"/>
+    <p:sldId id="10816" r:id="rId15"/>
+    <p:sldId id="10823" r:id="rId16"/>
+    <p:sldId id="10817" r:id="rId17"/>
+    <p:sldId id="10824" r:id="rId18"/>
+    <p:sldId id="10818" r:id="rId19"/>
+    <p:sldId id="10811" r:id="rId20"/>
+    <p:sldId id="10825" r:id="rId21"/>
+    <p:sldId id="10826" r:id="rId22"/>
+    <p:sldId id="10827" r:id="rId23"/>
+    <p:sldId id="10828" r:id="rId24"/>
+    <p:sldId id="10829" r:id="rId25"/>
+    <p:sldId id="10830" r:id="rId26"/>
+    <p:sldId id="10831" r:id="rId27"/>
+    <p:sldId id="10832" r:id="rId28"/>
+    <p:sldId id="10812" r:id="rId29"/>
+    <p:sldId id="10815" r:id="rId30"/>
   </p:sldIdLst>
   <p:sldSz cx="12192000" cy="6858000"/>
   <p:notesSz cx="6858000" cy="9144000"/>
@@ -130,6 +135,11 @@
       </a:defRPr>
     </a:lvl9pPr>
   </p:defaultTextStyle>
+  <p:extLst>
+    <p:ext uri="{EFAFB233-063F-42B5-8137-9DF3F51BA10A}">
+      <p15:sldGuideLst xmlns:p15="http://schemas.microsoft.com/office/powerpoint/2012/main"/>
+    </p:ext>
+  </p:extLst>
 </p:presentation>
 </file>
 
@@ -139,6 +149,440 @@
     <p1510:client id="{5AB1A314-EB36-C041-A880-320F3D1DB76A}" v="91" dt="2022-01-04T17:30:39.510"/>
   </p1510:revLst>
 </p1510:revInfo>
+</file>
+
+<file path=ppt/notesMasters/notesMaster1.xml><?xml version="1.0" encoding="utf-8"?>
+<p:notesMaster xmlns:a="http://schemas.openxmlformats.org/drawingml/2006/main" xmlns:r="http://schemas.openxmlformats.org/officeDocument/2006/relationships" xmlns:p="http://schemas.openxmlformats.org/presentationml/2006/main">
+  <p:cSld>
+    <p:bg>
+      <p:bgRef idx="1001">
+        <a:schemeClr val="bg1"/>
+      </p:bgRef>
+    </p:bg>
+    <p:spTree>
+      <p:nvGrpSpPr>
+        <p:cNvPr id="1" name=""/>
+        <p:cNvGrpSpPr/>
+        <p:nvPr/>
+      </p:nvGrpSpPr>
+      <p:grpSpPr>
+        <a:xfrm>
+          <a:off x="0" y="0"/>
+          <a:ext cx="0" cy="0"/>
+          <a:chOff x="0" y="0"/>
+          <a:chExt cx="0" cy="0"/>
+        </a:xfrm>
+      </p:grpSpPr>
+      <p:sp>
+        <p:nvSpPr>
+          <p:cNvPr id="2" name="Header Placeholder 1"/>
+          <p:cNvSpPr>
+            <a:spLocks noGrp="1"/>
+          </p:cNvSpPr>
+          <p:nvPr>
+            <p:ph type="hdr" sz="quarter"/>
+          </p:nvPr>
+        </p:nvSpPr>
+        <p:spPr>
+          <a:xfrm>
+            <a:off x="0" y="0"/>
+            <a:ext cx="2971800" cy="458788"/>
+          </a:xfrm>
+          <a:prstGeom prst="rect">
+            <a:avLst/>
+          </a:prstGeom>
+        </p:spPr>
+        <p:txBody>
+          <a:bodyPr vert="horz" lIns="91440" tIns="45720" rIns="91440" bIns="45720" rtlCol="0"/>
+          <a:lstStyle>
+            <a:lvl1pPr algn="l">
+              <a:defRPr sz="1200"/>
+            </a:lvl1pPr>
+          </a:lstStyle>
+          <a:p>
+            <a:endParaRPr lang="en-US"/>
+          </a:p>
+        </p:txBody>
+      </p:sp>
+      <p:sp>
+        <p:nvSpPr>
+          <p:cNvPr id="3" name="Date Placeholder 2"/>
+          <p:cNvSpPr>
+            <a:spLocks noGrp="1"/>
+          </p:cNvSpPr>
+          <p:nvPr>
+            <p:ph type="dt" idx="1"/>
+          </p:nvPr>
+        </p:nvSpPr>
+        <p:spPr>
+          <a:xfrm>
+            <a:off x="3884613" y="0"/>
+            <a:ext cx="2971800" cy="458788"/>
+          </a:xfrm>
+          <a:prstGeom prst="rect">
+            <a:avLst/>
+          </a:prstGeom>
+        </p:spPr>
+        <p:txBody>
+          <a:bodyPr vert="horz" lIns="91440" tIns="45720" rIns="91440" bIns="45720" rtlCol="0"/>
+          <a:lstStyle>
+            <a:lvl1pPr algn="r">
+              <a:defRPr sz="1200"/>
+            </a:lvl1pPr>
+          </a:lstStyle>
+          <a:p>
+            <a:fld id="{8F86E92B-970C-454B-9A9A-2230BA497866}" type="datetimeFigureOut">
+              <a:rPr lang="en-US" smtClean="0"/>
+              <a:t>1/5/22</a:t>
+            </a:fld>
+            <a:endParaRPr lang="en-US"/>
+          </a:p>
+        </p:txBody>
+      </p:sp>
+      <p:sp>
+        <p:nvSpPr>
+          <p:cNvPr id="4" name="Slide Image Placeholder 3"/>
+          <p:cNvSpPr>
+            <a:spLocks noGrp="1" noRot="1" noChangeAspect="1"/>
+          </p:cNvSpPr>
+          <p:nvPr>
+            <p:ph type="sldImg" idx="2"/>
+          </p:nvPr>
+        </p:nvSpPr>
+        <p:spPr>
+          <a:xfrm>
+            <a:off x="685800" y="1143000"/>
+            <a:ext cx="5486400" cy="3086100"/>
+          </a:xfrm>
+          <a:prstGeom prst="rect">
+            <a:avLst/>
+          </a:prstGeom>
+          <a:noFill/>
+          <a:ln w="12700">
+            <a:solidFill>
+              <a:prstClr val="black"/>
+            </a:solidFill>
+          </a:ln>
+        </p:spPr>
+        <p:txBody>
+          <a:bodyPr vert="horz" lIns="91440" tIns="45720" rIns="91440" bIns="45720" rtlCol="0" anchor="ctr"/>
+          <a:lstStyle/>
+          <a:p>
+            <a:endParaRPr lang="en-US"/>
+          </a:p>
+        </p:txBody>
+      </p:sp>
+      <p:sp>
+        <p:nvSpPr>
+          <p:cNvPr id="5" name="Notes Placeholder 4"/>
+          <p:cNvSpPr>
+            <a:spLocks noGrp="1"/>
+          </p:cNvSpPr>
+          <p:nvPr>
+            <p:ph type="body" sz="quarter" idx="3"/>
+          </p:nvPr>
+        </p:nvSpPr>
+        <p:spPr>
+          <a:xfrm>
+            <a:off x="685800" y="4400550"/>
+            <a:ext cx="5486400" cy="3600450"/>
+          </a:xfrm>
+          <a:prstGeom prst="rect">
+            <a:avLst/>
+          </a:prstGeom>
+        </p:spPr>
+        <p:txBody>
+          <a:bodyPr vert="horz" lIns="91440" tIns="45720" rIns="91440" bIns="45720" rtlCol="0"/>
+          <a:lstStyle/>
+          <a:p>
+            <a:pPr lvl="0"/>
+            <a:r>
+              <a:rPr lang="en-GB"/>
+              <a:t>Click to edit Master text styles</a:t>
+            </a:r>
+          </a:p>
+          <a:p>
+            <a:pPr lvl="1"/>
+            <a:r>
+              <a:rPr lang="en-GB"/>
+              <a:t>Second level</a:t>
+            </a:r>
+          </a:p>
+          <a:p>
+            <a:pPr lvl="2"/>
+            <a:r>
+              <a:rPr lang="en-GB"/>
+              <a:t>Third level</a:t>
+            </a:r>
+          </a:p>
+          <a:p>
+            <a:pPr lvl="3"/>
+            <a:r>
+              <a:rPr lang="en-GB"/>
+              <a:t>Fourth level</a:t>
+            </a:r>
+          </a:p>
+          <a:p>
+            <a:pPr lvl="4"/>
+            <a:r>
+              <a:rPr lang="en-GB"/>
+              <a:t>Fifth level</a:t>
+            </a:r>
+            <a:endParaRPr lang="en-US"/>
+          </a:p>
+        </p:txBody>
+      </p:sp>
+      <p:sp>
+        <p:nvSpPr>
+          <p:cNvPr id="6" name="Footer Placeholder 5"/>
+          <p:cNvSpPr>
+            <a:spLocks noGrp="1"/>
+          </p:cNvSpPr>
+          <p:nvPr>
+            <p:ph type="ftr" sz="quarter" idx="4"/>
+          </p:nvPr>
+        </p:nvSpPr>
+        <p:spPr>
+          <a:xfrm>
+            <a:off x="0" y="8685213"/>
+            <a:ext cx="2971800" cy="458787"/>
+          </a:xfrm>
+          <a:prstGeom prst="rect">
+            <a:avLst/>
+          </a:prstGeom>
+        </p:spPr>
+        <p:txBody>
+          <a:bodyPr vert="horz" lIns="91440" tIns="45720" rIns="91440" bIns="45720" rtlCol="0" anchor="b"/>
+          <a:lstStyle>
+            <a:lvl1pPr algn="l">
+              <a:defRPr sz="1200"/>
+            </a:lvl1pPr>
+          </a:lstStyle>
+          <a:p>
+            <a:endParaRPr lang="en-US"/>
+          </a:p>
+        </p:txBody>
+      </p:sp>
+      <p:sp>
+        <p:nvSpPr>
+          <p:cNvPr id="7" name="Slide Number Placeholder 6"/>
+          <p:cNvSpPr>
+            <a:spLocks noGrp="1"/>
+          </p:cNvSpPr>
+          <p:nvPr>
+            <p:ph type="sldNum" sz="quarter" idx="5"/>
+          </p:nvPr>
+        </p:nvSpPr>
+        <p:spPr>
+          <a:xfrm>
+            <a:off x="3884613" y="8685213"/>
+            <a:ext cx="2971800" cy="458787"/>
+          </a:xfrm>
+          <a:prstGeom prst="rect">
+            <a:avLst/>
+          </a:prstGeom>
+        </p:spPr>
+        <p:txBody>
+          <a:bodyPr vert="horz" lIns="91440" tIns="45720" rIns="91440" bIns="45720" rtlCol="0" anchor="b"/>
+          <a:lstStyle>
+            <a:lvl1pPr algn="r">
+              <a:defRPr sz="1200"/>
+            </a:lvl1pPr>
+          </a:lstStyle>
+          <a:p>
+            <a:fld id="{0C34F5E2-A1FB-B144-B95E-F7D433D00BFE}" type="slidenum">
+              <a:rPr lang="en-US" smtClean="0"/>
+              <a:t>‹#›</a:t>
+            </a:fld>
+            <a:endParaRPr lang="en-US"/>
+          </a:p>
+        </p:txBody>
+      </p:sp>
+    </p:spTree>
+    <p:extLst>
+      <p:ext uri="{BB962C8B-B14F-4D97-AF65-F5344CB8AC3E}">
+        <p14:creationId xmlns:p14="http://schemas.microsoft.com/office/powerpoint/2010/main" val="3012167007"/>
+      </p:ext>
+    </p:extLst>
+  </p:cSld>
+  <p:clrMap bg1="lt1" tx1="dk1" bg2="lt2" tx2="dk2" accent1="accent1" accent2="accent2" accent3="accent3" accent4="accent4" accent5="accent5" accent6="accent6" hlink="hlink" folHlink="folHlink"/>
+  <p:notesStyle>
+    <a:lvl1pPr marL="0" algn="l" defTabSz="914400" rtl="0" eaLnBrk="1" latinLnBrk="0" hangingPunct="1">
+      <a:defRPr sz="1200" kern="1200">
+        <a:solidFill>
+          <a:schemeClr val="tx1"/>
+        </a:solidFill>
+        <a:latin typeface="+mn-lt"/>
+        <a:ea typeface="+mn-ea"/>
+        <a:cs typeface="+mn-cs"/>
+      </a:defRPr>
+    </a:lvl1pPr>
+    <a:lvl2pPr marL="457200" algn="l" defTabSz="914400" rtl="0" eaLnBrk="1" latinLnBrk="0" hangingPunct="1">
+      <a:defRPr sz="1200" kern="1200">
+        <a:solidFill>
+          <a:schemeClr val="tx1"/>
+        </a:solidFill>
+        <a:latin typeface="+mn-lt"/>
+        <a:ea typeface="+mn-ea"/>
+        <a:cs typeface="+mn-cs"/>
+      </a:defRPr>
+    </a:lvl2pPr>
+    <a:lvl3pPr marL="914400" algn="l" defTabSz="914400" rtl="0" eaLnBrk="1" latinLnBrk="0" hangingPunct="1">
+      <a:defRPr sz="1200" kern="1200">
+        <a:solidFill>
+          <a:schemeClr val="tx1"/>
+        </a:solidFill>
+        <a:latin typeface="+mn-lt"/>
+        <a:ea typeface="+mn-ea"/>
+        <a:cs typeface="+mn-cs"/>
+      </a:defRPr>
+    </a:lvl3pPr>
+    <a:lvl4pPr marL="1371600" algn="l" defTabSz="914400" rtl="0" eaLnBrk="1" latinLnBrk="0" hangingPunct="1">
+      <a:defRPr sz="1200" kern="1200">
+        <a:solidFill>
+          <a:schemeClr val="tx1"/>
+        </a:solidFill>
+        <a:latin typeface="+mn-lt"/>
+        <a:ea typeface="+mn-ea"/>
+        <a:cs typeface="+mn-cs"/>
+      </a:defRPr>
+    </a:lvl4pPr>
+    <a:lvl5pPr marL="1828800" algn="l" defTabSz="914400" rtl="0" eaLnBrk="1" latinLnBrk="0" hangingPunct="1">
+      <a:defRPr sz="1200" kern="1200">
+        <a:solidFill>
+          <a:schemeClr val="tx1"/>
+        </a:solidFill>
+        <a:latin typeface="+mn-lt"/>
+        <a:ea typeface="+mn-ea"/>
+        <a:cs typeface="+mn-cs"/>
+      </a:defRPr>
+    </a:lvl5pPr>
+    <a:lvl6pPr marL="2286000" algn="l" defTabSz="914400" rtl="0" eaLnBrk="1" latinLnBrk="0" hangingPunct="1">
+      <a:defRPr sz="1200" kern="1200">
+        <a:solidFill>
+          <a:schemeClr val="tx1"/>
+        </a:solidFill>
+        <a:latin typeface="+mn-lt"/>
+        <a:ea typeface="+mn-ea"/>
+        <a:cs typeface="+mn-cs"/>
+      </a:defRPr>
+    </a:lvl6pPr>
+    <a:lvl7pPr marL="2743200" algn="l" defTabSz="914400" rtl="0" eaLnBrk="1" latinLnBrk="0" hangingPunct="1">
+      <a:defRPr sz="1200" kern="1200">
+        <a:solidFill>
+          <a:schemeClr val="tx1"/>
+        </a:solidFill>
+        <a:latin typeface="+mn-lt"/>
+        <a:ea typeface="+mn-ea"/>
+        <a:cs typeface="+mn-cs"/>
+      </a:defRPr>
+    </a:lvl7pPr>
+    <a:lvl8pPr marL="3200400" algn="l" defTabSz="914400" rtl="0" eaLnBrk="1" latinLnBrk="0" hangingPunct="1">
+      <a:defRPr sz="1200" kern="1200">
+        <a:solidFill>
+          <a:schemeClr val="tx1"/>
+        </a:solidFill>
+        <a:latin typeface="+mn-lt"/>
+        <a:ea typeface="+mn-ea"/>
+        <a:cs typeface="+mn-cs"/>
+      </a:defRPr>
+    </a:lvl8pPr>
+    <a:lvl9pPr marL="3657600" algn="l" defTabSz="914400" rtl="0" eaLnBrk="1" latinLnBrk="0" hangingPunct="1">
+      <a:defRPr sz="1200" kern="1200">
+        <a:solidFill>
+          <a:schemeClr val="tx1"/>
+        </a:solidFill>
+        <a:latin typeface="+mn-lt"/>
+        <a:ea typeface="+mn-ea"/>
+        <a:cs typeface="+mn-cs"/>
+      </a:defRPr>
+    </a:lvl9pPr>
+  </p:notesStyle>
+</p:notesMaster>
+</file>
+
+<file path=ppt/notesSlides/notesSlide1.xml><?xml version="1.0" encoding="utf-8"?>
+<p:notes xmlns:a="http://schemas.openxmlformats.org/drawingml/2006/main" xmlns:r="http://schemas.openxmlformats.org/officeDocument/2006/relationships" xmlns:p="http://schemas.openxmlformats.org/presentationml/2006/main">
+  <p:cSld>
+    <p:spTree>
+      <p:nvGrpSpPr>
+        <p:cNvPr id="1" name=""/>
+        <p:cNvGrpSpPr/>
+        <p:nvPr/>
+      </p:nvGrpSpPr>
+      <p:grpSpPr>
+        <a:xfrm>
+          <a:off x="0" y="0"/>
+          <a:ext cx="0" cy="0"/>
+          <a:chOff x="0" y="0"/>
+          <a:chExt cx="0" cy="0"/>
+        </a:xfrm>
+      </p:grpSpPr>
+      <p:sp>
+        <p:nvSpPr>
+          <p:cNvPr id="2" name="Slide Image Placeholder 1"/>
+          <p:cNvSpPr>
+            <a:spLocks noGrp="1" noRot="1" noChangeAspect="1"/>
+          </p:cNvSpPr>
+          <p:nvPr>
+            <p:ph type="sldImg"/>
+          </p:nvPr>
+        </p:nvSpPr>
+        <p:spPr/>
+      </p:sp>
+      <p:sp>
+        <p:nvSpPr>
+          <p:cNvPr id="3" name="Notes Placeholder 2"/>
+          <p:cNvSpPr>
+            <a:spLocks noGrp="1"/>
+          </p:cNvSpPr>
+          <p:nvPr>
+            <p:ph type="body" idx="1"/>
+          </p:nvPr>
+        </p:nvSpPr>
+        <p:spPr/>
+        <p:txBody>
+          <a:bodyPr/>
+          <a:lstStyle/>
+          <a:p>
+            <a:endParaRPr lang="en-US" dirty="0"/>
+          </a:p>
+        </p:txBody>
+      </p:sp>
+      <p:sp>
+        <p:nvSpPr>
+          <p:cNvPr id="4" name="Slide Number Placeholder 3"/>
+          <p:cNvSpPr>
+            <a:spLocks noGrp="1"/>
+          </p:cNvSpPr>
+          <p:nvPr>
+            <p:ph type="sldNum" sz="quarter" idx="5"/>
+          </p:nvPr>
+        </p:nvSpPr>
+        <p:spPr/>
+        <p:txBody>
+          <a:bodyPr/>
+          <a:lstStyle/>
+          <a:p>
+            <a:fld id="{0C34F5E2-A1FB-B144-B95E-F7D433D00BFE}" type="slidenum">
+              <a:rPr lang="en-US" smtClean="0"/>
+              <a:t>6</a:t>
+            </a:fld>
+            <a:endParaRPr lang="en-US"/>
+          </a:p>
+        </p:txBody>
+      </p:sp>
+    </p:spTree>
+    <p:extLst>
+      <p:ext uri="{BB962C8B-B14F-4D97-AF65-F5344CB8AC3E}">
+        <p14:creationId xmlns:p14="http://schemas.microsoft.com/office/powerpoint/2010/main" val="2214682333"/>
+      </p:ext>
+    </p:extLst>
+  </p:cSld>
+  <p:clrMapOvr>
+    <a:masterClrMapping/>
+  </p:clrMapOvr>
+</p:notes>
 </file>
 
 <file path=ppt/slideLayouts/slideLayout1.xml><?xml version="1.0" encoding="utf-8"?>
@@ -290,7 +734,7 @@
           <a:p>
             <a:fld id="{6ADE4AC4-4F0C-3B4D-B422-A359168C6F97}" type="datetimeFigureOut">
               <a:rPr lang="en-US" smtClean="0"/>
-              <a:t>1/4/22</a:t>
+              <a:t>1/5/22</a:t>
             </a:fld>
             <a:endParaRPr lang="en-US"/>
           </a:p>
@@ -490,7 +934,7 @@
           <a:p>
             <a:fld id="{6ADE4AC4-4F0C-3B4D-B422-A359168C6F97}" type="datetimeFigureOut">
               <a:rPr lang="en-US" smtClean="0"/>
-              <a:t>1/4/22</a:t>
+              <a:t>1/5/22</a:t>
             </a:fld>
             <a:endParaRPr lang="en-US"/>
           </a:p>
@@ -700,7 +1144,7 @@
           <a:p>
             <a:fld id="{6ADE4AC4-4F0C-3B4D-B422-A359168C6F97}" type="datetimeFigureOut">
               <a:rPr lang="en-US" smtClean="0"/>
-              <a:t>1/4/22</a:t>
+              <a:t>1/5/22</a:t>
             </a:fld>
             <a:endParaRPr lang="en-US"/>
           </a:p>
@@ -1054,7 +1498,7 @@
           <a:p>
             <a:fld id="{6ADE4AC4-4F0C-3B4D-B422-A359168C6F97}" type="datetimeFigureOut">
               <a:rPr lang="en-US" smtClean="0"/>
-              <a:t>1/4/22</a:t>
+              <a:t>1/5/22</a:t>
             </a:fld>
             <a:endParaRPr lang="en-US"/>
           </a:p>
@@ -1330,7 +1774,7 @@
           <a:p>
             <a:fld id="{6ADE4AC4-4F0C-3B4D-B422-A359168C6F97}" type="datetimeFigureOut">
               <a:rPr lang="en-US" smtClean="0"/>
-              <a:t>1/4/22</a:t>
+              <a:t>1/5/22</a:t>
             </a:fld>
             <a:endParaRPr lang="en-US"/>
           </a:p>
@@ -1598,7 +2042,7 @@
           <a:p>
             <a:fld id="{6ADE4AC4-4F0C-3B4D-B422-A359168C6F97}" type="datetimeFigureOut">
               <a:rPr lang="en-US" smtClean="0"/>
-              <a:t>1/4/22</a:t>
+              <a:t>1/5/22</a:t>
             </a:fld>
             <a:endParaRPr lang="en-US"/>
           </a:p>
@@ -2013,7 +2457,7 @@
           <a:p>
             <a:fld id="{6ADE4AC4-4F0C-3B4D-B422-A359168C6F97}" type="datetimeFigureOut">
               <a:rPr lang="en-US" smtClean="0"/>
-              <a:t>1/4/22</a:t>
+              <a:t>1/5/22</a:t>
             </a:fld>
             <a:endParaRPr lang="en-US"/>
           </a:p>
@@ -2155,7 +2599,7 @@
           <a:p>
             <a:fld id="{6ADE4AC4-4F0C-3B4D-B422-A359168C6F97}" type="datetimeFigureOut">
               <a:rPr lang="en-US" smtClean="0"/>
-              <a:t>1/4/22</a:t>
+              <a:t>1/5/22</a:t>
             </a:fld>
             <a:endParaRPr lang="en-US"/>
           </a:p>
@@ -2268,7 +2712,7 @@
           <a:p>
             <a:fld id="{6ADE4AC4-4F0C-3B4D-B422-A359168C6F97}" type="datetimeFigureOut">
               <a:rPr lang="en-US" smtClean="0"/>
-              <a:t>1/4/22</a:t>
+              <a:t>1/5/22</a:t>
             </a:fld>
             <a:endParaRPr lang="en-US"/>
           </a:p>
@@ -2581,7 +3025,7 @@
           <a:p>
             <a:fld id="{6ADE4AC4-4F0C-3B4D-B422-A359168C6F97}" type="datetimeFigureOut">
               <a:rPr lang="en-US" smtClean="0"/>
-              <a:t>1/4/22</a:t>
+              <a:t>1/5/22</a:t>
             </a:fld>
             <a:endParaRPr lang="en-US"/>
           </a:p>
@@ -2870,7 +3314,7 @@
           <a:p>
             <a:fld id="{6ADE4AC4-4F0C-3B4D-B422-A359168C6F97}" type="datetimeFigureOut">
               <a:rPr lang="en-US" smtClean="0"/>
-              <a:t>1/4/22</a:t>
+              <a:t>1/5/22</a:t>
             </a:fld>
             <a:endParaRPr lang="en-US"/>
           </a:p>
@@ -3113,7 +3557,7 @@
           <a:p>
             <a:fld id="{6ADE4AC4-4F0C-3B4D-B422-A359168C6F97}" type="datetimeFigureOut">
               <a:rPr lang="en-US" smtClean="0"/>
-              <a:t>1/4/22</a:t>
+              <a:t>1/5/22</a:t>
             </a:fld>
             <a:endParaRPr lang="en-US"/>
           </a:p>
@@ -3697,7 +4141,7 @@
           <a:graphicData uri="http://schemas.openxmlformats.org/presentationml/2006/ole">
             <mc:AlternateContent xmlns:mc="http://schemas.openxmlformats.org/markup-compatibility/2006">
               <mc:Choice xmlns:v="urn:schemas-microsoft-com:vml" Requires="v">
-                <p:oleObj spid="_x0000_s7169" name="think-cell Slide" r:id="rId5" imgW="393" imgH="392" progId="TCLayout.ActiveDocument.1">
+                <p:oleObj spid="_x0000_s5123" name="think-cell Slide" r:id="rId5" imgW="393" imgH="392" progId="TCLayout.ActiveDocument.1">
                   <p:embed/>
                 </p:oleObj>
               </mc:Choice>
@@ -3855,7 +4299,7 @@
                 <a:latin typeface="Calibri" panose="020F0502020204030204" pitchFamily="34" charset="0"/>
                 <a:cs typeface="Calibri" panose="020F0502020204030204" pitchFamily="34" charset="0"/>
               </a:rPr>
-              <a:t>Segmented Univariate Analysis – Home Ownership</a:t>
+              <a:t>Segmented Univariate Analysis – Interest Rate</a:t>
             </a:r>
             <a:br>
               <a:rPr lang="en-US" sz="2399" dirty="0">
@@ -3924,7 +4368,7 @@
                 <a:ea typeface="Arial Unicode MS" pitchFamily="34" charset="-128"/>
                 <a:cs typeface="Calibri" panose="020F0502020204030204" pitchFamily="34" charset="0"/>
               </a:rPr>
-              <a:t>Applicants with home ownership as “OTHER” tend to default more likely than rest of the categories</a:t>
+              <a:t>Applicants who got loan for higher interest rate tend to default more than those who got it for lower interest rates</a:t>
             </a:r>
           </a:p>
           <a:p>
@@ -3944,8 +4388,17 @@
                 <a:ea typeface="Arial Unicode MS" pitchFamily="34" charset="-128"/>
                 <a:cs typeface="Calibri" panose="020F0502020204030204" pitchFamily="34" charset="0"/>
               </a:rPr>
-              <a:t>Interesting to note that there are no defaulters in category “NONE”</a:t>
-            </a:r>
+              <a:t>Same behavior is observed for grades and sub grades where alphanumerically higher order grades and subgrades has more default rate. Business wises, grades and sub grades are correlated to interest rate. Hence, this observation is justified</a:t>
+            </a:r>
+          </a:p>
+          <a:p>
+            <a:pPr marL="342797" indent="-342797">
+              <a:spcBef>
+                <a:spcPts val="300"/>
+              </a:spcBef>
+              <a:buFont typeface="Wingdings" panose="05000000000000000000" pitchFamily="2" charset="2"/>
+              <a:buChar char="§"/>
+            </a:pPr>
             <a:endParaRPr lang="en-US" sz="1200" dirty="0">
               <a:latin typeface="Calibri" panose="020F0502020204030204" pitchFamily="34" charset="0"/>
               <a:cs typeface="Calibri" panose="020F0502020204030204" pitchFamily="34" charset="0"/>
@@ -4014,7 +4467,7 @@
           <p:cNvPr id="6" name="Picture 5">
             <a:extLst>
               <a:ext uri="{FF2B5EF4-FFF2-40B4-BE49-F238E27FC236}">
-                <a16:creationId xmlns:a16="http://schemas.microsoft.com/office/drawing/2014/main" id="{F3BC0CFC-F4DE-3545-BBD8-76D61D0F5978}"/>
+                <a16:creationId xmlns:a16="http://schemas.microsoft.com/office/drawing/2014/main" id="{B554DB53-CD0B-7A4F-8BB7-5AC9E39F47DF}"/>
               </a:ext>
             </a:extLst>
           </p:cNvPr>
@@ -4031,8 +4484,38 @@
         </p:blipFill>
         <p:spPr>
           <a:xfrm>
-            <a:off x="2753152" y="2702207"/>
-            <a:ext cx="6511413" cy="4043034"/>
+            <a:off x="319520" y="3123586"/>
+            <a:ext cx="5689339" cy="3080569"/>
+          </a:xfrm>
+          <a:prstGeom prst="rect">
+            <a:avLst/>
+          </a:prstGeom>
+        </p:spPr>
+      </p:pic>
+      <p:pic>
+        <p:nvPicPr>
+          <p:cNvPr id="11" name="Picture 10">
+            <a:extLst>
+              <a:ext uri="{FF2B5EF4-FFF2-40B4-BE49-F238E27FC236}">
+                <a16:creationId xmlns:a16="http://schemas.microsoft.com/office/drawing/2014/main" id="{3AA7FA59-4736-0C45-A0E0-81F1686DFF03}"/>
+              </a:ext>
+            </a:extLst>
+          </p:cNvPr>
+          <p:cNvPicPr>
+            <a:picLocks noChangeAspect="1"/>
+          </p:cNvPicPr>
+          <p:nvPr/>
+        </p:nvPicPr>
+        <p:blipFill>
+          <a:blip r:embed="rId8"/>
+          <a:stretch>
+            <a:fillRect/>
+          </a:stretch>
+        </p:blipFill>
+        <p:spPr>
+          <a:xfrm>
+            <a:off x="6291573" y="3123586"/>
+            <a:ext cx="5221928" cy="3080569"/>
           </a:xfrm>
           <a:prstGeom prst="rect">
             <a:avLst/>
@@ -4042,7 +4525,7 @@
     </p:spTree>
     <p:extLst>
       <p:ext uri="{BB962C8B-B14F-4D97-AF65-F5344CB8AC3E}">
-        <p14:creationId xmlns:p14="http://schemas.microsoft.com/office/powerpoint/2010/main" val="1362094320"/>
+        <p14:creationId xmlns:p14="http://schemas.microsoft.com/office/powerpoint/2010/main" val="3431243602"/>
       </p:ext>
     </p:extLst>
   </p:cSld>
@@ -4095,7 +4578,7 @@
           <a:graphicData uri="http://schemas.openxmlformats.org/presentationml/2006/ole">
             <mc:AlternateContent xmlns:mc="http://schemas.openxmlformats.org/markup-compatibility/2006">
               <mc:Choice xmlns:v="urn:schemas-microsoft-com:vml" Requires="v">
-                <p:oleObj spid="_x0000_s8193" name="think-cell Slide" r:id="rId5" imgW="393" imgH="392" progId="TCLayout.ActiveDocument.1">
+                <p:oleObj spid="_x0000_s6147" name="think-cell Slide" r:id="rId5" imgW="393" imgH="392" progId="TCLayout.ActiveDocument.1">
                   <p:embed/>
                 </p:oleObj>
               </mc:Choice>
@@ -4253,7 +4736,7 @@
                 <a:latin typeface="Calibri" panose="020F0502020204030204" pitchFamily="34" charset="0"/>
                 <a:cs typeface="Calibri" panose="020F0502020204030204" pitchFamily="34" charset="0"/>
               </a:rPr>
-              <a:t>Segmented Univariate Analysis – Annual Income</a:t>
+              <a:t>Segmented Univariate Analysis – Employment Length</a:t>
             </a:r>
             <a:br>
               <a:rPr lang="en-US" sz="2399" dirty="0">
@@ -4282,8 +4765,8 @@
         </p:nvSpPr>
         <p:spPr bwMode="gray">
           <a:xfrm>
-            <a:off x="504218" y="1560863"/>
-            <a:ext cx="11009283" cy="738472"/>
+            <a:off x="504218" y="1560862"/>
+            <a:ext cx="11009283" cy="1021297"/>
           </a:xfrm>
           <a:prstGeom prst="roundRect">
             <a:avLst>
@@ -4322,14 +4805,36 @@
                 <a:ea typeface="Arial Unicode MS" pitchFamily="34" charset="-128"/>
                 <a:cs typeface="Calibri" panose="020F0502020204030204" pitchFamily="34" charset="0"/>
               </a:rPr>
-              <a:t>Applicants with lesser Annual income tend to default more than those with higher levels of annual income</a:t>
-            </a:r>
-          </a:p>
-          <a:p>
-            <a:pPr>
+              <a:t>Applicants with Employment Length of 10+ years tend to default more than other durations</a:t>
+            </a:r>
+          </a:p>
+          <a:p>
+            <a:pPr marL="342797" indent="-342797">
               <a:spcBef>
                 <a:spcPts val="300"/>
               </a:spcBef>
+              <a:buFont typeface="Wingdings" panose="05000000000000000000" pitchFamily="2" charset="2"/>
+              <a:buChar char="§"/>
+            </a:pPr>
+            <a:r>
+              <a:rPr lang="en-US" sz="1600" kern="0" dirty="0">
+                <a:solidFill>
+                  <a:srgbClr val="000000"/>
+                </a:solidFill>
+                <a:latin typeface="Calibri" panose="020F0502020204030204" pitchFamily="34" charset="0"/>
+                <a:ea typeface="Arial Unicode MS" pitchFamily="34" charset="-128"/>
+                <a:cs typeface="Calibri" panose="020F0502020204030204" pitchFamily="34" charset="0"/>
+              </a:rPr>
+              <a:t>Applicants whose Employment Length is missing has higher factor of default rate(22%) than all others. This is substantial considering the univariate analysis of employment length where 10+years dominate the distribution </a:t>
+            </a:r>
+          </a:p>
+          <a:p>
+            <a:pPr marL="342797" indent="-342797">
+              <a:spcBef>
+                <a:spcPts val="300"/>
+              </a:spcBef>
+              <a:buFont typeface="Wingdings" panose="05000000000000000000" pitchFamily="2" charset="2"/>
+              <a:buChar char="§"/>
             </a:pPr>
             <a:endParaRPr lang="en-US" sz="1600" kern="0" dirty="0">
               <a:solidFill>
@@ -4413,10 +4918,10 @@
       </p:sp>
       <p:pic>
         <p:nvPicPr>
-          <p:cNvPr id="6" name="Picture 5">
-            <a:extLst>
-              <a:ext uri="{FF2B5EF4-FFF2-40B4-BE49-F238E27FC236}">
-                <a16:creationId xmlns:a16="http://schemas.microsoft.com/office/drawing/2014/main" id="{7A76EBE8-9A25-1249-A296-2C866532FEC7}"/>
+          <p:cNvPr id="11" name="Picture 10">
+            <a:extLst>
+              <a:ext uri="{FF2B5EF4-FFF2-40B4-BE49-F238E27FC236}">
+                <a16:creationId xmlns:a16="http://schemas.microsoft.com/office/drawing/2014/main" id="{D88CC096-8C72-534C-A9A9-02AD017C0CD5}"/>
               </a:ext>
             </a:extLst>
           </p:cNvPr>
@@ -4433,8 +4938,8 @@
         </p:blipFill>
         <p:spPr>
           <a:xfrm>
-            <a:off x="2088802" y="2628900"/>
-            <a:ext cx="8013700" cy="4229100"/>
+            <a:off x="2723323" y="2641549"/>
+            <a:ext cx="6745353" cy="4232378"/>
           </a:xfrm>
           <a:prstGeom prst="rect">
             <a:avLst/>
@@ -4444,7 +4949,7 @@
     </p:spTree>
     <p:extLst>
       <p:ext uri="{BB962C8B-B14F-4D97-AF65-F5344CB8AC3E}">
-        <p14:creationId xmlns:p14="http://schemas.microsoft.com/office/powerpoint/2010/main" val="201984335"/>
+        <p14:creationId xmlns:p14="http://schemas.microsoft.com/office/powerpoint/2010/main" val="93519835"/>
       </p:ext>
     </p:extLst>
   </p:cSld>
@@ -4497,7 +5002,7 @@
           <a:graphicData uri="http://schemas.openxmlformats.org/presentationml/2006/ole">
             <mc:AlternateContent xmlns:mc="http://schemas.openxmlformats.org/markup-compatibility/2006">
               <mc:Choice xmlns:v="urn:schemas-microsoft-com:vml" Requires="v">
-                <p:oleObj spid="_x0000_s9217" name="think-cell Slide" r:id="rId5" imgW="393" imgH="392" progId="TCLayout.ActiveDocument.1">
+                <p:oleObj spid="_x0000_s7171" name="think-cell Slide" r:id="rId5" imgW="393" imgH="392" progId="TCLayout.ActiveDocument.1">
                   <p:embed/>
                 </p:oleObj>
               </mc:Choice>
@@ -4655,7 +5160,7 @@
                 <a:latin typeface="Calibri" panose="020F0502020204030204" pitchFamily="34" charset="0"/>
                 <a:cs typeface="Calibri" panose="020F0502020204030204" pitchFamily="34" charset="0"/>
               </a:rPr>
-              <a:t>Segmented Univariate Analysis – Income Verification Status</a:t>
+              <a:t>Segmented Univariate Analysis – Home Ownership</a:t>
             </a:r>
             <a:br>
               <a:rPr lang="en-US" sz="2399" dirty="0">
@@ -4724,7 +5229,7 @@
                 <a:ea typeface="Arial Unicode MS" pitchFamily="34" charset="-128"/>
                 <a:cs typeface="Calibri" panose="020F0502020204030204" pitchFamily="34" charset="0"/>
               </a:rPr>
-              <a:t>Surprisingly, Loan Applications whose Income is verified defaults more than others by at least 2%. May be verification process needs to be revisited</a:t>
+              <a:t>Applicants with home ownership as “OTHER” tend to default more likely than rest of the categories. This is despite the fact that 92% of the applicants has either RENT or MORTAGE as the home ownership.</a:t>
             </a:r>
           </a:p>
           <a:p>
@@ -4735,23 +5240,17 @@
               <a:buFont typeface="Wingdings" panose="05000000000000000000" pitchFamily="2" charset="2"/>
               <a:buChar char="§"/>
             </a:pPr>
-            <a:endParaRPr lang="en-US" sz="1600" kern="0" dirty="0">
-              <a:solidFill>
-                <a:srgbClr val="000000"/>
-              </a:solidFill>
-              <a:latin typeface="Calibri" panose="020F0502020204030204" pitchFamily="34" charset="0"/>
-              <a:ea typeface="Arial Unicode MS" pitchFamily="34" charset="-128"/>
-              <a:cs typeface="Calibri" panose="020F0502020204030204" pitchFamily="34" charset="0"/>
-            </a:endParaRPr>
-          </a:p>
-          <a:p>
-            <a:pPr marL="342797" indent="-342797">
-              <a:spcBef>
-                <a:spcPts val="300"/>
-              </a:spcBef>
-              <a:buFont typeface="Wingdings" panose="05000000000000000000" pitchFamily="2" charset="2"/>
-              <a:buChar char="§"/>
-            </a:pPr>
+            <a:r>
+              <a:rPr lang="en-US" sz="1600" kern="0" dirty="0">
+                <a:solidFill>
+                  <a:srgbClr val="000000"/>
+                </a:solidFill>
+                <a:latin typeface="Calibri" panose="020F0502020204030204" pitchFamily="34" charset="0"/>
+                <a:ea typeface="Arial Unicode MS" pitchFamily="34" charset="-128"/>
+                <a:cs typeface="Calibri" panose="020F0502020204030204" pitchFamily="34" charset="0"/>
+              </a:rPr>
+              <a:t>Interesting to note that there are no defaulters in category “NONE”</a:t>
+            </a:r>
             <a:endParaRPr lang="en-US" sz="1200" dirty="0">
               <a:latin typeface="Calibri" panose="020F0502020204030204" pitchFamily="34" charset="0"/>
               <a:cs typeface="Calibri" panose="020F0502020204030204" pitchFamily="34" charset="0"/>
@@ -4820,7 +5319,7 @@
           <p:cNvPr id="6" name="Picture 5">
             <a:extLst>
               <a:ext uri="{FF2B5EF4-FFF2-40B4-BE49-F238E27FC236}">
-                <a16:creationId xmlns:a16="http://schemas.microsoft.com/office/drawing/2014/main" id="{40ADCBB2-2D06-454C-AB86-33DA3FEC7DF9}"/>
+                <a16:creationId xmlns:a16="http://schemas.microsoft.com/office/drawing/2014/main" id="{F3BC0CFC-F4DE-3545-BBD8-76D61D0F5978}"/>
               </a:ext>
             </a:extLst>
           </p:cNvPr>
@@ -4837,8 +5336,8 @@
         </p:blipFill>
         <p:spPr>
           <a:xfrm>
-            <a:off x="2209452" y="2582159"/>
-            <a:ext cx="7772400" cy="4229100"/>
+            <a:off x="2753152" y="2702207"/>
+            <a:ext cx="6511413" cy="4043034"/>
           </a:xfrm>
           <a:prstGeom prst="rect">
             <a:avLst/>
@@ -4848,7 +5347,7 @@
     </p:spTree>
     <p:extLst>
       <p:ext uri="{BB962C8B-B14F-4D97-AF65-F5344CB8AC3E}">
-        <p14:creationId xmlns:p14="http://schemas.microsoft.com/office/powerpoint/2010/main" val="3328637240"/>
+        <p14:creationId xmlns:p14="http://schemas.microsoft.com/office/powerpoint/2010/main" val="1362094320"/>
       </p:ext>
     </p:extLst>
   </p:cSld>
@@ -4901,7 +5400,7 @@
           <a:graphicData uri="http://schemas.openxmlformats.org/presentationml/2006/ole">
             <mc:AlternateContent xmlns:mc="http://schemas.openxmlformats.org/markup-compatibility/2006">
               <mc:Choice xmlns:v="urn:schemas-microsoft-com:vml" Requires="v">
-                <p:oleObj spid="_x0000_s10241" name="think-cell Slide" r:id="rId5" imgW="393" imgH="392" progId="TCLayout.ActiveDocument.1">
+                <p:oleObj spid="_x0000_s8195" name="think-cell Slide" r:id="rId5" imgW="393" imgH="392" progId="TCLayout.ActiveDocument.1">
                   <p:embed/>
                 </p:oleObj>
               </mc:Choice>
@@ -5059,7 +5558,7 @@
                 <a:latin typeface="Calibri" panose="020F0502020204030204" pitchFamily="34" charset="0"/>
                 <a:cs typeface="Calibri" panose="020F0502020204030204" pitchFamily="34" charset="0"/>
               </a:rPr>
-              <a:t>Segmented Univariate Analysis – Purpose</a:t>
+              <a:t>Segmented Univariate Analysis – Annual Income</a:t>
             </a:r>
             <a:br>
               <a:rPr lang="en-US" sz="2399" dirty="0">
@@ -5088,8 +5587,8 @@
         </p:nvSpPr>
         <p:spPr bwMode="gray">
           <a:xfrm>
-            <a:off x="504218" y="1560862"/>
-            <a:ext cx="11009283" cy="915210"/>
+            <a:off x="504218" y="1560863"/>
+            <a:ext cx="11009283" cy="738472"/>
           </a:xfrm>
           <a:prstGeom prst="roundRect">
             <a:avLst>
@@ -5128,8 +5627,23 @@
                 <a:ea typeface="Arial Unicode MS" pitchFamily="34" charset="-128"/>
                 <a:cs typeface="Calibri" panose="020F0502020204030204" pitchFamily="34" charset="0"/>
               </a:rPr>
-              <a:t>Applicants whose purpose of loan is “educational” or “small business” tend to default more than other categories by huge difference between 8 % - 17 %</a:t>
-            </a:r>
+              <a:t>Applicants with lesser Annual income tend to default more than those with higher levels of annual income</a:t>
+            </a:r>
+          </a:p>
+          <a:p>
+            <a:pPr>
+              <a:spcBef>
+                <a:spcPts val="300"/>
+              </a:spcBef>
+            </a:pPr>
+            <a:endParaRPr lang="en-US" sz="1600" kern="0" dirty="0">
+              <a:solidFill>
+                <a:srgbClr val="000000"/>
+              </a:solidFill>
+              <a:latin typeface="Calibri" panose="020F0502020204030204" pitchFamily="34" charset="0"/>
+              <a:ea typeface="Arial Unicode MS" pitchFamily="34" charset="-128"/>
+              <a:cs typeface="Calibri" panose="020F0502020204030204" pitchFamily="34" charset="0"/>
+            </a:endParaRPr>
           </a:p>
           <a:p>
             <a:pPr marL="342797" indent="-342797">
@@ -5207,7 +5721,7 @@
           <p:cNvPr id="6" name="Picture 5">
             <a:extLst>
               <a:ext uri="{FF2B5EF4-FFF2-40B4-BE49-F238E27FC236}">
-                <a16:creationId xmlns:a16="http://schemas.microsoft.com/office/drawing/2014/main" id="{00B23039-3DA1-4B42-80E9-9C7F54E44605}"/>
+                <a16:creationId xmlns:a16="http://schemas.microsoft.com/office/drawing/2014/main" id="{7A76EBE8-9A25-1249-A296-2C866532FEC7}"/>
               </a:ext>
             </a:extLst>
           </p:cNvPr>
@@ -5224,8 +5738,8 @@
         </p:blipFill>
         <p:spPr>
           <a:xfrm>
-            <a:off x="3133698" y="2702207"/>
-            <a:ext cx="5923908" cy="4084786"/>
+            <a:off x="2088802" y="2628900"/>
+            <a:ext cx="8013700" cy="4229100"/>
           </a:xfrm>
           <a:prstGeom prst="rect">
             <a:avLst/>
@@ -5235,7 +5749,7 @@
     </p:spTree>
     <p:extLst>
       <p:ext uri="{BB962C8B-B14F-4D97-AF65-F5344CB8AC3E}">
-        <p14:creationId xmlns:p14="http://schemas.microsoft.com/office/powerpoint/2010/main" val="910503719"/>
+        <p14:creationId xmlns:p14="http://schemas.microsoft.com/office/powerpoint/2010/main" val="201984335"/>
       </p:ext>
     </p:extLst>
   </p:cSld>
@@ -5288,7 +5802,7 @@
           <a:graphicData uri="http://schemas.openxmlformats.org/presentationml/2006/ole">
             <mc:AlternateContent xmlns:mc="http://schemas.openxmlformats.org/markup-compatibility/2006">
               <mc:Choice xmlns:v="urn:schemas-microsoft-com:vml" Requires="v">
-                <p:oleObj spid="_x0000_s11265" name="think-cell Slide" r:id="rId5" imgW="393" imgH="392" progId="TCLayout.ActiveDocument.1">
+                <p:oleObj spid="_x0000_s9219" name="think-cell Slide" r:id="rId5" imgW="393" imgH="392" progId="TCLayout.ActiveDocument.1">
                   <p:embed/>
                 </p:oleObj>
               </mc:Choice>
@@ -5446,7 +5960,7 @@
                 <a:latin typeface="Calibri" panose="020F0502020204030204" pitchFamily="34" charset="0"/>
                 <a:cs typeface="Calibri" panose="020F0502020204030204" pitchFamily="34" charset="0"/>
               </a:rPr>
-              <a:t>Segmented Univariate Analysis – Debt to Income Ratio</a:t>
+              <a:t>Segmented Univariate Analysis – Income Verification Status</a:t>
             </a:r>
             <a:br>
               <a:rPr lang="en-US" sz="2399" dirty="0">
@@ -5475,8 +5989,8 @@
         </p:nvSpPr>
         <p:spPr bwMode="gray">
           <a:xfrm>
-            <a:off x="504218" y="1560863"/>
-            <a:ext cx="11009283" cy="738472"/>
+            <a:off x="505326" y="1462071"/>
+            <a:ext cx="11009283" cy="1021297"/>
           </a:xfrm>
           <a:prstGeom prst="roundRect">
             <a:avLst>
@@ -5515,8 +6029,45 @@
                 <a:ea typeface="Arial Unicode MS" pitchFamily="34" charset="-128"/>
                 <a:cs typeface="Calibri" panose="020F0502020204030204" pitchFamily="34" charset="0"/>
               </a:rPr>
-              <a:t>Applicants with higher debt to income ratio tends to default more than those with lesser debt to income ratio. Although this is not a strong indicator as the difference in mean between them is merely 1</a:t>
-            </a:r>
+              <a:t>Surprisingly, Loan Applications whose Income is verified defaults more than others by at least 2%. May be verification process needs to be revisited. </a:t>
+            </a:r>
+          </a:p>
+          <a:p>
+            <a:pPr marL="342797" indent="-342797">
+              <a:spcBef>
+                <a:spcPts val="300"/>
+              </a:spcBef>
+              <a:buFont typeface="Wingdings" panose="05000000000000000000" pitchFamily="2" charset="2"/>
+              <a:buChar char="§"/>
+            </a:pPr>
+            <a:r>
+              <a:rPr lang="en-US" sz="1600" kern="0" dirty="0">
+                <a:solidFill>
+                  <a:srgbClr val="000000"/>
+                </a:solidFill>
+                <a:latin typeface="Calibri" panose="020F0502020204030204" pitchFamily="34" charset="0"/>
+                <a:ea typeface="Arial Unicode MS" pitchFamily="34" charset="-128"/>
+                <a:cs typeface="Calibri" panose="020F0502020204030204" pitchFamily="34" charset="0"/>
+              </a:rPr>
+              <a:t>This is substantial considering the fact that 43% of the applicants income were not verified.</a:t>
+            </a:r>
+          </a:p>
+          <a:p>
+            <a:pPr marL="342797" indent="-342797">
+              <a:spcBef>
+                <a:spcPts val="300"/>
+              </a:spcBef>
+              <a:buFont typeface="Wingdings" panose="05000000000000000000" pitchFamily="2" charset="2"/>
+              <a:buChar char="§"/>
+            </a:pPr>
+            <a:endParaRPr lang="en-US" sz="1600" kern="0" dirty="0">
+              <a:solidFill>
+                <a:srgbClr val="000000"/>
+              </a:solidFill>
+              <a:latin typeface="Calibri" panose="020F0502020204030204" pitchFamily="34" charset="0"/>
+              <a:ea typeface="Arial Unicode MS" pitchFamily="34" charset="-128"/>
+              <a:cs typeface="Calibri" panose="020F0502020204030204" pitchFamily="34" charset="0"/>
+            </a:endParaRPr>
           </a:p>
           <a:p>
             <a:pPr marL="342797" indent="-342797">
@@ -5547,7 +6098,7 @@
         </p:nvSpPr>
         <p:spPr>
           <a:xfrm>
-            <a:off x="607375" y="1440814"/>
+            <a:off x="608483" y="1342023"/>
             <a:ext cx="1347226" cy="276927"/>
           </a:xfrm>
           <a:prstGeom prst="rect">
@@ -5594,7 +6145,7 @@
           <p:cNvPr id="6" name="Picture 5">
             <a:extLst>
               <a:ext uri="{FF2B5EF4-FFF2-40B4-BE49-F238E27FC236}">
-                <a16:creationId xmlns:a16="http://schemas.microsoft.com/office/drawing/2014/main" id="{1B841A87-C2DC-564A-8162-B51768812EAA}"/>
+                <a16:creationId xmlns:a16="http://schemas.microsoft.com/office/drawing/2014/main" id="{40ADCBB2-2D06-454C-AB86-33DA3FEC7DF9}"/>
               </a:ext>
             </a:extLst>
           </p:cNvPr>
@@ -5611,8 +6162,8 @@
         </p:blipFill>
         <p:spPr>
           <a:xfrm>
-            <a:off x="2083514" y="2582159"/>
-            <a:ext cx="7696200" cy="4229100"/>
+            <a:off x="2209452" y="2582159"/>
+            <a:ext cx="7772400" cy="4229100"/>
           </a:xfrm>
           <a:prstGeom prst="rect">
             <a:avLst/>
@@ -5622,7 +6173,7 @@
     </p:spTree>
     <p:extLst>
       <p:ext uri="{BB962C8B-B14F-4D97-AF65-F5344CB8AC3E}">
-        <p14:creationId xmlns:p14="http://schemas.microsoft.com/office/powerpoint/2010/main" val="3034020961"/>
+        <p14:creationId xmlns:p14="http://schemas.microsoft.com/office/powerpoint/2010/main" val="3328637240"/>
       </p:ext>
     </p:extLst>
   </p:cSld>
@@ -5675,7 +6226,7 @@
           <a:graphicData uri="http://schemas.openxmlformats.org/presentationml/2006/ole">
             <mc:AlternateContent xmlns:mc="http://schemas.openxmlformats.org/markup-compatibility/2006">
               <mc:Choice xmlns:v="urn:schemas-microsoft-com:vml" Requires="v">
-                <p:oleObj spid="_x0000_s12289" name="think-cell Slide" r:id="rId5" imgW="393" imgH="392" progId="TCLayout.ActiveDocument.1">
+                <p:oleObj spid="_x0000_s10243" name="think-cell Slide" r:id="rId5" imgW="393" imgH="392" progId="TCLayout.ActiveDocument.1">
                   <p:embed/>
                 </p:oleObj>
               </mc:Choice>
@@ -5833,7 +6384,7 @@
                 <a:latin typeface="Calibri" panose="020F0502020204030204" pitchFamily="34" charset="0"/>
                 <a:cs typeface="Calibri" panose="020F0502020204030204" pitchFamily="34" charset="0"/>
               </a:rPr>
-              <a:t>Segmented Univariate Analysis – Revolving Balance</a:t>
+              <a:t>Segmented Univariate Analysis – Purpose</a:t>
             </a:r>
             <a:br>
               <a:rPr lang="en-US" sz="2399" dirty="0">
@@ -5862,8 +6413,8 @@
         </p:nvSpPr>
         <p:spPr bwMode="gray">
           <a:xfrm>
-            <a:off x="504218" y="1560863"/>
-            <a:ext cx="11009283" cy="822742"/>
+            <a:off x="504218" y="1560861"/>
+            <a:ext cx="11009283" cy="1141345"/>
           </a:xfrm>
           <a:prstGeom prst="roundRect">
             <a:avLst>
@@ -5902,7 +6453,27 @@
                 <a:ea typeface="Arial Unicode MS" pitchFamily="34" charset="-128"/>
                 <a:cs typeface="Calibri" panose="020F0502020204030204" pitchFamily="34" charset="0"/>
               </a:rPr>
-              <a:t>Applicants with higher credit revolving balance tend to default more than those with lesser credit revolving balance</a:t>
+              <a:t>Applicants whose purpose of loan is “educational” or “small business” tend to default more than other categories by huge difference between 8 % - 17 %.</a:t>
+            </a:r>
+          </a:p>
+          <a:p>
+            <a:pPr marL="342797" indent="-342797">
+              <a:spcBef>
+                <a:spcPts val="300"/>
+              </a:spcBef>
+              <a:buFont typeface="Wingdings" panose="05000000000000000000" pitchFamily="2" charset="2"/>
+              <a:buChar char="§"/>
+            </a:pPr>
+            <a:r>
+              <a:rPr lang="en-US" sz="1600" kern="0" dirty="0">
+                <a:solidFill>
+                  <a:srgbClr val="000000"/>
+                </a:solidFill>
+                <a:latin typeface="Calibri" panose="020F0502020204030204" pitchFamily="34" charset="0"/>
+                <a:ea typeface="Arial Unicode MS" pitchFamily="34" charset="-128"/>
+                <a:cs typeface="Calibri" panose="020F0502020204030204" pitchFamily="34" charset="0"/>
+              </a:rPr>
+              <a:t>This is substantial considering the fact that purpose “debt consolidation” dominates the dataset (46% applicants)</a:t>
             </a:r>
           </a:p>
           <a:p>
@@ -5981,7 +6552,7 @@
           <p:cNvPr id="6" name="Picture 5">
             <a:extLst>
               <a:ext uri="{FF2B5EF4-FFF2-40B4-BE49-F238E27FC236}">
-                <a16:creationId xmlns:a16="http://schemas.microsoft.com/office/drawing/2014/main" id="{C46ACAD5-352A-C246-AAC5-1BCB4A87C059}"/>
+                <a16:creationId xmlns:a16="http://schemas.microsoft.com/office/drawing/2014/main" id="{00B23039-3DA1-4B42-80E9-9C7F54E44605}"/>
               </a:ext>
             </a:extLst>
           </p:cNvPr>
@@ -5998,8 +6569,8 @@
         </p:blipFill>
         <p:spPr>
           <a:xfrm>
-            <a:off x="2133252" y="2503654"/>
-            <a:ext cx="7924800" cy="4229100"/>
+            <a:off x="3174771" y="2810107"/>
+            <a:ext cx="5842458" cy="4028623"/>
           </a:xfrm>
           <a:prstGeom prst="rect">
             <a:avLst/>
@@ -6009,7 +6580,7 @@
     </p:spTree>
     <p:extLst>
       <p:ext uri="{BB962C8B-B14F-4D97-AF65-F5344CB8AC3E}">
-        <p14:creationId xmlns:p14="http://schemas.microsoft.com/office/powerpoint/2010/main" val="2164259897"/>
+        <p14:creationId xmlns:p14="http://schemas.microsoft.com/office/powerpoint/2010/main" val="910503719"/>
       </p:ext>
     </p:extLst>
   </p:cSld>
@@ -6062,7 +6633,7 @@
           <a:graphicData uri="http://schemas.openxmlformats.org/presentationml/2006/ole">
             <mc:AlternateContent xmlns:mc="http://schemas.openxmlformats.org/markup-compatibility/2006">
               <mc:Choice xmlns:v="urn:schemas-microsoft-com:vml" Requires="v">
-                <p:oleObj spid="_x0000_s13313" name="think-cell Slide" r:id="rId5" imgW="393" imgH="392" progId="TCLayout.ActiveDocument.1">
+                <p:oleObj spid="_x0000_s11267" name="think-cell Slide" r:id="rId5" imgW="393" imgH="392" progId="TCLayout.ActiveDocument.1">
                   <p:embed/>
                 </p:oleObj>
               </mc:Choice>
@@ -6220,7 +6791,7 @@
                 <a:latin typeface="Calibri" panose="020F0502020204030204" pitchFamily="34" charset="0"/>
                 <a:cs typeface="Calibri" panose="020F0502020204030204" pitchFamily="34" charset="0"/>
               </a:rPr>
-              <a:t>Segmented Univariate Analysis – Revolving Utilization</a:t>
+              <a:t>Segmented Univariate Analysis – Debt to Income Ratio</a:t>
             </a:r>
             <a:br>
               <a:rPr lang="en-US" sz="2399" dirty="0">
@@ -6289,7 +6860,7 @@
                 <a:ea typeface="Arial Unicode MS" pitchFamily="34" charset="-128"/>
                 <a:cs typeface="Calibri" panose="020F0502020204030204" pitchFamily="34" charset="0"/>
               </a:rPr>
-              <a:t>Applicants with higher revolving credit utilization tend to default more than those with lesser credit utilization  </a:t>
+              <a:t>Applicants with higher debt to income ratio tends to default more than those with lesser debt to income ratio. Although this is not a strong indicator as the difference in mean between them is merely 1</a:t>
             </a:r>
           </a:p>
           <a:p>
@@ -6368,7 +6939,7 @@
           <p:cNvPr id="6" name="Picture 5">
             <a:extLst>
               <a:ext uri="{FF2B5EF4-FFF2-40B4-BE49-F238E27FC236}">
-                <a16:creationId xmlns:a16="http://schemas.microsoft.com/office/drawing/2014/main" id="{DBC51BF3-0527-E14F-ABC2-899B48971400}"/>
+                <a16:creationId xmlns:a16="http://schemas.microsoft.com/office/drawing/2014/main" id="{1B841A87-C2DC-564A-8162-B51768812EAA}"/>
               </a:ext>
             </a:extLst>
           </p:cNvPr>
@@ -6385,8 +6956,8 @@
         </p:blipFill>
         <p:spPr>
           <a:xfrm>
-            <a:off x="2122659" y="2582159"/>
-            <a:ext cx="7772400" cy="4229100"/>
+            <a:off x="2083514" y="2582159"/>
+            <a:ext cx="7696200" cy="4229100"/>
           </a:xfrm>
           <a:prstGeom prst="rect">
             <a:avLst/>
@@ -6396,7 +6967,7 @@
     </p:spTree>
     <p:extLst>
       <p:ext uri="{BB962C8B-B14F-4D97-AF65-F5344CB8AC3E}">
-        <p14:creationId xmlns:p14="http://schemas.microsoft.com/office/powerpoint/2010/main" val="3159821242"/>
+        <p14:creationId xmlns:p14="http://schemas.microsoft.com/office/powerpoint/2010/main" val="3034020961"/>
       </p:ext>
     </p:extLst>
   </p:cSld>
@@ -6449,7 +7020,7 @@
           <a:graphicData uri="http://schemas.openxmlformats.org/presentationml/2006/ole">
             <mc:AlternateContent xmlns:mc="http://schemas.openxmlformats.org/markup-compatibility/2006">
               <mc:Choice xmlns:v="urn:schemas-microsoft-com:vml" Requires="v">
-                <p:oleObj spid="_x0000_s14337" name="think-cell Slide" r:id="rId5" imgW="393" imgH="392" progId="TCLayout.ActiveDocument.1">
+                <p:oleObj spid="_x0000_s12291" name="think-cell Slide" r:id="rId5" imgW="393" imgH="392" progId="TCLayout.ActiveDocument.1">
                   <p:embed/>
                 </p:oleObj>
               </mc:Choice>
@@ -6607,7 +7178,7 @@
                 <a:latin typeface="Calibri" panose="020F0502020204030204" pitchFamily="34" charset="0"/>
                 <a:cs typeface="Calibri" panose="020F0502020204030204" pitchFamily="34" charset="0"/>
               </a:rPr>
-              <a:t>Bivariate Analysis – Loan Amount vs Funded Amount</a:t>
+              <a:t>Segmented Univariate Analysis – Revolving Balance</a:t>
             </a:r>
             <a:br>
               <a:rPr lang="en-US" sz="2399" dirty="0">
@@ -6637,7 +7208,7 @@
         <p:spPr bwMode="gray">
           <a:xfrm>
             <a:off x="504218" y="1560863"/>
-            <a:ext cx="11009283" cy="738472"/>
+            <a:ext cx="11009283" cy="822742"/>
           </a:xfrm>
           <a:prstGeom prst="roundRect">
             <a:avLst>
@@ -6676,7 +7247,7 @@
                 <a:ea typeface="Arial Unicode MS" pitchFamily="34" charset="-128"/>
                 <a:cs typeface="Calibri" panose="020F0502020204030204" pitchFamily="34" charset="0"/>
               </a:rPr>
-              <a:t>There are very less defaulters when funded amount is nearly same as that of requested loan amount (linear relation)</a:t>
+              <a:t>Applicants with higher credit revolving balance tend to default more than those with lesser credit revolving balance</a:t>
             </a:r>
           </a:p>
           <a:p>
@@ -6755,7 +7326,7 @@
           <p:cNvPr id="6" name="Picture 5">
             <a:extLst>
               <a:ext uri="{FF2B5EF4-FFF2-40B4-BE49-F238E27FC236}">
-                <a16:creationId xmlns:a16="http://schemas.microsoft.com/office/drawing/2014/main" id="{72DE215C-1CC5-1544-B2AE-F1854A3E6FB1}"/>
+                <a16:creationId xmlns:a16="http://schemas.microsoft.com/office/drawing/2014/main" id="{C46ACAD5-352A-C246-AAC5-1BCB4A87C059}"/>
               </a:ext>
             </a:extLst>
           </p:cNvPr>
@@ -6772,8 +7343,8 @@
         </p:blipFill>
         <p:spPr>
           <a:xfrm>
-            <a:off x="1345533" y="2444116"/>
-            <a:ext cx="9347200" cy="4229100"/>
+            <a:off x="2133252" y="2503654"/>
+            <a:ext cx="7924800" cy="4229100"/>
           </a:xfrm>
           <a:prstGeom prst="rect">
             <a:avLst/>
@@ -6783,7 +7354,7 @@
     </p:spTree>
     <p:extLst>
       <p:ext uri="{BB962C8B-B14F-4D97-AF65-F5344CB8AC3E}">
-        <p14:creationId xmlns:p14="http://schemas.microsoft.com/office/powerpoint/2010/main" val="2714499167"/>
+        <p14:creationId xmlns:p14="http://schemas.microsoft.com/office/powerpoint/2010/main" val="2164259897"/>
       </p:ext>
     </p:extLst>
   </p:cSld>
@@ -6836,7 +7407,7 @@
           <a:graphicData uri="http://schemas.openxmlformats.org/presentationml/2006/ole">
             <mc:AlternateContent xmlns:mc="http://schemas.openxmlformats.org/markup-compatibility/2006">
               <mc:Choice xmlns:v="urn:schemas-microsoft-com:vml" Requires="v">
-                <p:oleObj spid="_x0000_s15361" name="think-cell Slide" r:id="rId5" imgW="393" imgH="392" progId="TCLayout.ActiveDocument.1">
+                <p:oleObj spid="_x0000_s13315" name="think-cell Slide" r:id="rId5" imgW="393" imgH="392" progId="TCLayout.ActiveDocument.1">
                   <p:embed/>
                 </p:oleObj>
               </mc:Choice>
@@ -6994,7 +7565,7 @@
                 <a:latin typeface="Calibri" panose="020F0502020204030204" pitchFamily="34" charset="0"/>
                 <a:cs typeface="Calibri" panose="020F0502020204030204" pitchFamily="34" charset="0"/>
               </a:rPr>
-              <a:t>Bivariate Analysis – Term vs Employment Length</a:t>
+              <a:t>Segmented Univariate Analysis – Revolving Utilization</a:t>
             </a:r>
             <a:br>
               <a:rPr lang="en-US" sz="2399" dirty="0">
@@ -7024,7 +7595,7 @@
         <p:spPr bwMode="gray">
           <a:xfrm>
             <a:off x="504218" y="1560863"/>
-            <a:ext cx="11009283" cy="976854"/>
+            <a:ext cx="11009283" cy="738472"/>
           </a:xfrm>
           <a:prstGeom prst="roundRect">
             <a:avLst>
@@ -7063,45 +7634,8 @@
                 <a:ea typeface="Arial Unicode MS" pitchFamily="34" charset="-128"/>
                 <a:cs typeface="Calibri" panose="020F0502020204030204" pitchFamily="34" charset="0"/>
               </a:rPr>
-              <a:t>Applicants with employment length of 7 years tend to default more than others when the term is 60 months</a:t>
-            </a:r>
-          </a:p>
-          <a:p>
-            <a:pPr marL="342797" indent="-342797">
-              <a:spcBef>
-                <a:spcPts val="300"/>
-              </a:spcBef>
-              <a:buFont typeface="Wingdings" panose="05000000000000000000" pitchFamily="2" charset="2"/>
-              <a:buChar char="§"/>
-            </a:pPr>
-            <a:r>
-              <a:rPr lang="en-US" sz="1600" kern="0" dirty="0">
-                <a:solidFill>
-                  <a:srgbClr val="000000"/>
-                </a:solidFill>
-                <a:latin typeface="Calibri" panose="020F0502020204030204" pitchFamily="34" charset="0"/>
-                <a:ea typeface="Arial Unicode MS" pitchFamily="34" charset="-128"/>
-                <a:cs typeface="Calibri" panose="020F0502020204030204" pitchFamily="34" charset="0"/>
-              </a:rPr>
-              <a:t>Interesting to note that applicants whose employment length is missing also shows similar pattern for 60 months</a:t>
-            </a:r>
-          </a:p>
-          <a:p>
-            <a:pPr marL="342797" indent="-342797">
-              <a:spcBef>
-                <a:spcPts val="300"/>
-              </a:spcBef>
-              <a:buFont typeface="Wingdings" panose="05000000000000000000" pitchFamily="2" charset="2"/>
-              <a:buChar char="§"/>
-            </a:pPr>
-            <a:endParaRPr lang="en-US" sz="1600" kern="0" dirty="0">
-              <a:solidFill>
-                <a:srgbClr val="000000"/>
-              </a:solidFill>
-              <a:latin typeface="Calibri" panose="020F0502020204030204" pitchFamily="34" charset="0"/>
-              <a:ea typeface="Arial Unicode MS" pitchFamily="34" charset="-128"/>
-              <a:cs typeface="Calibri" panose="020F0502020204030204" pitchFamily="34" charset="0"/>
-            </a:endParaRPr>
+              <a:t>Applicants with higher revolving credit utilization tend to default more than those with lesser credit utilization  </a:t>
+            </a:r>
           </a:p>
           <a:p>
             <a:pPr marL="342797" indent="-342797">
@@ -7176,10 +7710,10 @@
       </p:sp>
       <p:pic>
         <p:nvPicPr>
-          <p:cNvPr id="3" name="Picture 2">
-            <a:extLst>
-              <a:ext uri="{FF2B5EF4-FFF2-40B4-BE49-F238E27FC236}">
-                <a16:creationId xmlns:a16="http://schemas.microsoft.com/office/drawing/2014/main" id="{D0024D03-A5FA-084C-89A9-BA2A46173CD6}"/>
+          <p:cNvPr id="6" name="Picture 5">
+            <a:extLst>
+              <a:ext uri="{FF2B5EF4-FFF2-40B4-BE49-F238E27FC236}">
+                <a16:creationId xmlns:a16="http://schemas.microsoft.com/office/drawing/2014/main" id="{DBC51BF3-0527-E14F-ABC2-899B48971400}"/>
               </a:ext>
             </a:extLst>
           </p:cNvPr>
@@ -7196,8 +7730,8 @@
         </p:blipFill>
         <p:spPr>
           <a:xfrm>
-            <a:off x="3146280" y="2775365"/>
-            <a:ext cx="5899440" cy="3995388"/>
+            <a:off x="2122659" y="2582159"/>
+            <a:ext cx="7772400" cy="4229100"/>
           </a:xfrm>
           <a:prstGeom prst="rect">
             <a:avLst/>
@@ -7207,7 +7741,7 @@
     </p:spTree>
     <p:extLst>
       <p:ext uri="{BB962C8B-B14F-4D97-AF65-F5344CB8AC3E}">
-        <p14:creationId xmlns:p14="http://schemas.microsoft.com/office/powerpoint/2010/main" val="709586697"/>
+        <p14:creationId xmlns:p14="http://schemas.microsoft.com/office/powerpoint/2010/main" val="3159821242"/>
       </p:ext>
     </p:extLst>
   </p:cSld>
@@ -7260,7 +7794,7 @@
           <a:graphicData uri="http://schemas.openxmlformats.org/presentationml/2006/ole">
             <mc:AlternateContent xmlns:mc="http://schemas.openxmlformats.org/markup-compatibility/2006">
               <mc:Choice xmlns:v="urn:schemas-microsoft-com:vml" Requires="v">
-                <p:oleObj spid="_x0000_s16385" name="think-cell Slide" r:id="rId5" imgW="393" imgH="392" progId="TCLayout.ActiveDocument.1">
+                <p:oleObj spid="_x0000_s14339" name="think-cell Slide" r:id="rId5" imgW="393" imgH="392" progId="TCLayout.ActiveDocument.1">
                   <p:embed/>
                 </p:oleObj>
               </mc:Choice>
@@ -7381,7 +7915,7 @@
         <p:spPr bwMode="black">
           <a:xfrm>
             <a:off x="505326" y="504761"/>
-            <a:ext cx="11180652" cy="738407"/>
+            <a:ext cx="11180652" cy="738472"/>
           </a:xfrm>
           <a:prstGeom prst="rect">
             <a:avLst/>
@@ -7418,7 +7952,7 @@
                 <a:latin typeface="Calibri" panose="020F0502020204030204" pitchFamily="34" charset="0"/>
                 <a:cs typeface="Calibri" panose="020F0502020204030204" pitchFamily="34" charset="0"/>
               </a:rPr>
-              <a:t>Bivariate Analysis – Term vs Home Ownership</a:t>
+              <a:t>Bivariate Analysis – Loan Amount vs Funded Amount</a:t>
             </a:r>
             <a:br>
               <a:rPr lang="en-US" sz="2399" dirty="0">
@@ -7448,7 +7982,7 @@
         <p:spPr bwMode="gray">
           <a:xfrm>
             <a:off x="504218" y="1560863"/>
-            <a:ext cx="11009283" cy="833016"/>
+            <a:ext cx="11009283" cy="738472"/>
           </a:xfrm>
           <a:prstGeom prst="roundRect">
             <a:avLst>
@@ -7487,7 +8021,7 @@
                 <a:ea typeface="Arial Unicode MS" pitchFamily="34" charset="-128"/>
                 <a:cs typeface="Calibri" panose="020F0502020204030204" pitchFamily="34" charset="0"/>
               </a:rPr>
-              <a:t>Applicants with 60 months as term and Home ownership as OWN and RENT tend to default more likely than other combinations</a:t>
+              <a:t>There are very less defaulters when funded amount is nearly same as that of requested loan amount (linear relation)</a:t>
             </a:r>
           </a:p>
           <a:p>
@@ -7566,7 +8100,7 @@
           <p:cNvPr id="6" name="Picture 5">
             <a:extLst>
               <a:ext uri="{FF2B5EF4-FFF2-40B4-BE49-F238E27FC236}">
-                <a16:creationId xmlns:a16="http://schemas.microsoft.com/office/drawing/2014/main" id="{5C1A763A-DA1E-0B42-8D83-2DF08E197400}"/>
+                <a16:creationId xmlns:a16="http://schemas.microsoft.com/office/drawing/2014/main" id="{72DE215C-1CC5-1544-B2AE-F1854A3E6FB1}"/>
               </a:ext>
             </a:extLst>
           </p:cNvPr>
@@ -7583,8 +8117,8 @@
         </p:blipFill>
         <p:spPr>
           <a:xfrm>
-            <a:off x="2408409" y="2537717"/>
-            <a:ext cx="7200900" cy="4229100"/>
+            <a:off x="1345533" y="2444116"/>
+            <a:ext cx="9347200" cy="4229100"/>
           </a:xfrm>
           <a:prstGeom prst="rect">
             <a:avLst/>
@@ -7594,7 +8128,7 @@
     </p:spTree>
     <p:extLst>
       <p:ext uri="{BB962C8B-B14F-4D97-AF65-F5344CB8AC3E}">
-        <p14:creationId xmlns:p14="http://schemas.microsoft.com/office/powerpoint/2010/main" val="1271807128"/>
+        <p14:creationId xmlns:p14="http://schemas.microsoft.com/office/powerpoint/2010/main" val="2714499167"/>
       </p:ext>
     </p:extLst>
   </p:cSld>
@@ -7757,7 +8291,7 @@
           <a:graphicData uri="http://schemas.openxmlformats.org/presentationml/2006/ole">
             <mc:AlternateContent xmlns:mc="http://schemas.openxmlformats.org/markup-compatibility/2006">
               <mc:Choice xmlns:v="urn:schemas-microsoft-com:vml" Requires="v">
-                <p:oleObj spid="_x0000_s17409" name="think-cell Slide" r:id="rId5" imgW="393" imgH="392" progId="TCLayout.ActiveDocument.1">
+                <p:oleObj spid="_x0000_s15363" name="think-cell Slide" r:id="rId5" imgW="393" imgH="392" progId="TCLayout.ActiveDocument.1">
                   <p:embed/>
                 </p:oleObj>
               </mc:Choice>
@@ -7878,7 +8412,7 @@
         <p:spPr bwMode="black">
           <a:xfrm>
             <a:off x="505326" y="504761"/>
-            <a:ext cx="11180652" cy="738407"/>
+            <a:ext cx="11180652" cy="738472"/>
           </a:xfrm>
           <a:prstGeom prst="rect">
             <a:avLst/>
@@ -7915,7 +8449,7 @@
                 <a:latin typeface="Calibri" panose="020F0502020204030204" pitchFamily="34" charset="0"/>
                 <a:cs typeface="Calibri" panose="020F0502020204030204" pitchFamily="34" charset="0"/>
               </a:rPr>
-              <a:t>Bivariate Analysis – Term vs Verification Status</a:t>
+              <a:t>Bivariate Analysis – Term vs Employment Length</a:t>
             </a:r>
             <a:br>
               <a:rPr lang="en-US" sz="2399" dirty="0">
@@ -7984,8 +8518,45 @@
                 <a:ea typeface="Arial Unicode MS" pitchFamily="34" charset="-128"/>
                 <a:cs typeface="Calibri" panose="020F0502020204030204" pitchFamily="34" charset="0"/>
               </a:rPr>
-              <a:t>Applicants with 60 months term and verification status as “Source Verified” and “Verified” tend to default more than other combinations</a:t>
-            </a:r>
+              <a:t>Applicants with employment length of 7 years tend to default more than others when the term is 60 months</a:t>
+            </a:r>
+          </a:p>
+          <a:p>
+            <a:pPr marL="342797" indent="-342797">
+              <a:spcBef>
+                <a:spcPts val="300"/>
+              </a:spcBef>
+              <a:buFont typeface="Wingdings" panose="05000000000000000000" pitchFamily="2" charset="2"/>
+              <a:buChar char="§"/>
+            </a:pPr>
+            <a:r>
+              <a:rPr lang="en-US" sz="1600" kern="0" dirty="0">
+                <a:solidFill>
+                  <a:srgbClr val="000000"/>
+                </a:solidFill>
+                <a:latin typeface="Calibri" panose="020F0502020204030204" pitchFamily="34" charset="0"/>
+                <a:ea typeface="Arial Unicode MS" pitchFamily="34" charset="-128"/>
+                <a:cs typeface="Calibri" panose="020F0502020204030204" pitchFamily="34" charset="0"/>
+              </a:rPr>
+              <a:t>Interesting to note that applicants whose employment length is missing also shows similar pattern for 60 months</a:t>
+            </a:r>
+          </a:p>
+          <a:p>
+            <a:pPr marL="342797" indent="-342797">
+              <a:spcBef>
+                <a:spcPts val="300"/>
+              </a:spcBef>
+              <a:buFont typeface="Wingdings" panose="05000000000000000000" pitchFamily="2" charset="2"/>
+              <a:buChar char="§"/>
+            </a:pPr>
+            <a:endParaRPr lang="en-US" sz="1600" kern="0" dirty="0">
+              <a:solidFill>
+                <a:srgbClr val="000000"/>
+              </a:solidFill>
+              <a:latin typeface="Calibri" panose="020F0502020204030204" pitchFamily="34" charset="0"/>
+              <a:ea typeface="Arial Unicode MS" pitchFamily="34" charset="-128"/>
+              <a:cs typeface="Calibri" panose="020F0502020204030204" pitchFamily="34" charset="0"/>
+            </a:endParaRPr>
           </a:p>
           <a:p>
             <a:pPr marL="342797" indent="-342797">
@@ -8063,7 +8634,7 @@
           <p:cNvPr id="3" name="Picture 2">
             <a:extLst>
               <a:ext uri="{FF2B5EF4-FFF2-40B4-BE49-F238E27FC236}">
-                <a16:creationId xmlns:a16="http://schemas.microsoft.com/office/drawing/2014/main" id="{56AA228E-CCC5-2F4B-AA8B-4FDAC32C4066}"/>
+                <a16:creationId xmlns:a16="http://schemas.microsoft.com/office/drawing/2014/main" id="{D0024D03-A5FA-084C-89A9-BA2A46173CD6}"/>
               </a:ext>
             </a:extLst>
           </p:cNvPr>
@@ -8080,8 +8651,8 @@
         </p:blipFill>
         <p:spPr>
           <a:xfrm>
-            <a:off x="2495202" y="2657766"/>
-            <a:ext cx="7200900" cy="4229100"/>
+            <a:off x="3146280" y="2775365"/>
+            <a:ext cx="5899440" cy="3995388"/>
           </a:xfrm>
           <a:prstGeom prst="rect">
             <a:avLst/>
@@ -8091,7 +8662,7 @@
     </p:spTree>
     <p:extLst>
       <p:ext uri="{BB962C8B-B14F-4D97-AF65-F5344CB8AC3E}">
-        <p14:creationId xmlns:p14="http://schemas.microsoft.com/office/powerpoint/2010/main" val="1081381382"/>
+        <p14:creationId xmlns:p14="http://schemas.microsoft.com/office/powerpoint/2010/main" val="709586697"/>
       </p:ext>
     </p:extLst>
   </p:cSld>
@@ -8144,7 +8715,7 @@
           <a:graphicData uri="http://schemas.openxmlformats.org/presentationml/2006/ole">
             <mc:AlternateContent xmlns:mc="http://schemas.openxmlformats.org/markup-compatibility/2006">
               <mc:Choice xmlns:v="urn:schemas-microsoft-com:vml" Requires="v">
-                <p:oleObj spid="_x0000_s18433" name="think-cell Slide" r:id="rId5" imgW="393" imgH="392" progId="TCLayout.ActiveDocument.1">
+                <p:oleObj spid="_x0000_s16387" name="think-cell Slide" r:id="rId5" imgW="393" imgH="392" progId="TCLayout.ActiveDocument.1">
                   <p:embed/>
                 </p:oleObj>
               </mc:Choice>
@@ -8302,7 +8873,7 @@
                 <a:latin typeface="Calibri" panose="020F0502020204030204" pitchFamily="34" charset="0"/>
                 <a:cs typeface="Calibri" panose="020F0502020204030204" pitchFamily="34" charset="0"/>
               </a:rPr>
-              <a:t>Bivariate Analysis – Term vs Purpose</a:t>
+              <a:t>Bivariate Analysis – Term vs Home Ownership</a:t>
             </a:r>
             <a:br>
               <a:rPr lang="en-US" sz="2399" dirty="0">
@@ -8332,7 +8903,7 @@
         <p:spPr bwMode="gray">
           <a:xfrm>
             <a:off x="504218" y="1560863"/>
-            <a:ext cx="11009283" cy="976854"/>
+            <a:ext cx="11009283" cy="833016"/>
           </a:xfrm>
           <a:prstGeom prst="roundRect">
             <a:avLst>
@@ -8371,7 +8942,7 @@
                 <a:ea typeface="Arial Unicode MS" pitchFamily="34" charset="-128"/>
                 <a:cs typeface="Calibri" panose="020F0502020204030204" pitchFamily="34" charset="0"/>
               </a:rPr>
-              <a:t>Applicants with 60 months term and purpose as “educational” and “small business” tend to default more than other combinations</a:t>
+              <a:t>Applicants with 60 months as term and Home ownership as OWN and RENT tend to default more likely than other combinations</a:t>
             </a:r>
           </a:p>
           <a:p>
@@ -8447,10 +9018,10 @@
       </p:sp>
       <p:pic>
         <p:nvPicPr>
-          <p:cNvPr id="3" name="Picture 2">
-            <a:extLst>
-              <a:ext uri="{FF2B5EF4-FFF2-40B4-BE49-F238E27FC236}">
-                <a16:creationId xmlns:a16="http://schemas.microsoft.com/office/drawing/2014/main" id="{A251628E-C08D-ED49-B744-81B49DC6EE0B}"/>
+          <p:cNvPr id="6" name="Picture 5">
+            <a:extLst>
+              <a:ext uri="{FF2B5EF4-FFF2-40B4-BE49-F238E27FC236}">
+                <a16:creationId xmlns:a16="http://schemas.microsoft.com/office/drawing/2014/main" id="{5C1A763A-DA1E-0B42-8D83-2DF08E197400}"/>
               </a:ext>
             </a:extLst>
           </p:cNvPr>
@@ -8467,8 +9038,8 @@
         </p:blipFill>
         <p:spPr>
           <a:xfrm>
-            <a:off x="3337748" y="2657766"/>
-            <a:ext cx="5515807" cy="4105239"/>
+            <a:off x="2408409" y="2537717"/>
+            <a:ext cx="7200900" cy="4229100"/>
           </a:xfrm>
           <a:prstGeom prst="rect">
             <a:avLst/>
@@ -8478,7 +9049,7 @@
     </p:spTree>
     <p:extLst>
       <p:ext uri="{BB962C8B-B14F-4D97-AF65-F5344CB8AC3E}">
-        <p14:creationId xmlns:p14="http://schemas.microsoft.com/office/powerpoint/2010/main" val="2580952560"/>
+        <p14:creationId xmlns:p14="http://schemas.microsoft.com/office/powerpoint/2010/main" val="1271807128"/>
       </p:ext>
     </p:extLst>
   </p:cSld>
@@ -8531,7 +9102,7 @@
           <a:graphicData uri="http://schemas.openxmlformats.org/presentationml/2006/ole">
             <mc:AlternateContent xmlns:mc="http://schemas.openxmlformats.org/markup-compatibility/2006">
               <mc:Choice xmlns:v="urn:schemas-microsoft-com:vml" Requires="v">
-                <p:oleObj spid="_x0000_s19457" name="think-cell Slide" r:id="rId5" imgW="393" imgH="392" progId="TCLayout.ActiveDocument.1">
+                <p:oleObj spid="_x0000_s17411" name="think-cell Slide" r:id="rId5" imgW="393" imgH="392" progId="TCLayout.ActiveDocument.1">
                   <p:embed/>
                 </p:oleObj>
               </mc:Choice>
@@ -8689,7 +9260,7 @@
                 <a:latin typeface="Calibri" panose="020F0502020204030204" pitchFamily="34" charset="0"/>
                 <a:cs typeface="Calibri" panose="020F0502020204030204" pitchFamily="34" charset="0"/>
               </a:rPr>
-              <a:t>Bivariate Analysis – Term vs Revolving Balance</a:t>
+              <a:t>Bivariate Analysis – Term vs Verification Status</a:t>
             </a:r>
             <a:br>
               <a:rPr lang="en-US" sz="2399" dirty="0">
@@ -8719,7 +9290,7 @@
         <p:spPr bwMode="gray">
           <a:xfrm>
             <a:off x="504218" y="1560863"/>
-            <a:ext cx="11009283" cy="822741"/>
+            <a:ext cx="11009283" cy="976854"/>
           </a:xfrm>
           <a:prstGeom prst="roundRect">
             <a:avLst>
@@ -8758,7 +9329,7 @@
                 <a:ea typeface="Arial Unicode MS" pitchFamily="34" charset="-128"/>
                 <a:cs typeface="Calibri" panose="020F0502020204030204" pitchFamily="34" charset="0"/>
               </a:rPr>
-              <a:t>Applicants with higher credit revolving balance tend to default likely only for 60 months term</a:t>
+              <a:t>Applicants with 60 months term and verification status as “Source Verified” and “Verified” tend to default more than other combinations</a:t>
             </a:r>
           </a:p>
           <a:p>
@@ -8837,7 +9408,7 @@
           <p:cNvPr id="3" name="Picture 2">
             <a:extLst>
               <a:ext uri="{FF2B5EF4-FFF2-40B4-BE49-F238E27FC236}">
-                <a16:creationId xmlns:a16="http://schemas.microsoft.com/office/drawing/2014/main" id="{61A23500-D893-8F40-B8D0-0CE656AE27D2}"/>
+                <a16:creationId xmlns:a16="http://schemas.microsoft.com/office/drawing/2014/main" id="{56AA228E-CCC5-2F4B-AA8B-4FDAC32C4066}"/>
               </a:ext>
             </a:extLst>
           </p:cNvPr>
@@ -8854,8 +9425,8 @@
         </p:blipFill>
         <p:spPr>
           <a:xfrm>
-            <a:off x="3667873" y="2616670"/>
-            <a:ext cx="5373385" cy="3989613"/>
+            <a:off x="2495202" y="2657766"/>
+            <a:ext cx="7200900" cy="4229100"/>
           </a:xfrm>
           <a:prstGeom prst="rect">
             <a:avLst/>
@@ -8865,7 +9436,7 @@
     </p:spTree>
     <p:extLst>
       <p:ext uri="{BB962C8B-B14F-4D97-AF65-F5344CB8AC3E}">
-        <p14:creationId xmlns:p14="http://schemas.microsoft.com/office/powerpoint/2010/main" val="637610900"/>
+        <p14:creationId xmlns:p14="http://schemas.microsoft.com/office/powerpoint/2010/main" val="1081381382"/>
       </p:ext>
     </p:extLst>
   </p:cSld>
@@ -8918,7 +9489,7 @@
           <a:graphicData uri="http://schemas.openxmlformats.org/presentationml/2006/ole">
             <mc:AlternateContent xmlns:mc="http://schemas.openxmlformats.org/markup-compatibility/2006">
               <mc:Choice xmlns:v="urn:schemas-microsoft-com:vml" Requires="v">
-                <p:oleObj spid="_x0000_s20481" name="think-cell Slide" r:id="rId5" imgW="393" imgH="392" progId="TCLayout.ActiveDocument.1">
+                <p:oleObj spid="_x0000_s18435" name="think-cell Slide" r:id="rId5" imgW="393" imgH="392" progId="TCLayout.ActiveDocument.1">
                   <p:embed/>
                 </p:oleObj>
               </mc:Choice>
@@ -9076,7 +9647,7 @@
                 <a:latin typeface="Calibri" panose="020F0502020204030204" pitchFamily="34" charset="0"/>
                 <a:cs typeface="Calibri" panose="020F0502020204030204" pitchFamily="34" charset="0"/>
               </a:rPr>
-              <a:t>Bivariate Analysis – Employment Length vs Home Ownership</a:t>
+              <a:t>Bivariate Analysis – Term vs Purpose</a:t>
             </a:r>
             <a:br>
               <a:rPr lang="en-US" sz="2399" dirty="0">
@@ -9106,7 +9677,7 @@
         <p:spPr bwMode="gray">
           <a:xfrm>
             <a:off x="504218" y="1560863"/>
-            <a:ext cx="11009283" cy="874112"/>
+            <a:ext cx="11009283" cy="976854"/>
           </a:xfrm>
           <a:prstGeom prst="roundRect">
             <a:avLst>
@@ -9145,7 +9716,7 @@
                 <a:ea typeface="Arial Unicode MS" pitchFamily="34" charset="-128"/>
                 <a:cs typeface="Calibri" panose="020F0502020204030204" pitchFamily="34" charset="0"/>
               </a:rPr>
-              <a:t>Applicants with home ownership as “OTHER” and employment length as 7 years or 3 years tend to default more than other combinations</a:t>
+              <a:t>Applicants with 60 months term and purpose as “educational” and “small business” tend to default more than other combinations</a:t>
             </a:r>
           </a:p>
           <a:p>
@@ -9224,7 +9795,7 @@
           <p:cNvPr id="3" name="Picture 2">
             <a:extLst>
               <a:ext uri="{FF2B5EF4-FFF2-40B4-BE49-F238E27FC236}">
-                <a16:creationId xmlns:a16="http://schemas.microsoft.com/office/drawing/2014/main" id="{65E32FD5-9A97-C946-A6EE-027D5A052194}"/>
+                <a16:creationId xmlns:a16="http://schemas.microsoft.com/office/drawing/2014/main" id="{A251628E-C08D-ED49-B744-81B49DC6EE0B}"/>
               </a:ext>
             </a:extLst>
           </p:cNvPr>
@@ -9241,8 +9812,8 @@
         </p:blipFill>
         <p:spPr>
           <a:xfrm>
-            <a:off x="2458784" y="2657766"/>
-            <a:ext cx="7100150" cy="3825809"/>
+            <a:off x="3337748" y="2657766"/>
+            <a:ext cx="5515807" cy="4105239"/>
           </a:xfrm>
           <a:prstGeom prst="rect">
             <a:avLst/>
@@ -9252,7 +9823,7 @@
     </p:spTree>
     <p:extLst>
       <p:ext uri="{BB962C8B-B14F-4D97-AF65-F5344CB8AC3E}">
-        <p14:creationId xmlns:p14="http://schemas.microsoft.com/office/powerpoint/2010/main" val="1324246045"/>
+        <p14:creationId xmlns:p14="http://schemas.microsoft.com/office/powerpoint/2010/main" val="2580952560"/>
       </p:ext>
     </p:extLst>
   </p:cSld>
@@ -9305,7 +9876,7 @@
           <a:graphicData uri="http://schemas.openxmlformats.org/presentationml/2006/ole">
             <mc:AlternateContent xmlns:mc="http://schemas.openxmlformats.org/markup-compatibility/2006">
               <mc:Choice xmlns:v="urn:schemas-microsoft-com:vml" Requires="v">
-                <p:oleObj spid="_x0000_s21505" name="think-cell Slide" r:id="rId5" imgW="393" imgH="392" progId="TCLayout.ActiveDocument.1">
+                <p:oleObj spid="_x0000_s19459" name="think-cell Slide" r:id="rId5" imgW="393" imgH="392" progId="TCLayout.ActiveDocument.1">
                   <p:embed/>
                 </p:oleObj>
               </mc:Choice>
@@ -9426,7 +9997,7 @@
         <p:spPr bwMode="black">
           <a:xfrm>
             <a:off x="505326" y="504761"/>
-            <a:ext cx="11180652" cy="369204"/>
+            <a:ext cx="11180652" cy="738407"/>
           </a:xfrm>
           <a:prstGeom prst="rect">
             <a:avLst/>
@@ -9463,8 +10034,14 @@
                 <a:latin typeface="Calibri" panose="020F0502020204030204" pitchFamily="34" charset="0"/>
                 <a:cs typeface="Calibri" panose="020F0502020204030204" pitchFamily="34" charset="0"/>
               </a:rPr>
-              <a:t>Bivariate Analysis – Employment Length vs Purpose</a:t>
-            </a:r>
+              <a:t>Bivariate Analysis – Term vs Revolving Balance</a:t>
+            </a:r>
+            <a:br>
+              <a:rPr lang="en-US" sz="2399" dirty="0">
+                <a:latin typeface="Calibri" panose="020F0502020204030204" pitchFamily="34" charset="0"/>
+                <a:cs typeface="Calibri" panose="020F0502020204030204" pitchFamily="34" charset="0"/>
+              </a:rPr>
+            </a:br>
             <a:endParaRPr lang="en-US" sz="2399" b="0" dirty="0">
               <a:latin typeface="Calibri" panose="020F0502020204030204" pitchFamily="34" charset="0"/>
               <a:cs typeface="Calibri" panose="020F0502020204030204" pitchFamily="34" charset="0"/>
@@ -9487,7 +10064,7 @@
         <p:spPr bwMode="gray">
           <a:xfrm>
             <a:off x="504218" y="1560863"/>
-            <a:ext cx="11009283" cy="863838"/>
+            <a:ext cx="11009283" cy="822741"/>
           </a:xfrm>
           <a:prstGeom prst="roundRect">
             <a:avLst>
@@ -9526,63 +10103,8 @@
                 <a:ea typeface="Arial Unicode MS" pitchFamily="34" charset="-128"/>
                 <a:cs typeface="Calibri" panose="020F0502020204030204" pitchFamily="34" charset="0"/>
               </a:rPr>
-              <a:t>Loan Applicants for purpose as renewable energy tend to likely default when their employment length is 4 years or 8 years.</a:t>
-            </a:r>
-          </a:p>
-          <a:p>
-            <a:pPr marL="342797" indent="-342797">
-              <a:spcBef>
-                <a:spcPts val="300"/>
-              </a:spcBef>
-              <a:buFont typeface="Wingdings" panose="05000000000000000000" pitchFamily="2" charset="2"/>
-              <a:buChar char="§"/>
-            </a:pPr>
-            <a:r>
-              <a:rPr lang="en-US" sz="1600" kern="0" dirty="0">
-                <a:solidFill>
-                  <a:srgbClr val="000000"/>
-                </a:solidFill>
-                <a:latin typeface="Calibri" panose="020F0502020204030204" pitchFamily="34" charset="0"/>
-                <a:ea typeface="Arial Unicode MS" pitchFamily="34" charset="-128"/>
-                <a:cs typeface="Calibri" panose="020F0502020204030204" pitchFamily="34" charset="0"/>
-              </a:rPr>
-              <a:t>Interestingly, Loan Applicants with no employment length specified tend to default more for educational purpose</a:t>
-            </a:r>
-            <a:br>
-              <a:rPr lang="en-US" sz="1600" kern="0" dirty="0">
-                <a:solidFill>
-                  <a:srgbClr val="000000"/>
-                </a:solidFill>
-                <a:latin typeface="Calibri" panose="020F0502020204030204" pitchFamily="34" charset="0"/>
-                <a:ea typeface="Arial Unicode MS" pitchFamily="34" charset="-128"/>
-                <a:cs typeface="Calibri" panose="020F0502020204030204" pitchFamily="34" charset="0"/>
-              </a:rPr>
-            </a:br>
-            <a:endParaRPr lang="en-US" sz="1600" kern="0" dirty="0">
-              <a:solidFill>
-                <a:srgbClr val="000000"/>
-              </a:solidFill>
-              <a:latin typeface="Calibri" panose="020F0502020204030204" pitchFamily="34" charset="0"/>
-              <a:ea typeface="Arial Unicode MS" pitchFamily="34" charset="-128"/>
-              <a:cs typeface="Calibri" panose="020F0502020204030204" pitchFamily="34" charset="0"/>
-            </a:endParaRPr>
-          </a:p>
-          <a:p>
-            <a:pPr marL="342797" indent="-342797">
-              <a:spcBef>
-                <a:spcPts val="300"/>
-              </a:spcBef>
-              <a:buFont typeface="Wingdings" panose="05000000000000000000" pitchFamily="2" charset="2"/>
-              <a:buChar char="§"/>
-            </a:pPr>
-            <a:endParaRPr lang="en-US" sz="1600" kern="0" dirty="0">
-              <a:solidFill>
-                <a:srgbClr val="000000"/>
-              </a:solidFill>
-              <a:latin typeface="Calibri" panose="020F0502020204030204" pitchFamily="34" charset="0"/>
-              <a:ea typeface="Arial Unicode MS" pitchFamily="34" charset="-128"/>
-              <a:cs typeface="Calibri" panose="020F0502020204030204" pitchFamily="34" charset="0"/>
-            </a:endParaRPr>
+              <a:t>Applicants with higher credit revolving balance tend to default likely only for 60 months term</a:t>
+            </a:r>
           </a:p>
           <a:p>
             <a:pPr marL="342797" indent="-342797">
@@ -9660,7 +10182,7 @@
           <p:cNvPr id="3" name="Picture 2">
             <a:extLst>
               <a:ext uri="{FF2B5EF4-FFF2-40B4-BE49-F238E27FC236}">
-                <a16:creationId xmlns:a16="http://schemas.microsoft.com/office/drawing/2014/main" id="{4FE0D669-6459-5646-AD78-84DBCB7C048B}"/>
+                <a16:creationId xmlns:a16="http://schemas.microsoft.com/office/drawing/2014/main" id="{61A23500-D893-8F40-B8D0-0CE656AE27D2}"/>
               </a:ext>
             </a:extLst>
           </p:cNvPr>
@@ -9677,8 +10199,8 @@
         </p:blipFill>
         <p:spPr>
           <a:xfrm>
-            <a:off x="3099237" y="2537717"/>
-            <a:ext cx="5992830" cy="4092191"/>
+            <a:off x="3667873" y="2616670"/>
+            <a:ext cx="5373385" cy="3989613"/>
           </a:xfrm>
           <a:prstGeom prst="rect">
             <a:avLst/>
@@ -9688,7 +10210,7 @@
     </p:spTree>
     <p:extLst>
       <p:ext uri="{BB962C8B-B14F-4D97-AF65-F5344CB8AC3E}">
-        <p14:creationId xmlns:p14="http://schemas.microsoft.com/office/powerpoint/2010/main" val="1110004769"/>
+        <p14:creationId xmlns:p14="http://schemas.microsoft.com/office/powerpoint/2010/main" val="637610900"/>
       </p:ext>
     </p:extLst>
   </p:cSld>
@@ -9741,7 +10263,7 @@
           <a:graphicData uri="http://schemas.openxmlformats.org/presentationml/2006/ole">
             <mc:AlternateContent xmlns:mc="http://schemas.openxmlformats.org/markup-compatibility/2006">
               <mc:Choice xmlns:v="urn:schemas-microsoft-com:vml" Requires="v">
-                <p:oleObj spid="_x0000_s22529" name="think-cell Slide" r:id="rId5" imgW="393" imgH="392" progId="TCLayout.ActiveDocument.1">
+                <p:oleObj spid="_x0000_s20483" name="think-cell Slide" r:id="rId5" imgW="393" imgH="392" progId="TCLayout.ActiveDocument.1">
                   <p:embed/>
                 </p:oleObj>
               </mc:Choice>
@@ -9862,7 +10384,7 @@
         <p:spPr bwMode="black">
           <a:xfrm>
             <a:off x="505326" y="504761"/>
-            <a:ext cx="11180652" cy="369204"/>
+            <a:ext cx="11180652" cy="738407"/>
           </a:xfrm>
           <a:prstGeom prst="rect">
             <a:avLst/>
@@ -9899,8 +10421,14 @@
                 <a:latin typeface="Calibri" panose="020F0502020204030204" pitchFamily="34" charset="0"/>
                 <a:cs typeface="Calibri" panose="020F0502020204030204" pitchFamily="34" charset="0"/>
               </a:rPr>
-              <a:t>Bivariate Analysis – Home Ownership vs Purpose</a:t>
-            </a:r>
+              <a:t>Bivariate Analysis – Employment Length vs Home Ownership</a:t>
+            </a:r>
+            <a:br>
+              <a:rPr lang="en-US" sz="2399" dirty="0">
+                <a:latin typeface="Calibri" panose="020F0502020204030204" pitchFamily="34" charset="0"/>
+                <a:cs typeface="Calibri" panose="020F0502020204030204" pitchFamily="34" charset="0"/>
+              </a:rPr>
+            </a:br>
             <a:endParaRPr lang="en-US" sz="2399" b="0" dirty="0">
               <a:latin typeface="Calibri" panose="020F0502020204030204" pitchFamily="34" charset="0"/>
               <a:cs typeface="Calibri" panose="020F0502020204030204" pitchFamily="34" charset="0"/>
@@ -9923,7 +10451,7 @@
         <p:spPr bwMode="gray">
           <a:xfrm>
             <a:off x="504218" y="1560863"/>
-            <a:ext cx="11009283" cy="1069322"/>
+            <a:ext cx="11009283" cy="874112"/>
           </a:xfrm>
           <a:prstGeom prst="roundRect">
             <a:avLst>
@@ -9962,27 +10490,7 @@
                 <a:ea typeface="Arial Unicode MS" pitchFamily="34" charset="-128"/>
                 <a:cs typeface="Calibri" panose="020F0502020204030204" pitchFamily="34" charset="0"/>
               </a:rPr>
-              <a:t>Applicants with the purpose of small business tend to default more likely when home ownership is “RENT”,”OWN” and “OTHER”</a:t>
-            </a:r>
-          </a:p>
-          <a:p>
-            <a:pPr marL="342797" indent="-342797">
-              <a:spcBef>
-                <a:spcPts val="300"/>
-              </a:spcBef>
-              <a:buFont typeface="Wingdings" panose="05000000000000000000" pitchFamily="2" charset="2"/>
-              <a:buChar char="§"/>
-            </a:pPr>
-            <a:r>
-              <a:rPr lang="en-US" sz="1600" kern="0" dirty="0">
-                <a:solidFill>
-                  <a:srgbClr val="000000"/>
-                </a:solidFill>
-                <a:latin typeface="Calibri" panose="020F0502020204030204" pitchFamily="34" charset="0"/>
-                <a:ea typeface="Arial Unicode MS" pitchFamily="34" charset="-128"/>
-                <a:cs typeface="Calibri" panose="020F0502020204030204" pitchFamily="34" charset="0"/>
-              </a:rPr>
-              <a:t>Applicants with the purpose of car tend to default with home ownership as “OTHER”</a:t>
+              <a:t>Applicants with home ownership as “OTHER” and employment length as 7 years or 3 years tend to default more than other combinations</a:t>
             </a:r>
           </a:p>
           <a:p>
@@ -10061,7 +10569,7 @@
           <p:cNvPr id="3" name="Picture 2">
             <a:extLst>
               <a:ext uri="{FF2B5EF4-FFF2-40B4-BE49-F238E27FC236}">
-                <a16:creationId xmlns:a16="http://schemas.microsoft.com/office/drawing/2014/main" id="{929A74CA-A5A9-554B-9A0C-BECA38E40BB0}"/>
+                <a16:creationId xmlns:a16="http://schemas.microsoft.com/office/drawing/2014/main" id="{65E32FD5-9A97-C946-A6EE-027D5A052194}"/>
               </a:ext>
             </a:extLst>
           </p:cNvPr>
@@ -10078,8 +10586,8 @@
         </p:blipFill>
         <p:spPr>
           <a:xfrm>
-            <a:off x="3660321" y="2727644"/>
-            <a:ext cx="4871357" cy="3625595"/>
+            <a:off x="2458784" y="2657766"/>
+            <a:ext cx="7100150" cy="3825809"/>
           </a:xfrm>
           <a:prstGeom prst="rect">
             <a:avLst/>
@@ -10089,7 +10597,7 @@
     </p:spTree>
     <p:extLst>
       <p:ext uri="{BB962C8B-B14F-4D97-AF65-F5344CB8AC3E}">
-        <p14:creationId xmlns:p14="http://schemas.microsoft.com/office/powerpoint/2010/main" val="3572000508"/>
+        <p14:creationId xmlns:p14="http://schemas.microsoft.com/office/powerpoint/2010/main" val="1324246045"/>
       </p:ext>
     </p:extLst>
   </p:cSld>
@@ -10116,97 +10624,6 @@
           <a:chExt cx="0" cy="0"/>
         </a:xfrm>
       </p:grpSpPr>
-      <p:sp>
-        <p:nvSpPr>
-          <p:cNvPr id="2" name="Title 1">
-            <a:extLst>
-              <a:ext uri="{FF2B5EF4-FFF2-40B4-BE49-F238E27FC236}">
-                <a16:creationId xmlns:a16="http://schemas.microsoft.com/office/drawing/2014/main" id="{7960BC16-D6FB-8743-8758-7402E2881808}"/>
-              </a:ext>
-            </a:extLst>
-          </p:cNvPr>
-          <p:cNvSpPr>
-            <a:spLocks noGrp="1"/>
-          </p:cNvSpPr>
-          <p:nvPr>
-            <p:ph type="title"/>
-          </p:nvPr>
-        </p:nvSpPr>
-        <p:spPr/>
-        <p:txBody>
-          <a:bodyPr/>
-          <a:lstStyle/>
-          <a:p>
-            <a:r>
-              <a:rPr lang="en-US" b="1" dirty="0"/>
-              <a:t>Conclusion</a:t>
-            </a:r>
-          </a:p>
-        </p:txBody>
-      </p:sp>
-      <p:sp>
-        <p:nvSpPr>
-          <p:cNvPr id="3" name="Content Placeholder 2">
-            <a:extLst>
-              <a:ext uri="{FF2B5EF4-FFF2-40B4-BE49-F238E27FC236}">
-                <a16:creationId xmlns:a16="http://schemas.microsoft.com/office/drawing/2014/main" id="{97DAB1AF-9892-364C-8AE9-1C38EAE3A61A}"/>
-              </a:ext>
-            </a:extLst>
-          </p:cNvPr>
-          <p:cNvSpPr>
-            <a:spLocks noGrp="1"/>
-          </p:cNvSpPr>
-          <p:nvPr>
-            <p:ph idx="1"/>
-          </p:nvPr>
-        </p:nvSpPr>
-        <p:spPr/>
-        <p:txBody>
-          <a:bodyPr>
-            <a:normAutofit/>
-          </a:bodyPr>
-          <a:lstStyle/>
-          <a:p>
-            <a:r>
-              <a:rPr lang="en-US" dirty="0"/>
-              <a:t>Strong Driving Variables</a:t>
-            </a:r>
-          </a:p>
-          <a:p>
-            <a:endParaRPr lang="en-US" dirty="0"/>
-          </a:p>
-        </p:txBody>
-      </p:sp>
-    </p:spTree>
-    <p:extLst>
-      <p:ext uri="{BB962C8B-B14F-4D97-AF65-F5344CB8AC3E}">
-        <p14:creationId xmlns:p14="http://schemas.microsoft.com/office/powerpoint/2010/main" val="2136417534"/>
-      </p:ext>
-    </p:extLst>
-  </p:cSld>
-  <p:clrMapOvr>
-    <a:masterClrMapping/>
-  </p:clrMapOvr>
-</p:sld>
-</file>
-
-<file path=ppt/slides/slide27.xml><?xml version="1.0" encoding="utf-8"?>
-<p:sld xmlns:a="http://schemas.openxmlformats.org/drawingml/2006/main" xmlns:r="http://schemas.openxmlformats.org/officeDocument/2006/relationships" xmlns:p="http://schemas.openxmlformats.org/presentationml/2006/main">
-  <p:cSld>
-    <p:spTree>
-      <p:nvGrpSpPr>
-        <p:cNvPr id="1" name=""/>
-        <p:cNvGrpSpPr/>
-        <p:nvPr/>
-      </p:nvGrpSpPr>
-      <p:grpSpPr>
-        <a:xfrm>
-          <a:off x="0" y="0"/>
-          <a:ext cx="0" cy="0"/>
-          <a:chOff x="0" y="0"/>
-          <a:chExt cx="0" cy="0"/>
-        </a:xfrm>
-      </p:grpSpPr>
       <p:graphicFrame>
         <p:nvGraphicFramePr>
           <p:cNvPr id="4" name="Object 3" hidden="1">
@@ -10233,7 +10650,7 @@
           <a:graphicData uri="http://schemas.openxmlformats.org/presentationml/2006/ole">
             <mc:AlternateContent xmlns:mc="http://schemas.openxmlformats.org/markup-compatibility/2006">
               <mc:Choice xmlns:v="urn:schemas-microsoft-com:vml" Requires="v">
-                <p:oleObj spid="_x0000_s23553" name="think-cell Slide" r:id="rId5" imgW="393" imgH="392" progId="TCLayout.ActiveDocument.1">
+                <p:oleObj spid="_x0000_s21507" name="think-cell Slide" r:id="rId5" imgW="393" imgH="392" progId="TCLayout.ActiveDocument.1">
                   <p:embed/>
                 </p:oleObj>
               </mc:Choice>
@@ -10339,61 +10756,6 @@
       </p:sp>
       <p:sp>
         <p:nvSpPr>
-          <p:cNvPr id="2" name="TextBox 1">
-            <a:extLst>
-              <a:ext uri="{FF2B5EF4-FFF2-40B4-BE49-F238E27FC236}">
-                <a16:creationId xmlns:a16="http://schemas.microsoft.com/office/drawing/2014/main" id="{7E337200-931B-4E92-8F8D-F240ED1AF166}"/>
-              </a:ext>
-            </a:extLst>
-          </p:cNvPr>
-          <p:cNvSpPr txBox="1"/>
-          <p:nvPr/>
-        </p:nvSpPr>
-        <p:spPr>
-          <a:xfrm>
-            <a:off x="503869" y="5652974"/>
-            <a:ext cx="11009631" cy="184666"/>
-          </a:xfrm>
-          <a:prstGeom prst="rect">
-            <a:avLst/>
-          </a:prstGeom>
-          <a:noFill/>
-        </p:spPr>
-        <p:txBody>
-          <a:bodyPr wrap="square" lIns="0" tIns="0" rIns="0" bIns="0" rtlCol="0">
-            <a:spAutoFit/>
-          </a:bodyPr>
-          <a:lstStyle/>
-          <a:p>
-            <a:pPr defTabSz="1088449" fontAlgn="base">
-              <a:spcBef>
-                <a:spcPct val="50000"/>
-              </a:spcBef>
-              <a:spcAft>
-                <a:spcPct val="0"/>
-              </a:spcAft>
-              <a:buClr>
-                <a:srgbClr val="F0AB00"/>
-              </a:buClr>
-              <a:buSzPct val="80000"/>
-              <a:defRPr/>
-            </a:pPr>
-            <a:r>
-              <a:rPr lang="en-US" sz="1200" i="1" kern="0" dirty="0">
-                <a:solidFill>
-                  <a:srgbClr val="000000"/>
-                </a:solidFill>
-                <a:latin typeface="Calibri" panose="020F0502020204030204" pitchFamily="34" charset="0"/>
-                <a:ea typeface="Arial Unicode MS" pitchFamily="34" charset="-128"/>
-                <a:cs typeface="Calibri" panose="020F0502020204030204" pitchFamily="34" charset="0"/>
-              </a:rPr>
-              <a:t>1111</a:t>
-            </a:r>
-          </a:p>
-        </p:txBody>
-      </p:sp>
-      <p:sp>
-        <p:nvSpPr>
           <p:cNvPr id="7" name="Title 1">
             <a:extLst>
               <a:ext uri="{FF2B5EF4-FFF2-40B4-BE49-F238E27FC236}">
@@ -10446,7 +10808,7 @@
                 <a:latin typeface="Calibri" panose="020F0502020204030204" pitchFamily="34" charset="0"/>
                 <a:cs typeface="Calibri" panose="020F0502020204030204" pitchFamily="34" charset="0"/>
               </a:rPr>
-              <a:t>Template</a:t>
+              <a:t>Bivariate Analysis – Employment Length vs Purpose</a:t>
             </a:r>
             <a:endParaRPr lang="en-US" sz="2399" b="0" dirty="0">
               <a:latin typeface="Calibri" panose="020F0502020204030204" pitchFamily="34" charset="0"/>
@@ -10469,8 +10831,8 @@
         </p:nvSpPr>
         <p:spPr bwMode="gray">
           <a:xfrm>
-            <a:off x="504218" y="1560862"/>
-            <a:ext cx="11009283" cy="1021297"/>
+            <a:off x="504218" y="1560863"/>
+            <a:ext cx="11009283" cy="863838"/>
           </a:xfrm>
           <a:prstGeom prst="roundRect">
             <a:avLst>
@@ -10509,7 +10871,7 @@
                 <a:ea typeface="Arial Unicode MS" pitchFamily="34" charset="-128"/>
                 <a:cs typeface="Calibri" panose="020F0502020204030204" pitchFamily="34" charset="0"/>
               </a:rPr>
-              <a:t>1</a:t>
+              <a:t>Loan Applicants for purpose as renewable energy tend to likely default when their employment length is 4 years or 8 years.</a:t>
             </a:r>
           </a:p>
           <a:p>
@@ -10529,8 +10891,43 @@
                 <a:ea typeface="Arial Unicode MS" pitchFamily="34" charset="-128"/>
                 <a:cs typeface="Calibri" panose="020F0502020204030204" pitchFamily="34" charset="0"/>
               </a:rPr>
-              <a:t>2</a:t>
-            </a:r>
+              <a:t>Interestingly, Loan Applicants with no employment length specified tend to default more for educational purpose</a:t>
+            </a:r>
+            <a:br>
+              <a:rPr lang="en-US" sz="1600" kern="0" dirty="0">
+                <a:solidFill>
+                  <a:srgbClr val="000000"/>
+                </a:solidFill>
+                <a:latin typeface="Calibri" panose="020F0502020204030204" pitchFamily="34" charset="0"/>
+                <a:ea typeface="Arial Unicode MS" pitchFamily="34" charset="-128"/>
+                <a:cs typeface="Calibri" panose="020F0502020204030204" pitchFamily="34" charset="0"/>
+              </a:rPr>
+            </a:br>
+            <a:endParaRPr lang="en-US" sz="1600" kern="0" dirty="0">
+              <a:solidFill>
+                <a:srgbClr val="000000"/>
+              </a:solidFill>
+              <a:latin typeface="Calibri" panose="020F0502020204030204" pitchFamily="34" charset="0"/>
+              <a:ea typeface="Arial Unicode MS" pitchFamily="34" charset="-128"/>
+              <a:cs typeface="Calibri" panose="020F0502020204030204" pitchFamily="34" charset="0"/>
+            </a:endParaRPr>
+          </a:p>
+          <a:p>
+            <a:pPr marL="342797" indent="-342797">
+              <a:spcBef>
+                <a:spcPts val="300"/>
+              </a:spcBef>
+              <a:buFont typeface="Wingdings" panose="05000000000000000000" pitchFamily="2" charset="2"/>
+              <a:buChar char="§"/>
+            </a:pPr>
+            <a:endParaRPr lang="en-US" sz="1600" kern="0" dirty="0">
+              <a:solidFill>
+                <a:srgbClr val="000000"/>
+              </a:solidFill>
+              <a:latin typeface="Calibri" panose="020F0502020204030204" pitchFamily="34" charset="0"/>
+              <a:ea typeface="Arial Unicode MS" pitchFamily="34" charset="-128"/>
+              <a:cs typeface="Calibri" panose="020F0502020204030204" pitchFamily="34" charset="0"/>
+            </a:endParaRPr>
           </a:p>
           <a:p>
             <a:pPr marL="342797" indent="-342797">
@@ -10603,10 +11000,40 @@
           </a:p>
         </p:txBody>
       </p:sp>
+      <p:pic>
+        <p:nvPicPr>
+          <p:cNvPr id="3" name="Picture 2">
+            <a:extLst>
+              <a:ext uri="{FF2B5EF4-FFF2-40B4-BE49-F238E27FC236}">
+                <a16:creationId xmlns:a16="http://schemas.microsoft.com/office/drawing/2014/main" id="{4FE0D669-6459-5646-AD78-84DBCB7C048B}"/>
+              </a:ext>
+            </a:extLst>
+          </p:cNvPr>
+          <p:cNvPicPr>
+            <a:picLocks noChangeAspect="1"/>
+          </p:cNvPicPr>
+          <p:nvPr/>
+        </p:nvPicPr>
+        <p:blipFill>
+          <a:blip r:embed="rId7"/>
+          <a:stretch>
+            <a:fillRect/>
+          </a:stretch>
+        </p:blipFill>
+        <p:spPr>
+          <a:xfrm>
+            <a:off x="3099237" y="2537717"/>
+            <a:ext cx="5992830" cy="4092191"/>
+          </a:xfrm>
+          <a:prstGeom prst="rect">
+            <a:avLst/>
+          </a:prstGeom>
+        </p:spPr>
+      </p:pic>
     </p:spTree>
     <p:extLst>
       <p:ext uri="{BB962C8B-B14F-4D97-AF65-F5344CB8AC3E}">
-        <p14:creationId xmlns:p14="http://schemas.microsoft.com/office/powerpoint/2010/main" val="3319757063"/>
+        <p14:creationId xmlns:p14="http://schemas.microsoft.com/office/powerpoint/2010/main" val="1110004769"/>
       </p:ext>
     </p:extLst>
   </p:cSld>
@@ -10616,107 +11043,7 @@
 </p:sld>
 </file>
 
-<file path=ppt/slides/slide3.xml><?xml version="1.0" encoding="utf-8"?>
-<p:sld xmlns:a="http://schemas.openxmlformats.org/drawingml/2006/main" xmlns:r="http://schemas.openxmlformats.org/officeDocument/2006/relationships" xmlns:p="http://schemas.openxmlformats.org/presentationml/2006/main">
-  <p:cSld>
-    <p:spTree>
-      <p:nvGrpSpPr>
-        <p:cNvPr id="1" name=""/>
-        <p:cNvGrpSpPr/>
-        <p:nvPr/>
-      </p:nvGrpSpPr>
-      <p:grpSpPr>
-        <a:xfrm>
-          <a:off x="0" y="0"/>
-          <a:ext cx="0" cy="0"/>
-          <a:chOff x="0" y="0"/>
-          <a:chExt cx="0" cy="0"/>
-        </a:xfrm>
-      </p:grpSpPr>
-      <p:sp>
-        <p:nvSpPr>
-          <p:cNvPr id="2" name="Title 1">
-            <a:extLst>
-              <a:ext uri="{FF2B5EF4-FFF2-40B4-BE49-F238E27FC236}">
-                <a16:creationId xmlns:a16="http://schemas.microsoft.com/office/drawing/2014/main" id="{7960BC16-D6FB-8743-8758-7402E2881808}"/>
-              </a:ext>
-            </a:extLst>
-          </p:cNvPr>
-          <p:cNvSpPr>
-            <a:spLocks noGrp="1"/>
-          </p:cNvSpPr>
-          <p:nvPr>
-            <p:ph type="title"/>
-          </p:nvPr>
-        </p:nvSpPr>
-        <p:spPr/>
-        <p:txBody>
-          <a:bodyPr/>
-          <a:lstStyle/>
-          <a:p>
-            <a:r>
-              <a:rPr lang="en-US" b="1" dirty="0"/>
-              <a:t>Problem Statement</a:t>
-            </a:r>
-          </a:p>
-        </p:txBody>
-      </p:sp>
-      <p:sp>
-        <p:nvSpPr>
-          <p:cNvPr id="3" name="Content Placeholder 2">
-            <a:extLst>
-              <a:ext uri="{FF2B5EF4-FFF2-40B4-BE49-F238E27FC236}">
-                <a16:creationId xmlns:a16="http://schemas.microsoft.com/office/drawing/2014/main" id="{97DAB1AF-9892-364C-8AE9-1C38EAE3A61A}"/>
-              </a:ext>
-            </a:extLst>
-          </p:cNvPr>
-          <p:cNvSpPr>
-            <a:spLocks noGrp="1"/>
-          </p:cNvSpPr>
-          <p:nvPr>
-            <p:ph idx="1"/>
-          </p:nvPr>
-        </p:nvSpPr>
-        <p:spPr/>
-        <p:txBody>
-          <a:bodyPr>
-            <a:normAutofit/>
-          </a:bodyPr>
-          <a:lstStyle/>
-          <a:p>
-            <a:r>
-              <a:rPr lang="en-US" dirty="0"/>
-              <a:t>The company is the largest online loan marketplace lending borrowers loans for personal, business and medical needs. </a:t>
-            </a:r>
-          </a:p>
-          <a:p>
-            <a:r>
-              <a:rPr lang="en-US" dirty="0"/>
-              <a:t>Lending loans to risky applicants is what contributes to the largest financial loss(credit loss) for the company</a:t>
-            </a:r>
-          </a:p>
-          <a:p>
-            <a:r>
-              <a:rPr lang="en-US" dirty="0"/>
-              <a:t>The company wants to understand the driving factors(variables) behind loan default so that credit loss can be reduced</a:t>
-            </a:r>
-          </a:p>
-        </p:txBody>
-      </p:sp>
-    </p:spTree>
-    <p:extLst>
-      <p:ext uri="{BB962C8B-B14F-4D97-AF65-F5344CB8AC3E}">
-        <p14:creationId xmlns:p14="http://schemas.microsoft.com/office/powerpoint/2010/main" val="4144966148"/>
-      </p:ext>
-    </p:extLst>
-  </p:cSld>
-  <p:clrMapOvr>
-    <a:masterClrMapping/>
-  </p:clrMapOvr>
-</p:sld>
-</file>
-
-<file path=ppt/slides/slide4.xml><?xml version="1.0" encoding="utf-8"?>
+<file path=ppt/slides/slide27.xml><?xml version="1.0" encoding="utf-8"?>
 <p:sld xmlns:a="http://schemas.openxmlformats.org/drawingml/2006/main" xmlns:r="http://schemas.openxmlformats.org/officeDocument/2006/relationships" xmlns:p="http://schemas.openxmlformats.org/presentationml/2006/main">
   <p:cSld>
     <p:spTree>
@@ -10759,7 +11086,7 @@
           <a:graphicData uri="http://schemas.openxmlformats.org/presentationml/2006/ole">
             <mc:AlternateContent xmlns:mc="http://schemas.openxmlformats.org/markup-compatibility/2006">
               <mc:Choice xmlns:v="urn:schemas-microsoft-com:vml" Requires="v">
-                <p:oleObj spid="_x0000_s1025" name="think-cell Slide" r:id="rId5" imgW="393" imgH="392" progId="TCLayout.ActiveDocument.1">
+                <p:oleObj spid="_x0000_s22531" name="think-cell Slide" r:id="rId5" imgW="393" imgH="392" progId="TCLayout.ActiveDocument.1">
                   <p:embed/>
                 </p:oleObj>
               </mc:Choice>
@@ -10865,61 +11192,6 @@
       </p:sp>
       <p:sp>
         <p:nvSpPr>
-          <p:cNvPr id="2" name="TextBox 1">
-            <a:extLst>
-              <a:ext uri="{FF2B5EF4-FFF2-40B4-BE49-F238E27FC236}">
-                <a16:creationId xmlns:a16="http://schemas.microsoft.com/office/drawing/2014/main" id="{7E337200-931B-4E92-8F8D-F240ED1AF166}"/>
-              </a:ext>
-            </a:extLst>
-          </p:cNvPr>
-          <p:cNvSpPr txBox="1"/>
-          <p:nvPr/>
-        </p:nvSpPr>
-        <p:spPr>
-          <a:xfrm>
-            <a:off x="503869" y="5652974"/>
-            <a:ext cx="11009631" cy="184666"/>
-          </a:xfrm>
-          <a:prstGeom prst="rect">
-            <a:avLst/>
-          </a:prstGeom>
-          <a:noFill/>
-        </p:spPr>
-        <p:txBody>
-          <a:bodyPr wrap="square" lIns="0" tIns="0" rIns="0" bIns="0" rtlCol="0">
-            <a:spAutoFit/>
-          </a:bodyPr>
-          <a:lstStyle/>
-          <a:p>
-            <a:pPr defTabSz="1088449" fontAlgn="base">
-              <a:spcBef>
-                <a:spcPct val="50000"/>
-              </a:spcBef>
-              <a:spcAft>
-                <a:spcPct val="0"/>
-              </a:spcAft>
-              <a:buClr>
-                <a:srgbClr val="F0AB00"/>
-              </a:buClr>
-              <a:buSzPct val="80000"/>
-              <a:defRPr/>
-            </a:pPr>
-            <a:r>
-              <a:rPr lang="en-US" sz="1200" i="1" kern="0" dirty="0">
-                <a:solidFill>
-                  <a:srgbClr val="000000"/>
-                </a:solidFill>
-                <a:latin typeface="Calibri" panose="020F0502020204030204" pitchFamily="34" charset="0"/>
-                <a:ea typeface="Arial Unicode MS" pitchFamily="34" charset="-128"/>
-                <a:cs typeface="Calibri" panose="020F0502020204030204" pitchFamily="34" charset="0"/>
-              </a:rPr>
-              <a:t>1111</a:t>
-            </a:r>
-          </a:p>
-        </p:txBody>
-      </p:sp>
-      <p:sp>
-        <p:nvSpPr>
           <p:cNvPr id="7" name="Title 1">
             <a:extLst>
               <a:ext uri="{FF2B5EF4-FFF2-40B4-BE49-F238E27FC236}">
@@ -10935,7 +11207,7 @@
         <p:spPr bwMode="black">
           <a:xfrm>
             <a:off x="505326" y="504761"/>
-            <a:ext cx="11180652" cy="738472"/>
+            <a:ext cx="11180652" cy="369204"/>
           </a:xfrm>
           <a:prstGeom prst="rect">
             <a:avLst/>
@@ -10972,14 +11244,8 @@
                 <a:latin typeface="Calibri" panose="020F0502020204030204" pitchFamily="34" charset="0"/>
                 <a:cs typeface="Calibri" panose="020F0502020204030204" pitchFamily="34" charset="0"/>
               </a:rPr>
-              <a:t>Univariate Analysis – Loan Amount</a:t>
-            </a:r>
-            <a:br>
-              <a:rPr lang="en-US" sz="2399" dirty="0">
-                <a:latin typeface="Calibri" panose="020F0502020204030204" pitchFamily="34" charset="0"/>
-                <a:cs typeface="Calibri" panose="020F0502020204030204" pitchFamily="34" charset="0"/>
-              </a:rPr>
-            </a:br>
+              <a:t>Bivariate Analysis – Home Ownership vs Purpose</a:t>
+            </a:r>
             <a:endParaRPr lang="en-US" sz="2399" b="0" dirty="0">
               <a:latin typeface="Calibri" panose="020F0502020204030204" pitchFamily="34" charset="0"/>
               <a:cs typeface="Calibri" panose="020F0502020204030204" pitchFamily="34" charset="0"/>
@@ -11001,8 +11267,8 @@
         </p:nvSpPr>
         <p:spPr bwMode="gray">
           <a:xfrm>
-            <a:off x="504218" y="1560862"/>
-            <a:ext cx="11009283" cy="1021297"/>
+            <a:off x="504218" y="1560863"/>
+            <a:ext cx="11009283" cy="1069322"/>
           </a:xfrm>
           <a:prstGeom prst="roundRect">
             <a:avLst>
@@ -11041,7 +11307,7 @@
                 <a:ea typeface="Arial Unicode MS" pitchFamily="34" charset="-128"/>
                 <a:cs typeface="Calibri" panose="020F0502020204030204" pitchFamily="34" charset="0"/>
               </a:rPr>
-              <a:t>1</a:t>
+              <a:t>Applicants with the purpose of small business tend to default more likely when home ownership is “RENT”,”OWN” and “OTHER”</a:t>
             </a:r>
           </a:p>
           <a:p>
@@ -11061,7 +11327,7 @@
                 <a:ea typeface="Arial Unicode MS" pitchFamily="34" charset="-128"/>
                 <a:cs typeface="Calibri" panose="020F0502020204030204" pitchFamily="34" charset="0"/>
               </a:rPr>
-              <a:t>2</a:t>
+              <a:t>Applicants with the purpose of car tend to default with home ownership as “OTHER”</a:t>
             </a:r>
           </a:p>
           <a:p>
@@ -11137,10 +11403,10 @@
       </p:sp>
       <p:pic>
         <p:nvPicPr>
-          <p:cNvPr id="11" name="Picture 10">
-            <a:extLst>
-              <a:ext uri="{FF2B5EF4-FFF2-40B4-BE49-F238E27FC236}">
-                <a16:creationId xmlns:a16="http://schemas.microsoft.com/office/drawing/2014/main" id="{D29F6B22-799D-C34D-9C89-0710227A310B}"/>
+          <p:cNvPr id="3" name="Picture 2">
+            <a:extLst>
+              <a:ext uri="{FF2B5EF4-FFF2-40B4-BE49-F238E27FC236}">
+                <a16:creationId xmlns:a16="http://schemas.microsoft.com/office/drawing/2014/main" id="{929A74CA-A5A9-554B-9A0C-BECA38E40BB0}"/>
               </a:ext>
             </a:extLst>
           </p:cNvPr>
@@ -11157,8 +11423,8 @@
         </p:blipFill>
         <p:spPr>
           <a:xfrm>
-            <a:off x="0" y="3060197"/>
-            <a:ext cx="3692981" cy="2431289"/>
+            <a:off x="3660321" y="2727644"/>
+            <a:ext cx="4871357" cy="3625595"/>
           </a:xfrm>
           <a:prstGeom prst="rect">
             <a:avLst/>
@@ -11168,7 +11434,7 @@
     </p:spTree>
     <p:extLst>
       <p:ext uri="{BB962C8B-B14F-4D97-AF65-F5344CB8AC3E}">
-        <p14:creationId xmlns:p14="http://schemas.microsoft.com/office/powerpoint/2010/main" val="1126751946"/>
+        <p14:creationId xmlns:p14="http://schemas.microsoft.com/office/powerpoint/2010/main" val="3572000508"/>
       </p:ext>
     </p:extLst>
   </p:cSld>
@@ -11178,7 +11444,98 @@
 </p:sld>
 </file>
 
-<file path=ppt/slides/slide5.xml><?xml version="1.0" encoding="utf-8"?>
+<file path=ppt/slides/slide28.xml><?xml version="1.0" encoding="utf-8"?>
+<p:sld xmlns:a="http://schemas.openxmlformats.org/drawingml/2006/main" xmlns:r="http://schemas.openxmlformats.org/officeDocument/2006/relationships" xmlns:p="http://schemas.openxmlformats.org/presentationml/2006/main">
+  <p:cSld>
+    <p:spTree>
+      <p:nvGrpSpPr>
+        <p:cNvPr id="1" name=""/>
+        <p:cNvGrpSpPr/>
+        <p:nvPr/>
+      </p:nvGrpSpPr>
+      <p:grpSpPr>
+        <a:xfrm>
+          <a:off x="0" y="0"/>
+          <a:ext cx="0" cy="0"/>
+          <a:chOff x="0" y="0"/>
+          <a:chExt cx="0" cy="0"/>
+        </a:xfrm>
+      </p:grpSpPr>
+      <p:sp>
+        <p:nvSpPr>
+          <p:cNvPr id="2" name="Title 1">
+            <a:extLst>
+              <a:ext uri="{FF2B5EF4-FFF2-40B4-BE49-F238E27FC236}">
+                <a16:creationId xmlns:a16="http://schemas.microsoft.com/office/drawing/2014/main" id="{7960BC16-D6FB-8743-8758-7402E2881808}"/>
+              </a:ext>
+            </a:extLst>
+          </p:cNvPr>
+          <p:cNvSpPr>
+            <a:spLocks noGrp="1"/>
+          </p:cNvSpPr>
+          <p:nvPr>
+            <p:ph type="title"/>
+          </p:nvPr>
+        </p:nvSpPr>
+        <p:spPr/>
+        <p:txBody>
+          <a:bodyPr/>
+          <a:lstStyle/>
+          <a:p>
+            <a:r>
+              <a:rPr lang="en-US" b="1" dirty="0"/>
+              <a:t>Conclusion</a:t>
+            </a:r>
+          </a:p>
+        </p:txBody>
+      </p:sp>
+      <p:sp>
+        <p:nvSpPr>
+          <p:cNvPr id="3" name="Content Placeholder 2">
+            <a:extLst>
+              <a:ext uri="{FF2B5EF4-FFF2-40B4-BE49-F238E27FC236}">
+                <a16:creationId xmlns:a16="http://schemas.microsoft.com/office/drawing/2014/main" id="{97DAB1AF-9892-364C-8AE9-1C38EAE3A61A}"/>
+              </a:ext>
+            </a:extLst>
+          </p:cNvPr>
+          <p:cNvSpPr>
+            <a:spLocks noGrp="1"/>
+          </p:cNvSpPr>
+          <p:nvPr>
+            <p:ph idx="1"/>
+          </p:nvPr>
+        </p:nvSpPr>
+        <p:spPr/>
+        <p:txBody>
+          <a:bodyPr>
+            <a:normAutofit/>
+          </a:bodyPr>
+          <a:lstStyle/>
+          <a:p>
+            <a:r>
+              <a:rPr lang="en-US" dirty="0"/>
+              <a:t>Strong Driving Variables</a:t>
+            </a:r>
+          </a:p>
+          <a:p>
+            <a:endParaRPr lang="en-US" dirty="0"/>
+          </a:p>
+        </p:txBody>
+      </p:sp>
+    </p:spTree>
+    <p:extLst>
+      <p:ext uri="{BB962C8B-B14F-4D97-AF65-F5344CB8AC3E}">
+        <p14:creationId xmlns:p14="http://schemas.microsoft.com/office/powerpoint/2010/main" val="2136417534"/>
+      </p:ext>
+    </p:extLst>
+  </p:cSld>
+  <p:clrMapOvr>
+    <a:masterClrMapping/>
+  </p:clrMapOvr>
+</p:sld>
+</file>
+
+<file path=ppt/slides/slide29.xml><?xml version="1.0" encoding="utf-8"?>
 <p:sld xmlns:a="http://schemas.openxmlformats.org/drawingml/2006/main" xmlns:r="http://schemas.openxmlformats.org/officeDocument/2006/relationships" xmlns:p="http://schemas.openxmlformats.org/presentationml/2006/main">
   <p:cSld>
     <p:spTree>
@@ -11221,7 +11578,7 @@
           <a:graphicData uri="http://schemas.openxmlformats.org/presentationml/2006/ole">
             <mc:AlternateContent xmlns:mc="http://schemas.openxmlformats.org/markup-compatibility/2006">
               <mc:Choice xmlns:v="urn:schemas-microsoft-com:vml" Requires="v">
-                <p:oleObj spid="_x0000_s2049" name="think-cell Slide" r:id="rId5" imgW="393" imgH="392" progId="TCLayout.ActiveDocument.1">
+                <p:oleObj spid="_x0000_s23555" name="think-cell Slide" r:id="rId5" imgW="393" imgH="392" progId="TCLayout.ActiveDocument.1">
                   <p:embed/>
                 </p:oleObj>
               </mc:Choice>
@@ -11327,6 +11684,61 @@
       </p:sp>
       <p:sp>
         <p:nvSpPr>
+          <p:cNvPr id="2" name="TextBox 1">
+            <a:extLst>
+              <a:ext uri="{FF2B5EF4-FFF2-40B4-BE49-F238E27FC236}">
+                <a16:creationId xmlns:a16="http://schemas.microsoft.com/office/drawing/2014/main" id="{7E337200-931B-4E92-8F8D-F240ED1AF166}"/>
+              </a:ext>
+            </a:extLst>
+          </p:cNvPr>
+          <p:cNvSpPr txBox="1"/>
+          <p:nvPr/>
+        </p:nvSpPr>
+        <p:spPr>
+          <a:xfrm>
+            <a:off x="503869" y="5652974"/>
+            <a:ext cx="11009631" cy="184666"/>
+          </a:xfrm>
+          <a:prstGeom prst="rect">
+            <a:avLst/>
+          </a:prstGeom>
+          <a:noFill/>
+        </p:spPr>
+        <p:txBody>
+          <a:bodyPr wrap="square" lIns="0" tIns="0" rIns="0" bIns="0" rtlCol="0">
+            <a:spAutoFit/>
+          </a:bodyPr>
+          <a:lstStyle/>
+          <a:p>
+            <a:pPr defTabSz="1088449" fontAlgn="base">
+              <a:spcBef>
+                <a:spcPct val="50000"/>
+              </a:spcBef>
+              <a:spcAft>
+                <a:spcPct val="0"/>
+              </a:spcAft>
+              <a:buClr>
+                <a:srgbClr val="F0AB00"/>
+              </a:buClr>
+              <a:buSzPct val="80000"/>
+              <a:defRPr/>
+            </a:pPr>
+            <a:r>
+              <a:rPr lang="en-US" sz="1200" i="1" kern="0" dirty="0">
+                <a:solidFill>
+                  <a:srgbClr val="000000"/>
+                </a:solidFill>
+                <a:latin typeface="Calibri" panose="020F0502020204030204" pitchFamily="34" charset="0"/>
+                <a:ea typeface="Arial Unicode MS" pitchFamily="34" charset="-128"/>
+                <a:cs typeface="Calibri" panose="020F0502020204030204" pitchFamily="34" charset="0"/>
+              </a:rPr>
+              <a:t>1111</a:t>
+            </a:r>
+          </a:p>
+        </p:txBody>
+      </p:sp>
+      <p:sp>
+        <p:nvSpPr>
           <p:cNvPr id="7" name="Title 1">
             <a:extLst>
               <a:ext uri="{FF2B5EF4-FFF2-40B4-BE49-F238E27FC236}">
@@ -11342,7 +11754,7 @@
         <p:spPr bwMode="black">
           <a:xfrm>
             <a:off x="505326" y="504761"/>
-            <a:ext cx="11180652" cy="738472"/>
+            <a:ext cx="11180652" cy="369204"/>
           </a:xfrm>
           <a:prstGeom prst="rect">
             <a:avLst/>
@@ -11379,14 +11791,8 @@
                 <a:latin typeface="Calibri" panose="020F0502020204030204" pitchFamily="34" charset="0"/>
                 <a:cs typeface="Calibri" panose="020F0502020204030204" pitchFamily="34" charset="0"/>
               </a:rPr>
-              <a:t>Segmented Univariate Analysis – Loan Amount</a:t>
-            </a:r>
-            <a:br>
-              <a:rPr lang="en-US" sz="2399" dirty="0">
-                <a:latin typeface="Calibri" panose="020F0502020204030204" pitchFamily="34" charset="0"/>
-                <a:cs typeface="Calibri" panose="020F0502020204030204" pitchFamily="34" charset="0"/>
-              </a:rPr>
-            </a:br>
+              <a:t>Template</a:t>
+            </a:r>
             <a:endParaRPr lang="en-US" sz="2399" b="0" dirty="0">
               <a:latin typeface="Calibri" panose="020F0502020204030204" pitchFamily="34" charset="0"/>
               <a:cs typeface="Calibri" panose="020F0502020204030204" pitchFamily="34" charset="0"/>
@@ -11409,7 +11815,7 @@
         <p:spPr bwMode="gray">
           <a:xfrm>
             <a:off x="504218" y="1560862"/>
-            <a:ext cx="11009283" cy="828377"/>
+            <a:ext cx="11009283" cy="1021297"/>
           </a:xfrm>
           <a:prstGeom prst="roundRect">
             <a:avLst>
@@ -11448,7 +11854,27 @@
                 <a:ea typeface="Arial Unicode MS" pitchFamily="34" charset="-128"/>
                 <a:cs typeface="Calibri" panose="020F0502020204030204" pitchFamily="34" charset="0"/>
               </a:rPr>
-              <a:t>Applicants requesting for higher loan amount tend to default more than those who are requesting lesser loan amount</a:t>
+              <a:t>1</a:t>
+            </a:r>
+          </a:p>
+          <a:p>
+            <a:pPr marL="342797" indent="-342797">
+              <a:spcBef>
+                <a:spcPts val="300"/>
+              </a:spcBef>
+              <a:buFont typeface="Wingdings" panose="05000000000000000000" pitchFamily="2" charset="2"/>
+              <a:buChar char="§"/>
+            </a:pPr>
+            <a:r>
+              <a:rPr lang="en-US" sz="1600" kern="0" dirty="0">
+                <a:solidFill>
+                  <a:srgbClr val="000000"/>
+                </a:solidFill>
+                <a:latin typeface="Calibri" panose="020F0502020204030204" pitchFamily="34" charset="0"/>
+                <a:ea typeface="Arial Unicode MS" pitchFamily="34" charset="-128"/>
+                <a:cs typeface="Calibri" panose="020F0502020204030204" pitchFamily="34" charset="0"/>
+              </a:rPr>
+              <a:t>2</a:t>
             </a:r>
           </a:p>
           <a:p>
@@ -11522,40 +11948,10 @@
           </a:p>
         </p:txBody>
       </p:sp>
-      <p:pic>
-        <p:nvPicPr>
-          <p:cNvPr id="13" name="Picture 12">
-            <a:extLst>
-              <a:ext uri="{FF2B5EF4-FFF2-40B4-BE49-F238E27FC236}">
-                <a16:creationId xmlns:a16="http://schemas.microsoft.com/office/drawing/2014/main" id="{632A6595-8355-A149-867D-E33744E9C413}"/>
-              </a:ext>
-            </a:extLst>
-          </p:cNvPr>
-          <p:cNvPicPr>
-            <a:picLocks noChangeAspect="1"/>
-          </p:cNvPicPr>
-          <p:nvPr/>
-        </p:nvPicPr>
-        <p:blipFill>
-          <a:blip r:embed="rId7"/>
-          <a:stretch>
-            <a:fillRect/>
-          </a:stretch>
-        </p:blipFill>
-        <p:spPr>
-          <a:xfrm>
-            <a:off x="2133252" y="2582159"/>
-            <a:ext cx="7924800" cy="4229100"/>
-          </a:xfrm>
-          <a:prstGeom prst="rect">
-            <a:avLst/>
-          </a:prstGeom>
-        </p:spPr>
-      </p:pic>
     </p:spTree>
     <p:extLst>
       <p:ext uri="{BB962C8B-B14F-4D97-AF65-F5344CB8AC3E}">
-        <p14:creationId xmlns:p14="http://schemas.microsoft.com/office/powerpoint/2010/main" val="2152113646"/>
+        <p14:creationId xmlns:p14="http://schemas.microsoft.com/office/powerpoint/2010/main" val="3319757063"/>
       </p:ext>
     </p:extLst>
   </p:cSld>
@@ -11565,7 +11961,107 @@
 </p:sld>
 </file>
 
-<file path=ppt/slides/slide6.xml><?xml version="1.0" encoding="utf-8"?>
+<file path=ppt/slides/slide3.xml><?xml version="1.0" encoding="utf-8"?>
+<p:sld xmlns:a="http://schemas.openxmlformats.org/drawingml/2006/main" xmlns:r="http://schemas.openxmlformats.org/officeDocument/2006/relationships" xmlns:p="http://schemas.openxmlformats.org/presentationml/2006/main">
+  <p:cSld>
+    <p:spTree>
+      <p:nvGrpSpPr>
+        <p:cNvPr id="1" name=""/>
+        <p:cNvGrpSpPr/>
+        <p:nvPr/>
+      </p:nvGrpSpPr>
+      <p:grpSpPr>
+        <a:xfrm>
+          <a:off x="0" y="0"/>
+          <a:ext cx="0" cy="0"/>
+          <a:chOff x="0" y="0"/>
+          <a:chExt cx="0" cy="0"/>
+        </a:xfrm>
+      </p:grpSpPr>
+      <p:sp>
+        <p:nvSpPr>
+          <p:cNvPr id="2" name="Title 1">
+            <a:extLst>
+              <a:ext uri="{FF2B5EF4-FFF2-40B4-BE49-F238E27FC236}">
+                <a16:creationId xmlns:a16="http://schemas.microsoft.com/office/drawing/2014/main" id="{7960BC16-D6FB-8743-8758-7402E2881808}"/>
+              </a:ext>
+            </a:extLst>
+          </p:cNvPr>
+          <p:cNvSpPr>
+            <a:spLocks noGrp="1"/>
+          </p:cNvSpPr>
+          <p:nvPr>
+            <p:ph type="title"/>
+          </p:nvPr>
+        </p:nvSpPr>
+        <p:spPr/>
+        <p:txBody>
+          <a:bodyPr/>
+          <a:lstStyle/>
+          <a:p>
+            <a:r>
+              <a:rPr lang="en-US" b="1" dirty="0"/>
+              <a:t>Problem Statement</a:t>
+            </a:r>
+          </a:p>
+        </p:txBody>
+      </p:sp>
+      <p:sp>
+        <p:nvSpPr>
+          <p:cNvPr id="3" name="Content Placeholder 2">
+            <a:extLst>
+              <a:ext uri="{FF2B5EF4-FFF2-40B4-BE49-F238E27FC236}">
+                <a16:creationId xmlns:a16="http://schemas.microsoft.com/office/drawing/2014/main" id="{97DAB1AF-9892-364C-8AE9-1C38EAE3A61A}"/>
+              </a:ext>
+            </a:extLst>
+          </p:cNvPr>
+          <p:cNvSpPr>
+            <a:spLocks noGrp="1"/>
+          </p:cNvSpPr>
+          <p:nvPr>
+            <p:ph idx="1"/>
+          </p:nvPr>
+        </p:nvSpPr>
+        <p:spPr/>
+        <p:txBody>
+          <a:bodyPr>
+            <a:normAutofit/>
+          </a:bodyPr>
+          <a:lstStyle/>
+          <a:p>
+            <a:r>
+              <a:rPr lang="en-US" dirty="0"/>
+              <a:t>The company is the largest online loan marketplace lending borrowers loans for personal, business and medical needs. </a:t>
+            </a:r>
+          </a:p>
+          <a:p>
+            <a:r>
+              <a:rPr lang="en-US" dirty="0"/>
+              <a:t>Lending loans to risky applicants is what contributes to the largest financial loss(credit loss) for the company</a:t>
+            </a:r>
+          </a:p>
+          <a:p>
+            <a:r>
+              <a:rPr lang="en-US" dirty="0"/>
+              <a:t>The company wants to understand the driving factors(variables) behind loan default so that credit loss can be reduced</a:t>
+            </a:r>
+          </a:p>
+        </p:txBody>
+      </p:sp>
+    </p:spTree>
+    <p:extLst>
+      <p:ext uri="{BB962C8B-B14F-4D97-AF65-F5344CB8AC3E}">
+        <p14:creationId xmlns:p14="http://schemas.microsoft.com/office/powerpoint/2010/main" val="4144966148"/>
+      </p:ext>
+    </p:extLst>
+  </p:cSld>
+  <p:clrMapOvr>
+    <a:masterClrMapping/>
+  </p:clrMapOvr>
+</p:sld>
+</file>
+
+<file path=ppt/slides/slide4.xml><?xml version="1.0" encoding="utf-8"?>
 <p:sld xmlns:a="http://schemas.openxmlformats.org/drawingml/2006/main" xmlns:r="http://schemas.openxmlformats.org/officeDocument/2006/relationships" xmlns:p="http://schemas.openxmlformats.org/presentationml/2006/main">
   <p:cSld>
     <p:spTree>
@@ -11608,7 +12104,7 @@
           <a:graphicData uri="http://schemas.openxmlformats.org/presentationml/2006/ole">
             <mc:AlternateContent xmlns:mc="http://schemas.openxmlformats.org/markup-compatibility/2006">
               <mc:Choice xmlns:v="urn:schemas-microsoft-com:vml" Requires="v">
-                <p:oleObj spid="_x0000_s3073" name="think-cell Slide" r:id="rId5" imgW="393" imgH="392" progId="TCLayout.ActiveDocument.1">
+                <p:oleObj spid="_x0000_s30722" name="think-cell Slide" r:id="rId5" imgW="393" imgH="392" progId="TCLayout.ActiveDocument.1">
                   <p:embed/>
                 </p:oleObj>
               </mc:Choice>
@@ -11766,7 +12262,7 @@
                 <a:latin typeface="Calibri" panose="020F0502020204030204" pitchFamily="34" charset="0"/>
                 <a:cs typeface="Calibri" panose="020F0502020204030204" pitchFamily="34" charset="0"/>
               </a:rPr>
-              <a:t>Segmented Univariate Analysis – Funded Amount</a:t>
+              <a:t>Univariate Analysis – Loan Amount, Term, Employment Length</a:t>
             </a:r>
             <a:br>
               <a:rPr lang="en-US" sz="2399" dirty="0">
@@ -11795,8 +12291,8 @@
         </p:nvSpPr>
         <p:spPr bwMode="gray">
           <a:xfrm>
-            <a:off x="504218" y="1560863"/>
-            <a:ext cx="11009283" cy="818544"/>
+            <a:off x="504218" y="1243234"/>
+            <a:ext cx="11009283" cy="1322986"/>
           </a:xfrm>
           <a:prstGeom prst="roundRect">
             <a:avLst>
@@ -11835,7 +12331,7 @@
                 <a:ea typeface="Arial Unicode MS" pitchFamily="34" charset="-128"/>
                 <a:cs typeface="Calibri" panose="020F0502020204030204" pitchFamily="34" charset="0"/>
               </a:rPr>
-              <a:t>Applicants granted with higher funded amount tend to default more than those who got lesser funded amount</a:t>
+              <a:t>75% of the loan amount requested is within 15000</a:t>
             </a:r>
           </a:p>
           <a:p>
@@ -11846,14 +12342,37 @@
               <a:buFont typeface="Wingdings" panose="05000000000000000000" pitchFamily="2" charset="2"/>
               <a:buChar char="§"/>
             </a:pPr>
-            <a:endParaRPr lang="en-US" sz="1600" kern="0" dirty="0">
-              <a:solidFill>
-                <a:srgbClr val="000000"/>
-              </a:solidFill>
-              <a:latin typeface="Calibri" panose="020F0502020204030204" pitchFamily="34" charset="0"/>
-              <a:ea typeface="Arial Unicode MS" pitchFamily="34" charset="-128"/>
-              <a:cs typeface="Calibri" panose="020F0502020204030204" pitchFamily="34" charset="0"/>
-            </a:endParaRPr>
+            <a:r>
+              <a:rPr lang="en-US" sz="1600" kern="0" dirty="0">
+                <a:solidFill>
+                  <a:srgbClr val="000000"/>
+                </a:solidFill>
+                <a:latin typeface="Calibri" panose="020F0502020204030204" pitchFamily="34" charset="0"/>
+                <a:ea typeface="Arial Unicode MS" pitchFamily="34" charset="-128"/>
+                <a:cs typeface="Calibri" panose="020F0502020204030204" pitchFamily="34" charset="0"/>
+              </a:rPr>
+              <a:t>About 75% of the loan is requested/granted for the term of 36 months</a:t>
+            </a:r>
+          </a:p>
+          <a:p>
+            <a:pPr marL="342797" indent="-342797">
+              <a:spcBef>
+                <a:spcPts val="300"/>
+              </a:spcBef>
+              <a:buFont typeface="Wingdings" panose="05000000000000000000" pitchFamily="2" charset="2"/>
+              <a:buChar char="§"/>
+            </a:pPr>
+            <a:r>
+              <a:rPr lang="en-US" sz="1600" kern="0" dirty="0">
+                <a:solidFill>
+                  <a:srgbClr val="000000"/>
+                </a:solidFill>
+                <a:latin typeface="Calibri" panose="020F0502020204030204" pitchFamily="34" charset="0"/>
+                <a:ea typeface="Arial Unicode MS" pitchFamily="34" charset="-128"/>
+                <a:cs typeface="Calibri" panose="020F0502020204030204" pitchFamily="34" charset="0"/>
+              </a:rPr>
+              <a:t>Majority of the loan applicants have employment length of 10+ years</a:t>
+            </a:r>
           </a:p>
           <a:p>
             <a:pPr marL="342797" indent="-342797">
@@ -11884,7 +12403,7 @@
         </p:nvSpPr>
         <p:spPr>
           <a:xfrm>
-            <a:off x="607375" y="1440814"/>
+            <a:off x="607375" y="1123185"/>
             <a:ext cx="1347226" cy="276927"/>
           </a:xfrm>
           <a:prstGeom prst="rect">
@@ -11928,10 +12447,10 @@
       </p:sp>
       <p:pic>
         <p:nvPicPr>
-          <p:cNvPr id="6" name="Picture 5">
-            <a:extLst>
-              <a:ext uri="{FF2B5EF4-FFF2-40B4-BE49-F238E27FC236}">
-                <a16:creationId xmlns:a16="http://schemas.microsoft.com/office/drawing/2014/main" id="{81E61C1D-6E5B-EE4B-AF7C-B7CCD05148A9}"/>
+          <p:cNvPr id="11" name="Picture 10">
+            <a:extLst>
+              <a:ext uri="{FF2B5EF4-FFF2-40B4-BE49-F238E27FC236}">
+                <a16:creationId xmlns:a16="http://schemas.microsoft.com/office/drawing/2014/main" id="{D29F6B22-799D-C34D-9C89-0710227A310B}"/>
               </a:ext>
             </a:extLst>
           </p:cNvPr>
@@ -11948,8 +12467,68 @@
         </p:blipFill>
         <p:spPr>
           <a:xfrm>
-            <a:off x="2133600" y="2499456"/>
-            <a:ext cx="7924800" cy="4229100"/>
+            <a:off x="0" y="3060197"/>
+            <a:ext cx="3692981" cy="2431289"/>
+          </a:xfrm>
+          <a:prstGeom prst="rect">
+            <a:avLst/>
+          </a:prstGeom>
+        </p:spPr>
+      </p:pic>
+      <p:pic>
+        <p:nvPicPr>
+          <p:cNvPr id="6" name="Picture 5">
+            <a:extLst>
+              <a:ext uri="{FF2B5EF4-FFF2-40B4-BE49-F238E27FC236}">
+                <a16:creationId xmlns:a16="http://schemas.microsoft.com/office/drawing/2014/main" id="{9CCC2D11-EE9E-3142-A2D1-9A4BA8B805C6}"/>
+              </a:ext>
+            </a:extLst>
+          </p:cNvPr>
+          <p:cNvPicPr>
+            <a:picLocks noChangeAspect="1"/>
+          </p:cNvPicPr>
+          <p:nvPr/>
+        </p:nvPicPr>
+        <p:blipFill>
+          <a:blip r:embed="rId8"/>
+          <a:stretch>
+            <a:fillRect/>
+          </a:stretch>
+        </p:blipFill>
+        <p:spPr>
+          <a:xfrm>
+            <a:off x="4057980" y="3060197"/>
+            <a:ext cx="3692981" cy="2431289"/>
+          </a:xfrm>
+          <a:prstGeom prst="rect">
+            <a:avLst/>
+          </a:prstGeom>
+        </p:spPr>
+      </p:pic>
+      <p:pic>
+        <p:nvPicPr>
+          <p:cNvPr id="12" name="Picture 11">
+            <a:extLst>
+              <a:ext uri="{FF2B5EF4-FFF2-40B4-BE49-F238E27FC236}">
+                <a16:creationId xmlns:a16="http://schemas.microsoft.com/office/drawing/2014/main" id="{39700231-C82C-B24B-AE92-06CEF80FEB9B}"/>
+              </a:ext>
+            </a:extLst>
+          </p:cNvPr>
+          <p:cNvPicPr>
+            <a:picLocks noChangeAspect="1"/>
+          </p:cNvPicPr>
+          <p:nvPr/>
+        </p:nvPicPr>
+        <p:blipFill>
+          <a:blip r:embed="rId9"/>
+          <a:stretch>
+            <a:fillRect/>
+          </a:stretch>
+        </p:blipFill>
+        <p:spPr>
+          <a:xfrm>
+            <a:off x="8115960" y="3060197"/>
+            <a:ext cx="3397541" cy="2431289"/>
           </a:xfrm>
           <a:prstGeom prst="rect">
             <a:avLst/>
@@ -11959,7 +12538,7 @@
     </p:spTree>
     <p:extLst>
       <p:ext uri="{BB962C8B-B14F-4D97-AF65-F5344CB8AC3E}">
-        <p14:creationId xmlns:p14="http://schemas.microsoft.com/office/powerpoint/2010/main" val="3617943556"/>
+        <p14:creationId xmlns:p14="http://schemas.microsoft.com/office/powerpoint/2010/main" val="511994705"/>
       </p:ext>
     </p:extLst>
   </p:cSld>
@@ -11969,7 +12548,7 @@
 </p:sld>
 </file>
 
-<file path=ppt/slides/slide7.xml><?xml version="1.0" encoding="utf-8"?>
+<file path=ppt/slides/slide5.xml><?xml version="1.0" encoding="utf-8"?>
 <p:sld xmlns:a="http://schemas.openxmlformats.org/drawingml/2006/main" xmlns:r="http://schemas.openxmlformats.org/officeDocument/2006/relationships" xmlns:p="http://schemas.openxmlformats.org/presentationml/2006/main">
   <p:cSld>
     <p:spTree>
@@ -12012,7 +12591,7 @@
           <a:graphicData uri="http://schemas.openxmlformats.org/presentationml/2006/ole">
             <mc:AlternateContent xmlns:mc="http://schemas.openxmlformats.org/markup-compatibility/2006">
               <mc:Choice xmlns:v="urn:schemas-microsoft-com:vml" Requires="v">
-                <p:oleObj spid="_x0000_s4097" name="think-cell Slide" r:id="rId5" imgW="393" imgH="392" progId="TCLayout.ActiveDocument.1">
+                <p:oleObj spid="_x0000_s1027" name="think-cell Slide" r:id="rId5" imgW="393" imgH="392" progId="TCLayout.ActiveDocument.1">
                   <p:embed/>
                 </p:oleObj>
               </mc:Choice>
@@ -12170,7 +12749,7 @@
                 <a:latin typeface="Calibri" panose="020F0502020204030204" pitchFamily="34" charset="0"/>
                 <a:cs typeface="Calibri" panose="020F0502020204030204" pitchFamily="34" charset="0"/>
               </a:rPr>
-              <a:t>Segmented Univariate Analysis – Loan Term</a:t>
+              <a:t>Univariate Analysis – Home Ownership, Verification Status, Purpose</a:t>
             </a:r>
             <a:br>
               <a:rPr lang="en-US" sz="2399" dirty="0">
@@ -12199,8 +12778,8 @@
         </p:nvSpPr>
         <p:spPr bwMode="gray">
           <a:xfrm>
-            <a:off x="504218" y="1560863"/>
-            <a:ext cx="11009283" cy="818544"/>
+            <a:off x="504218" y="1243234"/>
+            <a:ext cx="11009283" cy="1155837"/>
           </a:xfrm>
           <a:prstGeom prst="roundRect">
             <a:avLst>
@@ -12239,7 +12818,27 @@
                 <a:ea typeface="Arial Unicode MS" pitchFamily="34" charset="-128"/>
                 <a:cs typeface="Calibri" panose="020F0502020204030204" pitchFamily="34" charset="0"/>
               </a:rPr>
-              <a:t>Applicants who opted for higher term (60 months) tend to default more than those who opted for 36 months term</a:t>
+              <a:t>About 48% and 44% of the loan applicants have respectively RENT and MORTGAGE as their home ownership</a:t>
+            </a:r>
+          </a:p>
+          <a:p>
+            <a:pPr marL="342797" indent="-342797">
+              <a:spcBef>
+                <a:spcPts val="300"/>
+              </a:spcBef>
+              <a:buFont typeface="Wingdings" panose="05000000000000000000" pitchFamily="2" charset="2"/>
+              <a:buChar char="§"/>
+            </a:pPr>
+            <a:r>
+              <a:rPr lang="en-US" sz="1600" kern="0" dirty="0">
+                <a:solidFill>
+                  <a:srgbClr val="000000"/>
+                </a:solidFill>
+                <a:latin typeface="Calibri" panose="020F0502020204030204" pitchFamily="34" charset="0"/>
+                <a:ea typeface="Arial Unicode MS" pitchFamily="34" charset="-128"/>
+                <a:cs typeface="Calibri" panose="020F0502020204030204" pitchFamily="34" charset="0"/>
+              </a:rPr>
+              <a:t>About 43% of the loan applicants income were not verified</a:t>
             </a:r>
           </a:p>
           <a:p>
@@ -12271,7 +12870,7 @@
         </p:nvSpPr>
         <p:spPr>
           <a:xfrm>
-            <a:off x="607375" y="1440814"/>
+            <a:off x="607375" y="1123185"/>
             <a:ext cx="1347226" cy="276927"/>
           </a:xfrm>
           <a:prstGeom prst="rect">
@@ -12315,10 +12914,10 @@
       </p:sp>
       <p:pic>
         <p:nvPicPr>
-          <p:cNvPr id="6" name="Picture 5">
-            <a:extLst>
-              <a:ext uri="{FF2B5EF4-FFF2-40B4-BE49-F238E27FC236}">
-                <a16:creationId xmlns:a16="http://schemas.microsoft.com/office/drawing/2014/main" id="{738E8BE2-1477-DB4B-AF28-6A06D7798583}"/>
+          <p:cNvPr id="14" name="Picture 13">
+            <a:extLst>
+              <a:ext uri="{FF2B5EF4-FFF2-40B4-BE49-F238E27FC236}">
+                <a16:creationId xmlns:a16="http://schemas.microsoft.com/office/drawing/2014/main" id="{0ED03D95-8D98-4F4B-9F85-8448DC9A7A22}"/>
               </a:ext>
             </a:extLst>
           </p:cNvPr>
@@ -12335,8 +12934,38 @@
         </p:blipFill>
         <p:spPr>
           <a:xfrm>
-            <a:off x="2122659" y="2582159"/>
-            <a:ext cx="7772400" cy="4229100"/>
+            <a:off x="853182" y="3103693"/>
+            <a:ext cx="4441955" cy="3079460"/>
+          </a:xfrm>
+          <a:prstGeom prst="rect">
+            <a:avLst/>
+          </a:prstGeom>
+        </p:spPr>
+      </p:pic>
+      <p:pic>
+        <p:nvPicPr>
+          <p:cNvPr id="16" name="Picture 15">
+            <a:extLst>
+              <a:ext uri="{FF2B5EF4-FFF2-40B4-BE49-F238E27FC236}">
+                <a16:creationId xmlns:a16="http://schemas.microsoft.com/office/drawing/2014/main" id="{A7BD7AEE-3B89-3B46-8D98-EE3FB75BCBC0}"/>
+              </a:ext>
+            </a:extLst>
+          </p:cNvPr>
+          <p:cNvPicPr>
+            <a:picLocks noChangeAspect="1"/>
+          </p:cNvPicPr>
+          <p:nvPr/>
+        </p:nvPicPr>
+        <p:blipFill>
+          <a:blip r:embed="rId8"/>
+          <a:stretch>
+            <a:fillRect/>
+          </a:stretch>
+        </p:blipFill>
+        <p:spPr>
+          <a:xfrm>
+            <a:off x="6383360" y="3103693"/>
+            <a:ext cx="4441956" cy="3079460"/>
           </a:xfrm>
           <a:prstGeom prst="rect">
             <a:avLst/>
@@ -12346,7 +12975,7 @@
     </p:spTree>
     <p:extLst>
       <p:ext uri="{BB962C8B-B14F-4D97-AF65-F5344CB8AC3E}">
-        <p14:creationId xmlns:p14="http://schemas.microsoft.com/office/powerpoint/2010/main" val="1668626057"/>
+        <p14:creationId xmlns:p14="http://schemas.microsoft.com/office/powerpoint/2010/main" val="1126751946"/>
       </p:ext>
     </p:extLst>
   </p:cSld>
@@ -12356,7 +12985,7 @@
 </p:sld>
 </file>
 
-<file path=ppt/slides/slide8.xml><?xml version="1.0" encoding="utf-8"?>
+<file path=ppt/slides/slide6.xml><?xml version="1.0" encoding="utf-8"?>
 <p:sld xmlns:a="http://schemas.openxmlformats.org/drawingml/2006/main" xmlns:r="http://schemas.openxmlformats.org/officeDocument/2006/relationships" xmlns:p="http://schemas.openxmlformats.org/presentationml/2006/main">
   <p:cSld>
     <p:spTree>
@@ -12399,7 +13028,385 @@
           <a:graphicData uri="http://schemas.openxmlformats.org/presentationml/2006/ole">
             <mc:AlternateContent xmlns:mc="http://schemas.openxmlformats.org/markup-compatibility/2006">
               <mc:Choice xmlns:v="urn:schemas-microsoft-com:vml" Requires="v">
-                <p:oleObj spid="_x0000_s5121" name="think-cell Slide" r:id="rId5" imgW="393" imgH="392" progId="TCLayout.ActiveDocument.1">
+                <p:oleObj spid="_x0000_s31746" name="think-cell Slide" r:id="rId6" imgW="393" imgH="392" progId="TCLayout.ActiveDocument.1">
+                  <p:embed/>
+                </p:oleObj>
+              </mc:Choice>
+              <mc:Fallback>
+                <p:oleObj name="think-cell Slide" r:id="rId6" imgW="393" imgH="392" progId="TCLayout.ActiveDocument.1">
+                  <p:embed/>
+                  <p:pic>
+                    <p:nvPicPr>
+                      <p:cNvPr id="4" name="Object 3" hidden="1">
+                        <a:extLst>
+                          <a:ext uri="{FF2B5EF4-FFF2-40B4-BE49-F238E27FC236}">
+                            <a16:creationId xmlns:a16="http://schemas.microsoft.com/office/drawing/2014/main" id="{17E080A6-0EB0-4875-8C2C-9B9D70A8AA04}"/>
+                          </a:ext>
+                        </a:extLst>
+                      </p:cNvPr>
+                      <p:cNvPicPr/>
+                      <p:nvPr/>
+                    </p:nvPicPr>
+                    <p:blipFill>
+                      <a:blip r:embed="rId7"/>
+                      <a:stretch>
+                        <a:fillRect/>
+                      </a:stretch>
+                    </p:blipFill>
+                    <p:spPr>
+                      <a:xfrm>
+                        <a:off x="1588" y="2480"/>
+                        <a:ext cx="1588" cy="1588"/>
+                      </a:xfrm>
+                      <a:prstGeom prst="rect">
+                        <a:avLst/>
+                      </a:prstGeom>
+                    </p:spPr>
+                  </p:pic>
+                </p:oleObj>
+              </mc:Fallback>
+            </mc:AlternateContent>
+          </a:graphicData>
+        </a:graphic>
+      </p:graphicFrame>
+      <p:sp>
+        <p:nvSpPr>
+          <p:cNvPr id="5" name="Rectangle 4" hidden="1">
+            <a:extLst>
+              <a:ext uri="{FF2B5EF4-FFF2-40B4-BE49-F238E27FC236}">
+                <a16:creationId xmlns:a16="http://schemas.microsoft.com/office/drawing/2014/main" id="{C14CF94A-B426-437F-8C21-50E65B5740C9}"/>
+              </a:ext>
+            </a:extLst>
+          </p:cNvPr>
+          <p:cNvSpPr/>
+          <p:nvPr>
+            <p:custDataLst>
+              <p:tags r:id="rId3"/>
+            </p:custDataLst>
+          </p:nvPr>
+        </p:nvSpPr>
+        <p:spPr bwMode="gray">
+          <a:xfrm>
+            <a:off x="0" y="893"/>
+            <a:ext cx="158709" cy="158709"/>
+          </a:xfrm>
+          <a:prstGeom prst="rect">
+            <a:avLst/>
+          </a:prstGeom>
+          <a:noFill/>
+          <a:ln w="25400" algn="ctr">
+            <a:solidFill>
+              <a:schemeClr val="tx1"/>
+            </a:solidFill>
+            <a:miter lim="800000"/>
+            <a:headEnd/>
+            <a:tailEnd/>
+          </a:ln>
+        </p:spPr>
+        <p:txBody>
+          <a:bodyPr vert="horz" wrap="none" lIns="0" tIns="0" rIns="0" bIns="0" numCol="1" spcCol="0" rtlCol="0" anchor="ctr" anchorCtr="0">
+            <a:noAutofit/>
+          </a:bodyPr>
+          <a:lstStyle/>
+          <a:p>
+            <a:pPr algn="ctr" defTabSz="914126" fontAlgn="base">
+              <a:spcBef>
+                <a:spcPct val="50000"/>
+              </a:spcBef>
+              <a:spcAft>
+                <a:spcPct val="0"/>
+              </a:spcAft>
+              <a:buClr>
+                <a:srgbClr val="F0AB00"/>
+              </a:buClr>
+              <a:buSzPct val="80000"/>
+              <a:defRPr/>
+            </a:pPr>
+            <a:endParaRPr lang="en-US" sz="2399" kern="0" err="1">
+              <a:solidFill>
+                <a:srgbClr val="000000"/>
+              </a:solidFill>
+              <a:latin typeface="Arial" panose="020B0604020202020204" pitchFamily="34" charset="0"/>
+              <a:sym typeface="Arial" panose="020B0604020202020204" pitchFamily="34" charset="0"/>
+            </a:endParaRPr>
+          </a:p>
+        </p:txBody>
+      </p:sp>
+      <p:sp>
+        <p:nvSpPr>
+          <p:cNvPr id="7" name="Title 1">
+            <a:extLst>
+              <a:ext uri="{FF2B5EF4-FFF2-40B4-BE49-F238E27FC236}">
+                <a16:creationId xmlns:a16="http://schemas.microsoft.com/office/drawing/2014/main" id="{3F009492-A00F-402C-8C17-EB4A4283B3C5}"/>
+              </a:ext>
+            </a:extLst>
+          </p:cNvPr>
+          <p:cNvSpPr txBox="1">
+            <a:spLocks/>
+          </p:cNvSpPr>
+          <p:nvPr/>
+        </p:nvSpPr>
+        <p:spPr bwMode="black">
+          <a:xfrm>
+            <a:off x="505326" y="504761"/>
+            <a:ext cx="11180652" cy="738472"/>
+          </a:xfrm>
+          <a:prstGeom prst="rect">
+            <a:avLst/>
+          </a:prstGeom>
+        </p:spPr>
+        <p:txBody>
+          <a:bodyPr vert="horz" wrap="square" lIns="0" tIns="0" rIns="0" bIns="0" rtlCol="0" anchor="t" anchorCtr="0">
+            <a:spAutoFit/>
+          </a:bodyPr>
+          <a:lstStyle>
+            <a:lvl1pPr algn="l" defTabSz="1088558" rtl="0" eaLnBrk="1" latinLnBrk="0" hangingPunct="1">
+              <a:spcBef>
+                <a:spcPct val="0"/>
+              </a:spcBef>
+              <a:buNone/>
+              <a:defRPr sz="2400" b="1" kern="1200" baseline="0">
+                <a:solidFill>
+                  <a:schemeClr val="tx1"/>
+                </a:solidFill>
+                <a:latin typeface="+mj-lt"/>
+                <a:ea typeface="+mj-ea"/>
+                <a:cs typeface="+mj-cs"/>
+              </a:defRPr>
+            </a:lvl1pPr>
+          </a:lstStyle>
+          <a:p>
+            <a:pPr fontAlgn="base">
+              <a:spcAft>
+                <a:spcPct val="0"/>
+              </a:spcAft>
+            </a:pPr>
+            <a:r>
+              <a:rPr lang="en-US" sz="2399" dirty="0">
+                <a:latin typeface="Calibri" panose="020F0502020204030204" pitchFamily="34" charset="0"/>
+                <a:cs typeface="Calibri" panose="020F0502020204030204" pitchFamily="34" charset="0"/>
+              </a:rPr>
+              <a:t>Univariate Analysis – Purpose</a:t>
+            </a:r>
+            <a:br>
+              <a:rPr lang="en-US" sz="2399" dirty="0">
+                <a:latin typeface="Calibri" panose="020F0502020204030204" pitchFamily="34" charset="0"/>
+                <a:cs typeface="Calibri" panose="020F0502020204030204" pitchFamily="34" charset="0"/>
+              </a:rPr>
+            </a:br>
+            <a:endParaRPr lang="en-US" sz="2399" b="0" dirty="0">
+              <a:latin typeface="Calibri" panose="020F0502020204030204" pitchFamily="34" charset="0"/>
+              <a:cs typeface="Calibri" panose="020F0502020204030204" pitchFamily="34" charset="0"/>
+            </a:endParaRPr>
+          </a:p>
+        </p:txBody>
+      </p:sp>
+      <p:sp>
+        <p:nvSpPr>
+          <p:cNvPr id="9" name="Rectangle: Rounded Corners 7">
+            <a:extLst>
+              <a:ext uri="{FF2B5EF4-FFF2-40B4-BE49-F238E27FC236}">
+                <a16:creationId xmlns:a16="http://schemas.microsoft.com/office/drawing/2014/main" id="{E76B9008-55D4-2C4F-8D21-65A300FD2E27}"/>
+              </a:ext>
+            </a:extLst>
+          </p:cNvPr>
+          <p:cNvSpPr/>
+          <p:nvPr/>
+        </p:nvSpPr>
+        <p:spPr bwMode="gray">
+          <a:xfrm>
+            <a:off x="504218" y="1243235"/>
+            <a:ext cx="11009283" cy="775301"/>
+          </a:xfrm>
+          <a:prstGeom prst="roundRect">
+            <a:avLst>
+              <a:gd name="adj" fmla="val 9585"/>
+            </a:avLst>
+          </a:prstGeom>
+          <a:noFill/>
+          <a:ln w="12700" algn="ctr">
+            <a:solidFill>
+              <a:schemeClr val="bg2"/>
+            </a:solidFill>
+            <a:miter lim="800000"/>
+            <a:headEnd/>
+            <a:tailEnd/>
+          </a:ln>
+        </p:spPr>
+        <p:txBody>
+          <a:bodyPr wrap="square" lIns="91416" tIns="182832" rIns="91416" bIns="91416" rtlCol="0" anchor="t">
+            <a:noAutofit/>
+          </a:bodyPr>
+          <a:lstStyle/>
+          <a:p>
+            <a:pPr marL="342797" indent="-342797">
+              <a:spcBef>
+                <a:spcPts val="300"/>
+              </a:spcBef>
+              <a:buFont typeface="Wingdings" panose="05000000000000000000" pitchFamily="2" charset="2"/>
+              <a:buChar char="§"/>
+            </a:pPr>
+            <a:r>
+              <a:rPr lang="en-US" sz="1600" kern="0" dirty="0">
+                <a:solidFill>
+                  <a:srgbClr val="000000"/>
+                </a:solidFill>
+                <a:latin typeface="Calibri" panose="020F0502020204030204" pitchFamily="34" charset="0"/>
+                <a:ea typeface="Arial Unicode MS" pitchFamily="34" charset="-128"/>
+                <a:cs typeface="Calibri" panose="020F0502020204030204" pitchFamily="34" charset="0"/>
+              </a:rPr>
+              <a:t>About 46% of the loan applicants have specified purpose of loan as debt consolidation</a:t>
+            </a:r>
+            <a:endParaRPr lang="en-US" sz="1200" dirty="0">
+              <a:latin typeface="Calibri" panose="020F0502020204030204" pitchFamily="34" charset="0"/>
+              <a:cs typeface="Calibri" panose="020F0502020204030204" pitchFamily="34" charset="0"/>
+            </a:endParaRPr>
+          </a:p>
+        </p:txBody>
+      </p:sp>
+      <p:sp>
+        <p:nvSpPr>
+          <p:cNvPr id="10" name="TextBox 9">
+            <a:extLst>
+              <a:ext uri="{FF2B5EF4-FFF2-40B4-BE49-F238E27FC236}">
+                <a16:creationId xmlns:a16="http://schemas.microsoft.com/office/drawing/2014/main" id="{603F3E02-9DCF-2F47-9318-6DC46CC1EBD5}"/>
+              </a:ext>
+            </a:extLst>
+          </p:cNvPr>
+          <p:cNvSpPr txBox="1"/>
+          <p:nvPr/>
+        </p:nvSpPr>
+        <p:spPr>
+          <a:xfrm>
+            <a:off x="607375" y="1123185"/>
+            <a:ext cx="1347226" cy="276927"/>
+          </a:xfrm>
+          <a:prstGeom prst="rect">
+            <a:avLst/>
+          </a:prstGeom>
+          <a:solidFill>
+            <a:schemeClr val="bg1"/>
+          </a:solidFill>
+        </p:spPr>
+        <p:txBody>
+          <a:bodyPr wrap="square" lIns="0" tIns="0" rIns="0" bIns="0" rtlCol="0">
+            <a:spAutoFit/>
+          </a:bodyPr>
+          <a:lstStyle/>
+          <a:p>
+            <a:pPr algn="ctr" fontAlgn="base">
+              <a:spcBef>
+                <a:spcPct val="50000"/>
+              </a:spcBef>
+              <a:spcAft>
+                <a:spcPct val="0"/>
+              </a:spcAft>
+              <a:buClr>
+                <a:srgbClr val="F0AB00"/>
+              </a:buClr>
+              <a:buSzPct val="80000"/>
+            </a:pPr>
+            <a:r>
+              <a:rPr lang="en-US" sz="1799" kern="0" dirty="0">
+                <a:solidFill>
+                  <a:schemeClr val="accent3"/>
+                </a:solidFill>
+                <a:latin typeface="Calibri" panose="020F0502020204030204" pitchFamily="34" charset="0"/>
+                <a:ea typeface="Arial Unicode MS" pitchFamily="34" charset="-128"/>
+                <a:cs typeface="Calibri" panose="020F0502020204030204" pitchFamily="34" charset="0"/>
+              </a:rPr>
+              <a:t>Observations</a:t>
+            </a:r>
+          </a:p>
+        </p:txBody>
+      </p:sp>
+      <p:pic>
+        <p:nvPicPr>
+          <p:cNvPr id="8" name="Picture 7">
+            <a:extLst>
+              <a:ext uri="{FF2B5EF4-FFF2-40B4-BE49-F238E27FC236}">
+                <a16:creationId xmlns:a16="http://schemas.microsoft.com/office/drawing/2014/main" id="{9FCF5079-62D7-B141-998A-E4A536DD87D1}"/>
+              </a:ext>
+            </a:extLst>
+          </p:cNvPr>
+          <p:cNvPicPr>
+            <a:picLocks noChangeAspect="1"/>
+          </p:cNvPicPr>
+          <p:nvPr/>
+        </p:nvPicPr>
+        <p:blipFill>
+          <a:blip r:embed="rId8"/>
+          <a:stretch>
+            <a:fillRect/>
+          </a:stretch>
+        </p:blipFill>
+        <p:spPr>
+          <a:xfrm>
+            <a:off x="2769140" y="2399071"/>
+            <a:ext cx="6653720" cy="4492592"/>
+          </a:xfrm>
+          <a:prstGeom prst="rect">
+            <a:avLst/>
+          </a:prstGeom>
+        </p:spPr>
+      </p:pic>
+    </p:spTree>
+    <p:extLst>
+      <p:ext uri="{BB962C8B-B14F-4D97-AF65-F5344CB8AC3E}">
+        <p14:creationId xmlns:p14="http://schemas.microsoft.com/office/powerpoint/2010/main" val="500806642"/>
+      </p:ext>
+    </p:extLst>
+  </p:cSld>
+  <p:clrMapOvr>
+    <a:masterClrMapping/>
+  </p:clrMapOvr>
+</p:sld>
+</file>
+
+<file path=ppt/slides/slide7.xml><?xml version="1.0" encoding="utf-8"?>
+<p:sld xmlns:a="http://schemas.openxmlformats.org/drawingml/2006/main" xmlns:r="http://schemas.openxmlformats.org/officeDocument/2006/relationships" xmlns:p="http://schemas.openxmlformats.org/presentationml/2006/main">
+  <p:cSld>
+    <p:spTree>
+      <p:nvGrpSpPr>
+        <p:cNvPr id="1" name=""/>
+        <p:cNvGrpSpPr/>
+        <p:nvPr/>
+      </p:nvGrpSpPr>
+      <p:grpSpPr>
+        <a:xfrm>
+          <a:off x="0" y="0"/>
+          <a:ext cx="0" cy="0"/>
+          <a:chOff x="0" y="0"/>
+          <a:chExt cx="0" cy="0"/>
+        </a:xfrm>
+      </p:grpSpPr>
+      <p:graphicFrame>
+        <p:nvGraphicFramePr>
+          <p:cNvPr id="4" name="Object 3" hidden="1">
+            <a:extLst>
+              <a:ext uri="{FF2B5EF4-FFF2-40B4-BE49-F238E27FC236}">
+                <a16:creationId xmlns:a16="http://schemas.microsoft.com/office/drawing/2014/main" id="{17E080A6-0EB0-4875-8C2C-9B9D70A8AA04}"/>
+              </a:ext>
+            </a:extLst>
+          </p:cNvPr>
+          <p:cNvGraphicFramePr>
+            <a:graphicFrameLocks noChangeAspect="1"/>
+          </p:cNvGraphicFramePr>
+          <p:nvPr>
+            <p:custDataLst>
+              <p:tags r:id="rId2"/>
+            </p:custDataLst>
+          </p:nvPr>
+        </p:nvGraphicFramePr>
+        <p:xfrm>
+          <a:off x="1588" y="2480"/>
+          <a:ext cx="1588" cy="1588"/>
+        </p:xfrm>
+        <a:graphic>
+          <a:graphicData uri="http://schemas.openxmlformats.org/presentationml/2006/ole">
+            <mc:AlternateContent xmlns:mc="http://schemas.openxmlformats.org/markup-compatibility/2006">
+              <mc:Choice xmlns:v="urn:schemas-microsoft-com:vml" Requires="v">
+                <p:oleObj spid="_x0000_s2051" name="think-cell Slide" r:id="rId5" imgW="393" imgH="392" progId="TCLayout.ActiveDocument.1">
                   <p:embed/>
                 </p:oleObj>
               </mc:Choice>
@@ -12557,7 +13564,7 @@
                 <a:latin typeface="Calibri" panose="020F0502020204030204" pitchFamily="34" charset="0"/>
                 <a:cs typeface="Calibri" panose="020F0502020204030204" pitchFamily="34" charset="0"/>
               </a:rPr>
-              <a:t>Segmented Univariate Analysis – Interest Rate</a:t>
+              <a:t>Segmented Univariate Analysis – Loan Amount</a:t>
             </a:r>
             <a:br>
               <a:rPr lang="en-US" sz="2399" dirty="0">
@@ -12587,7 +13594,7 @@
         <p:spPr bwMode="gray">
           <a:xfrm>
             <a:off x="504218" y="1560862"/>
-            <a:ext cx="11009283" cy="1021297"/>
+            <a:ext cx="11009283" cy="828377"/>
           </a:xfrm>
           <a:prstGeom prst="roundRect">
             <a:avLst>
@@ -12626,27 +13633,7 @@
                 <a:ea typeface="Arial Unicode MS" pitchFamily="34" charset="-128"/>
                 <a:cs typeface="Calibri" panose="020F0502020204030204" pitchFamily="34" charset="0"/>
               </a:rPr>
-              <a:t>Applicants who got loan for higher interest rate tend to default more than those who got it for lower interest rates</a:t>
-            </a:r>
-          </a:p>
-          <a:p>
-            <a:pPr marL="342797" indent="-342797">
-              <a:spcBef>
-                <a:spcPts val="300"/>
-              </a:spcBef>
-              <a:buFont typeface="Wingdings" panose="05000000000000000000" pitchFamily="2" charset="2"/>
-              <a:buChar char="§"/>
-            </a:pPr>
-            <a:r>
-              <a:rPr lang="en-US" sz="1600" kern="0" dirty="0">
-                <a:solidFill>
-                  <a:srgbClr val="000000"/>
-                </a:solidFill>
-                <a:latin typeface="Calibri" panose="020F0502020204030204" pitchFamily="34" charset="0"/>
-                <a:ea typeface="Arial Unicode MS" pitchFamily="34" charset="-128"/>
-                <a:cs typeface="Calibri" panose="020F0502020204030204" pitchFamily="34" charset="0"/>
-              </a:rPr>
-              <a:t>Same behavior is observed for grades and sub grades where alphanumerically higher order grades and subgrades has more default rate. Business wises, grades and sub grades are correlated to interest rate. Hence, this observation is justified</a:t>
+              <a:t>Applicants requesting for higher loan amount tend to default more than those who are requesting lesser loan amount</a:t>
             </a:r>
           </a:p>
           <a:p>
@@ -12722,10 +13709,10 @@
       </p:sp>
       <p:pic>
         <p:nvPicPr>
-          <p:cNvPr id="6" name="Picture 5">
-            <a:extLst>
-              <a:ext uri="{FF2B5EF4-FFF2-40B4-BE49-F238E27FC236}">
-                <a16:creationId xmlns:a16="http://schemas.microsoft.com/office/drawing/2014/main" id="{B554DB53-CD0B-7A4F-8BB7-5AC9E39F47DF}"/>
+          <p:cNvPr id="13" name="Picture 12">
+            <a:extLst>
+              <a:ext uri="{FF2B5EF4-FFF2-40B4-BE49-F238E27FC236}">
+                <a16:creationId xmlns:a16="http://schemas.microsoft.com/office/drawing/2014/main" id="{632A6595-8355-A149-867D-E33744E9C413}"/>
               </a:ext>
             </a:extLst>
           </p:cNvPr>
@@ -12742,38 +13729,8 @@
         </p:blipFill>
         <p:spPr>
           <a:xfrm>
-            <a:off x="319520" y="3123586"/>
-            <a:ext cx="5689339" cy="3080569"/>
-          </a:xfrm>
-          <a:prstGeom prst="rect">
-            <a:avLst/>
-          </a:prstGeom>
-        </p:spPr>
-      </p:pic>
-      <p:pic>
-        <p:nvPicPr>
-          <p:cNvPr id="11" name="Picture 10">
-            <a:extLst>
-              <a:ext uri="{FF2B5EF4-FFF2-40B4-BE49-F238E27FC236}">
-                <a16:creationId xmlns:a16="http://schemas.microsoft.com/office/drawing/2014/main" id="{3AA7FA59-4736-0C45-A0E0-81F1686DFF03}"/>
-              </a:ext>
-            </a:extLst>
-          </p:cNvPr>
-          <p:cNvPicPr>
-            <a:picLocks noChangeAspect="1"/>
-          </p:cNvPicPr>
-          <p:nvPr/>
-        </p:nvPicPr>
-        <p:blipFill>
-          <a:blip r:embed="rId8"/>
-          <a:stretch>
-            <a:fillRect/>
-          </a:stretch>
-        </p:blipFill>
-        <p:spPr>
-          <a:xfrm>
-            <a:off x="6291573" y="3123586"/>
-            <a:ext cx="5221928" cy="3080569"/>
+            <a:off x="2133252" y="2582159"/>
+            <a:ext cx="7924800" cy="4229100"/>
           </a:xfrm>
           <a:prstGeom prst="rect">
             <a:avLst/>
@@ -12783,7 +13740,7 @@
     </p:spTree>
     <p:extLst>
       <p:ext uri="{BB962C8B-B14F-4D97-AF65-F5344CB8AC3E}">
-        <p14:creationId xmlns:p14="http://schemas.microsoft.com/office/powerpoint/2010/main" val="3431243602"/>
+        <p14:creationId xmlns:p14="http://schemas.microsoft.com/office/powerpoint/2010/main" val="2152113646"/>
       </p:ext>
     </p:extLst>
   </p:cSld>
@@ -12793,7 +13750,7 @@
 </p:sld>
 </file>
 
-<file path=ppt/slides/slide9.xml><?xml version="1.0" encoding="utf-8"?>
+<file path=ppt/slides/slide8.xml><?xml version="1.0" encoding="utf-8"?>
 <p:sld xmlns:a="http://schemas.openxmlformats.org/drawingml/2006/main" xmlns:r="http://schemas.openxmlformats.org/officeDocument/2006/relationships" xmlns:p="http://schemas.openxmlformats.org/presentationml/2006/main">
   <p:cSld>
     <p:spTree>
@@ -12836,7 +13793,7 @@
           <a:graphicData uri="http://schemas.openxmlformats.org/presentationml/2006/ole">
             <mc:AlternateContent xmlns:mc="http://schemas.openxmlformats.org/markup-compatibility/2006">
               <mc:Choice xmlns:v="urn:schemas-microsoft-com:vml" Requires="v">
-                <p:oleObj spid="_x0000_s6145" name="think-cell Slide" r:id="rId5" imgW="393" imgH="392" progId="TCLayout.ActiveDocument.1">
+                <p:oleObj spid="_x0000_s3075" name="think-cell Slide" r:id="rId5" imgW="393" imgH="392" progId="TCLayout.ActiveDocument.1">
                   <p:embed/>
                 </p:oleObj>
               </mc:Choice>
@@ -12994,7 +13951,7 @@
                 <a:latin typeface="Calibri" panose="020F0502020204030204" pitchFamily="34" charset="0"/>
                 <a:cs typeface="Calibri" panose="020F0502020204030204" pitchFamily="34" charset="0"/>
               </a:rPr>
-              <a:t>Segmented Univariate Analysis – Employment Length</a:t>
+              <a:t>Segmented Univariate Analysis – Funded Amount</a:t>
             </a:r>
             <a:br>
               <a:rPr lang="en-US" sz="2399" dirty="0">
@@ -13023,8 +13980,8 @@
         </p:nvSpPr>
         <p:spPr bwMode="gray">
           <a:xfrm>
-            <a:off x="504218" y="1560862"/>
-            <a:ext cx="11009283" cy="1021297"/>
+            <a:off x="504218" y="1560863"/>
+            <a:ext cx="11009283" cy="818544"/>
           </a:xfrm>
           <a:prstGeom prst="roundRect">
             <a:avLst>
@@ -13063,27 +14020,7 @@
                 <a:ea typeface="Arial Unicode MS" pitchFamily="34" charset="-128"/>
                 <a:cs typeface="Calibri" panose="020F0502020204030204" pitchFamily="34" charset="0"/>
               </a:rPr>
-              <a:t>Applicants with Employment Length of 10+ years tend to default more than other durations</a:t>
-            </a:r>
-          </a:p>
-          <a:p>
-            <a:pPr marL="342797" indent="-342797">
-              <a:spcBef>
-                <a:spcPts val="300"/>
-              </a:spcBef>
-              <a:buFont typeface="Wingdings" panose="05000000000000000000" pitchFamily="2" charset="2"/>
-              <a:buChar char="§"/>
-            </a:pPr>
-            <a:r>
-              <a:rPr lang="en-US" sz="1600" kern="0" dirty="0">
-                <a:solidFill>
-                  <a:srgbClr val="000000"/>
-                </a:solidFill>
-                <a:latin typeface="Calibri" panose="020F0502020204030204" pitchFamily="34" charset="0"/>
-                <a:ea typeface="Arial Unicode MS" pitchFamily="34" charset="-128"/>
-                <a:cs typeface="Calibri" panose="020F0502020204030204" pitchFamily="34" charset="0"/>
-              </a:rPr>
-              <a:t>Applicants whose Employment Length is missing has higher factor of default rate(22%) than all others </a:t>
+              <a:t>Applicants granted with higher funded amount tend to default more than those who got lesser funded amount</a:t>
             </a:r>
           </a:p>
           <a:p>
@@ -13176,10 +14113,10 @@
       </p:sp>
       <p:pic>
         <p:nvPicPr>
-          <p:cNvPr id="11" name="Picture 10">
-            <a:extLst>
-              <a:ext uri="{FF2B5EF4-FFF2-40B4-BE49-F238E27FC236}">
-                <a16:creationId xmlns:a16="http://schemas.microsoft.com/office/drawing/2014/main" id="{D88CC096-8C72-534C-A9A9-02AD017C0CD5}"/>
+          <p:cNvPr id="6" name="Picture 5">
+            <a:extLst>
+              <a:ext uri="{FF2B5EF4-FFF2-40B4-BE49-F238E27FC236}">
+                <a16:creationId xmlns:a16="http://schemas.microsoft.com/office/drawing/2014/main" id="{81E61C1D-6E5B-EE4B-AF7C-B7CCD05148A9}"/>
               </a:ext>
             </a:extLst>
           </p:cNvPr>
@@ -13196,8 +14133,8 @@
         </p:blipFill>
         <p:spPr>
           <a:xfrm>
-            <a:off x="2633925" y="2582159"/>
-            <a:ext cx="6923454" cy="4344128"/>
+            <a:off x="2133600" y="2499456"/>
+            <a:ext cx="7924800" cy="4229100"/>
           </a:xfrm>
           <a:prstGeom prst="rect">
             <a:avLst/>
@@ -13207,7 +14144,394 @@
     </p:spTree>
     <p:extLst>
       <p:ext uri="{BB962C8B-B14F-4D97-AF65-F5344CB8AC3E}">
-        <p14:creationId xmlns:p14="http://schemas.microsoft.com/office/powerpoint/2010/main" val="93519835"/>
+        <p14:creationId xmlns:p14="http://schemas.microsoft.com/office/powerpoint/2010/main" val="3617943556"/>
+      </p:ext>
+    </p:extLst>
+  </p:cSld>
+  <p:clrMapOvr>
+    <a:masterClrMapping/>
+  </p:clrMapOvr>
+</p:sld>
+</file>
+
+<file path=ppt/slides/slide9.xml><?xml version="1.0" encoding="utf-8"?>
+<p:sld xmlns:a="http://schemas.openxmlformats.org/drawingml/2006/main" xmlns:r="http://schemas.openxmlformats.org/officeDocument/2006/relationships" xmlns:p="http://schemas.openxmlformats.org/presentationml/2006/main">
+  <p:cSld>
+    <p:spTree>
+      <p:nvGrpSpPr>
+        <p:cNvPr id="1" name=""/>
+        <p:cNvGrpSpPr/>
+        <p:nvPr/>
+      </p:nvGrpSpPr>
+      <p:grpSpPr>
+        <a:xfrm>
+          <a:off x="0" y="0"/>
+          <a:ext cx="0" cy="0"/>
+          <a:chOff x="0" y="0"/>
+          <a:chExt cx="0" cy="0"/>
+        </a:xfrm>
+      </p:grpSpPr>
+      <p:graphicFrame>
+        <p:nvGraphicFramePr>
+          <p:cNvPr id="4" name="Object 3" hidden="1">
+            <a:extLst>
+              <a:ext uri="{FF2B5EF4-FFF2-40B4-BE49-F238E27FC236}">
+                <a16:creationId xmlns:a16="http://schemas.microsoft.com/office/drawing/2014/main" id="{17E080A6-0EB0-4875-8C2C-9B9D70A8AA04}"/>
+              </a:ext>
+            </a:extLst>
+          </p:cNvPr>
+          <p:cNvGraphicFramePr>
+            <a:graphicFrameLocks noChangeAspect="1"/>
+          </p:cNvGraphicFramePr>
+          <p:nvPr>
+            <p:custDataLst>
+              <p:tags r:id="rId2"/>
+            </p:custDataLst>
+          </p:nvPr>
+        </p:nvGraphicFramePr>
+        <p:xfrm>
+          <a:off x="1588" y="2480"/>
+          <a:ext cx="1588" cy="1588"/>
+        </p:xfrm>
+        <a:graphic>
+          <a:graphicData uri="http://schemas.openxmlformats.org/presentationml/2006/ole">
+            <mc:AlternateContent xmlns:mc="http://schemas.openxmlformats.org/markup-compatibility/2006">
+              <mc:Choice xmlns:v="urn:schemas-microsoft-com:vml" Requires="v">
+                <p:oleObj spid="_x0000_s4099" name="think-cell Slide" r:id="rId5" imgW="393" imgH="392" progId="TCLayout.ActiveDocument.1">
+                  <p:embed/>
+                </p:oleObj>
+              </mc:Choice>
+              <mc:Fallback>
+                <p:oleObj name="think-cell Slide" r:id="rId5" imgW="393" imgH="392" progId="TCLayout.ActiveDocument.1">
+                  <p:embed/>
+                  <p:pic>
+                    <p:nvPicPr>
+                      <p:cNvPr id="4" name="Object 3" hidden="1">
+                        <a:extLst>
+                          <a:ext uri="{FF2B5EF4-FFF2-40B4-BE49-F238E27FC236}">
+                            <a16:creationId xmlns:a16="http://schemas.microsoft.com/office/drawing/2014/main" id="{17E080A6-0EB0-4875-8C2C-9B9D70A8AA04}"/>
+                          </a:ext>
+                        </a:extLst>
+                      </p:cNvPr>
+                      <p:cNvPicPr/>
+                      <p:nvPr/>
+                    </p:nvPicPr>
+                    <p:blipFill>
+                      <a:blip r:embed="rId6"/>
+                      <a:stretch>
+                        <a:fillRect/>
+                      </a:stretch>
+                    </p:blipFill>
+                    <p:spPr>
+                      <a:xfrm>
+                        <a:off x="1588" y="2480"/>
+                        <a:ext cx="1588" cy="1588"/>
+                      </a:xfrm>
+                      <a:prstGeom prst="rect">
+                        <a:avLst/>
+                      </a:prstGeom>
+                    </p:spPr>
+                  </p:pic>
+                </p:oleObj>
+              </mc:Fallback>
+            </mc:AlternateContent>
+          </a:graphicData>
+        </a:graphic>
+      </p:graphicFrame>
+      <p:sp>
+        <p:nvSpPr>
+          <p:cNvPr id="5" name="Rectangle 4" hidden="1">
+            <a:extLst>
+              <a:ext uri="{FF2B5EF4-FFF2-40B4-BE49-F238E27FC236}">
+                <a16:creationId xmlns:a16="http://schemas.microsoft.com/office/drawing/2014/main" id="{C14CF94A-B426-437F-8C21-50E65B5740C9}"/>
+              </a:ext>
+            </a:extLst>
+          </p:cNvPr>
+          <p:cNvSpPr/>
+          <p:nvPr>
+            <p:custDataLst>
+              <p:tags r:id="rId3"/>
+            </p:custDataLst>
+          </p:nvPr>
+        </p:nvSpPr>
+        <p:spPr bwMode="gray">
+          <a:xfrm>
+            <a:off x="0" y="893"/>
+            <a:ext cx="158709" cy="158709"/>
+          </a:xfrm>
+          <a:prstGeom prst="rect">
+            <a:avLst/>
+          </a:prstGeom>
+          <a:noFill/>
+          <a:ln w="25400" algn="ctr">
+            <a:solidFill>
+              <a:schemeClr val="tx1"/>
+            </a:solidFill>
+            <a:miter lim="800000"/>
+            <a:headEnd/>
+            <a:tailEnd/>
+          </a:ln>
+        </p:spPr>
+        <p:txBody>
+          <a:bodyPr vert="horz" wrap="none" lIns="0" tIns="0" rIns="0" bIns="0" numCol="1" spcCol="0" rtlCol="0" anchor="ctr" anchorCtr="0">
+            <a:noAutofit/>
+          </a:bodyPr>
+          <a:lstStyle/>
+          <a:p>
+            <a:pPr algn="ctr" defTabSz="914126" fontAlgn="base">
+              <a:spcBef>
+                <a:spcPct val="50000"/>
+              </a:spcBef>
+              <a:spcAft>
+                <a:spcPct val="0"/>
+              </a:spcAft>
+              <a:buClr>
+                <a:srgbClr val="F0AB00"/>
+              </a:buClr>
+              <a:buSzPct val="80000"/>
+              <a:defRPr/>
+            </a:pPr>
+            <a:endParaRPr lang="en-US" sz="2399" kern="0" err="1">
+              <a:solidFill>
+                <a:srgbClr val="000000"/>
+              </a:solidFill>
+              <a:latin typeface="Arial" panose="020B0604020202020204" pitchFamily="34" charset="0"/>
+              <a:sym typeface="Arial" panose="020B0604020202020204" pitchFamily="34" charset="0"/>
+            </a:endParaRPr>
+          </a:p>
+        </p:txBody>
+      </p:sp>
+      <p:sp>
+        <p:nvSpPr>
+          <p:cNvPr id="7" name="Title 1">
+            <a:extLst>
+              <a:ext uri="{FF2B5EF4-FFF2-40B4-BE49-F238E27FC236}">
+                <a16:creationId xmlns:a16="http://schemas.microsoft.com/office/drawing/2014/main" id="{3F009492-A00F-402C-8C17-EB4A4283B3C5}"/>
+              </a:ext>
+            </a:extLst>
+          </p:cNvPr>
+          <p:cNvSpPr txBox="1">
+            <a:spLocks/>
+          </p:cNvSpPr>
+          <p:nvPr/>
+        </p:nvSpPr>
+        <p:spPr bwMode="black">
+          <a:xfrm>
+            <a:off x="505326" y="504761"/>
+            <a:ext cx="11180652" cy="738472"/>
+          </a:xfrm>
+          <a:prstGeom prst="rect">
+            <a:avLst/>
+          </a:prstGeom>
+        </p:spPr>
+        <p:txBody>
+          <a:bodyPr vert="horz" wrap="square" lIns="0" tIns="0" rIns="0" bIns="0" rtlCol="0" anchor="t" anchorCtr="0">
+            <a:spAutoFit/>
+          </a:bodyPr>
+          <a:lstStyle>
+            <a:lvl1pPr algn="l" defTabSz="1088558" rtl="0" eaLnBrk="1" latinLnBrk="0" hangingPunct="1">
+              <a:spcBef>
+                <a:spcPct val="0"/>
+              </a:spcBef>
+              <a:buNone/>
+              <a:defRPr sz="2400" b="1" kern="1200" baseline="0">
+                <a:solidFill>
+                  <a:schemeClr val="tx1"/>
+                </a:solidFill>
+                <a:latin typeface="+mj-lt"/>
+                <a:ea typeface="+mj-ea"/>
+                <a:cs typeface="+mj-cs"/>
+              </a:defRPr>
+            </a:lvl1pPr>
+          </a:lstStyle>
+          <a:p>
+            <a:pPr fontAlgn="base">
+              <a:spcAft>
+                <a:spcPct val="0"/>
+              </a:spcAft>
+            </a:pPr>
+            <a:r>
+              <a:rPr lang="en-US" sz="2399" dirty="0">
+                <a:latin typeface="Calibri" panose="020F0502020204030204" pitchFamily="34" charset="0"/>
+                <a:cs typeface="Calibri" panose="020F0502020204030204" pitchFamily="34" charset="0"/>
+              </a:rPr>
+              <a:t>Segmented Univariate Analysis – Loan Term</a:t>
+            </a:r>
+            <a:br>
+              <a:rPr lang="en-US" sz="2399" dirty="0">
+                <a:latin typeface="Calibri" panose="020F0502020204030204" pitchFamily="34" charset="0"/>
+                <a:cs typeface="Calibri" panose="020F0502020204030204" pitchFamily="34" charset="0"/>
+              </a:rPr>
+            </a:br>
+            <a:endParaRPr lang="en-US" sz="2399" b="0" dirty="0">
+              <a:latin typeface="Calibri" panose="020F0502020204030204" pitchFamily="34" charset="0"/>
+              <a:cs typeface="Calibri" panose="020F0502020204030204" pitchFamily="34" charset="0"/>
+            </a:endParaRPr>
+          </a:p>
+        </p:txBody>
+      </p:sp>
+      <p:sp>
+        <p:nvSpPr>
+          <p:cNvPr id="9" name="Rectangle: Rounded Corners 7">
+            <a:extLst>
+              <a:ext uri="{FF2B5EF4-FFF2-40B4-BE49-F238E27FC236}">
+                <a16:creationId xmlns:a16="http://schemas.microsoft.com/office/drawing/2014/main" id="{E76B9008-55D4-2C4F-8D21-65A300FD2E27}"/>
+              </a:ext>
+            </a:extLst>
+          </p:cNvPr>
+          <p:cNvSpPr/>
+          <p:nvPr/>
+        </p:nvSpPr>
+        <p:spPr bwMode="gray">
+          <a:xfrm>
+            <a:off x="504218" y="1560863"/>
+            <a:ext cx="11009283" cy="818544"/>
+          </a:xfrm>
+          <a:prstGeom prst="roundRect">
+            <a:avLst>
+              <a:gd name="adj" fmla="val 9585"/>
+            </a:avLst>
+          </a:prstGeom>
+          <a:noFill/>
+          <a:ln w="12700" algn="ctr">
+            <a:solidFill>
+              <a:schemeClr val="bg2"/>
+            </a:solidFill>
+            <a:miter lim="800000"/>
+            <a:headEnd/>
+            <a:tailEnd/>
+          </a:ln>
+        </p:spPr>
+        <p:txBody>
+          <a:bodyPr wrap="square" lIns="91416" tIns="182832" rIns="91416" bIns="91416" rtlCol="0" anchor="t">
+            <a:noAutofit/>
+          </a:bodyPr>
+          <a:lstStyle/>
+          <a:p>
+            <a:pPr marL="342797" indent="-342797">
+              <a:spcBef>
+                <a:spcPts val="300"/>
+              </a:spcBef>
+              <a:buFont typeface="Wingdings" panose="05000000000000000000" pitchFamily="2" charset="2"/>
+              <a:buChar char="§"/>
+            </a:pPr>
+            <a:r>
+              <a:rPr lang="en-US" sz="1600" kern="0" dirty="0">
+                <a:solidFill>
+                  <a:srgbClr val="000000"/>
+                </a:solidFill>
+                <a:latin typeface="Calibri" panose="020F0502020204030204" pitchFamily="34" charset="0"/>
+                <a:ea typeface="Arial Unicode MS" pitchFamily="34" charset="-128"/>
+                <a:cs typeface="Calibri" panose="020F0502020204030204" pitchFamily="34" charset="0"/>
+              </a:rPr>
+              <a:t>Applicants who opted for higher term (60 months) tend to default more than those who opted for 36 months term. This is substantial considering the univariate analysis of term where 75% of the loan was requested/granted for 36months. </a:t>
+            </a:r>
+          </a:p>
+          <a:p>
+            <a:pPr marL="342797" indent="-342797">
+              <a:spcBef>
+                <a:spcPts val="300"/>
+              </a:spcBef>
+              <a:buFont typeface="Wingdings" panose="05000000000000000000" pitchFamily="2" charset="2"/>
+              <a:buChar char="§"/>
+            </a:pPr>
+            <a:endParaRPr lang="en-US" sz="1200" dirty="0">
+              <a:latin typeface="Calibri" panose="020F0502020204030204" pitchFamily="34" charset="0"/>
+              <a:cs typeface="Calibri" panose="020F0502020204030204" pitchFamily="34" charset="0"/>
+            </a:endParaRPr>
+          </a:p>
+        </p:txBody>
+      </p:sp>
+      <p:sp>
+        <p:nvSpPr>
+          <p:cNvPr id="10" name="TextBox 9">
+            <a:extLst>
+              <a:ext uri="{FF2B5EF4-FFF2-40B4-BE49-F238E27FC236}">
+                <a16:creationId xmlns:a16="http://schemas.microsoft.com/office/drawing/2014/main" id="{603F3E02-9DCF-2F47-9318-6DC46CC1EBD5}"/>
+              </a:ext>
+            </a:extLst>
+          </p:cNvPr>
+          <p:cNvSpPr txBox="1"/>
+          <p:nvPr/>
+        </p:nvSpPr>
+        <p:spPr>
+          <a:xfrm>
+            <a:off x="607375" y="1440814"/>
+            <a:ext cx="1347226" cy="276927"/>
+          </a:xfrm>
+          <a:prstGeom prst="rect">
+            <a:avLst/>
+          </a:prstGeom>
+          <a:solidFill>
+            <a:schemeClr val="bg1"/>
+          </a:solidFill>
+        </p:spPr>
+        <p:txBody>
+          <a:bodyPr wrap="square" lIns="0" tIns="0" rIns="0" bIns="0" rtlCol="0">
+            <a:spAutoFit/>
+          </a:bodyPr>
+          <a:lstStyle/>
+          <a:p>
+            <a:pPr algn="ctr" fontAlgn="base">
+              <a:spcBef>
+                <a:spcPct val="50000"/>
+              </a:spcBef>
+              <a:spcAft>
+                <a:spcPct val="0"/>
+              </a:spcAft>
+              <a:buClr>
+                <a:srgbClr val="F0AB00"/>
+              </a:buClr>
+              <a:buSzPct val="80000"/>
+            </a:pPr>
+            <a:r>
+              <a:rPr lang="en-US" sz="1799" kern="0" dirty="0">
+                <a:solidFill>
+                  <a:schemeClr val="accent3"/>
+                </a:solidFill>
+                <a:latin typeface="Calibri" panose="020F0502020204030204" pitchFamily="34" charset="0"/>
+                <a:ea typeface="Arial Unicode MS" pitchFamily="34" charset="-128"/>
+                <a:cs typeface="Calibri" panose="020F0502020204030204" pitchFamily="34" charset="0"/>
+              </a:rPr>
+              <a:t>Observations</a:t>
+            </a:r>
+          </a:p>
+        </p:txBody>
+      </p:sp>
+      <p:pic>
+        <p:nvPicPr>
+          <p:cNvPr id="6" name="Picture 5">
+            <a:extLst>
+              <a:ext uri="{FF2B5EF4-FFF2-40B4-BE49-F238E27FC236}">
+                <a16:creationId xmlns:a16="http://schemas.microsoft.com/office/drawing/2014/main" id="{738E8BE2-1477-DB4B-AF28-6A06D7798583}"/>
+              </a:ext>
+            </a:extLst>
+          </p:cNvPr>
+          <p:cNvPicPr>
+            <a:picLocks noChangeAspect="1"/>
+          </p:cNvPicPr>
+          <p:nvPr/>
+        </p:nvPicPr>
+        <p:blipFill>
+          <a:blip r:embed="rId7"/>
+          <a:stretch>
+            <a:fillRect/>
+          </a:stretch>
+        </p:blipFill>
+        <p:spPr>
+          <a:xfrm>
+            <a:off x="2122659" y="2582159"/>
+            <a:ext cx="7772400" cy="4229100"/>
+          </a:xfrm>
+          <a:prstGeom prst="rect">
+            <a:avLst/>
+          </a:prstGeom>
+        </p:spPr>
+      </p:pic>
+    </p:spTree>
+    <p:extLst>
+      <p:ext uri="{BB962C8B-B14F-4D97-AF65-F5344CB8AC3E}">
+        <p14:creationId xmlns:p14="http://schemas.microsoft.com/office/powerpoint/2010/main" val="1668626057"/>
       </p:ext>
     </p:extLst>
   </p:cSld>
@@ -13463,9 +14787,33 @@
 </p:tagLst>
 </file>
 
+<file path=ppt/tags/tag47.xml><?xml version="1.0" encoding="utf-8"?>
+<p:tagLst xmlns:a="http://schemas.openxmlformats.org/drawingml/2006/main" xmlns:r="http://schemas.openxmlformats.org/officeDocument/2006/relationships" xmlns:p="http://schemas.openxmlformats.org/presentationml/2006/main">
+  <p:tag name="THINKCELLSHAPEDONOTDELETE" val="thinkcellActiveDocDoNotDelete"/>
+</p:tagLst>
+</file>
+
+<file path=ppt/tags/tag48.xml><?xml version="1.0" encoding="utf-8"?>
+<p:tagLst xmlns:a="http://schemas.openxmlformats.org/drawingml/2006/main" xmlns:r="http://schemas.openxmlformats.org/officeDocument/2006/relationships" xmlns:p="http://schemas.openxmlformats.org/presentationml/2006/main">
+  <p:tag name="THINKCELLSHAPEDONOTDELETE" val="toXPO6ybpQS9ZzMHETiTzzQ"/>
+</p:tagLst>
+</file>
+
+<file path=ppt/tags/tag49.xml><?xml version="1.0" encoding="utf-8"?>
+<p:tagLst xmlns:a="http://schemas.openxmlformats.org/drawingml/2006/main" xmlns:r="http://schemas.openxmlformats.org/officeDocument/2006/relationships" xmlns:p="http://schemas.openxmlformats.org/presentationml/2006/main">
+  <p:tag name="THINKCELLSHAPEDONOTDELETE" val="thinkcellActiveDocDoNotDelete"/>
+</p:tagLst>
+</file>
+
 <file path=ppt/tags/tag5.xml><?xml version="1.0" encoding="utf-8"?>
 <p:tagLst xmlns:a="http://schemas.openxmlformats.org/drawingml/2006/main" xmlns:r="http://schemas.openxmlformats.org/officeDocument/2006/relationships" xmlns:p="http://schemas.openxmlformats.org/presentationml/2006/main">
   <p:tag name="THINKCELLSHAPEDONOTDELETE" val="thinkcellActiveDocDoNotDelete"/>
+</p:tagLst>
+</file>
+
+<file path=ppt/tags/tag50.xml><?xml version="1.0" encoding="utf-8"?>
+<p:tagLst xmlns:a="http://schemas.openxmlformats.org/drawingml/2006/main" xmlns:r="http://schemas.openxmlformats.org/officeDocument/2006/relationships" xmlns:p="http://schemas.openxmlformats.org/presentationml/2006/main">
+  <p:tag name="THINKCELLSHAPEDONOTDELETE" val="toXPO6ybpQS9ZzMHETiTzzQ"/>
 </p:tagLst>
 </file>
 
@@ -13786,4 +15134,299 @@
     </a:ext>
   </a:extLst>
 </a:theme>
+</file>
+
+<file path=ppt/theme/theme2.xml><?xml version="1.0" encoding="utf-8"?>
+<a:theme xmlns:a="http://schemas.openxmlformats.org/drawingml/2006/main" name="Office Theme">
+  <a:themeElements>
+    <a:clrScheme name="Office">
+      <a:dk1>
+        <a:sysClr val="windowText" lastClr="000000"/>
+      </a:dk1>
+      <a:lt1>
+        <a:sysClr val="window" lastClr="FFFFFF"/>
+      </a:lt1>
+      <a:dk2>
+        <a:srgbClr val="44546A"/>
+      </a:dk2>
+      <a:lt2>
+        <a:srgbClr val="E7E6E6"/>
+      </a:lt2>
+      <a:accent1>
+        <a:srgbClr val="4472C4"/>
+      </a:accent1>
+      <a:accent2>
+        <a:srgbClr val="ED7D31"/>
+      </a:accent2>
+      <a:accent3>
+        <a:srgbClr val="A5A5A5"/>
+      </a:accent3>
+      <a:accent4>
+        <a:srgbClr val="FFC000"/>
+      </a:accent4>
+      <a:accent5>
+        <a:srgbClr val="5B9BD5"/>
+      </a:accent5>
+      <a:accent6>
+        <a:srgbClr val="70AD47"/>
+      </a:accent6>
+      <a:hlink>
+        <a:srgbClr val="0563C1"/>
+      </a:hlink>
+      <a:folHlink>
+        <a:srgbClr val="954F72"/>
+      </a:folHlink>
+    </a:clrScheme>
+    <a:fontScheme name="Office">
+      <a:majorFont>
+        <a:latin typeface="Calibri Light" panose="020F0302020204030204"/>
+        <a:ea typeface=""/>
+        <a:cs typeface=""/>
+        <a:font script="Jpan" typeface="游ゴシック Light"/>
+        <a:font script="Hang" typeface="맑은 고딕"/>
+        <a:font script="Hans" typeface="等线 Light"/>
+        <a:font script="Hant" typeface="新細明體"/>
+        <a:font script="Arab" typeface="Times New Roman"/>
+        <a:font script="Hebr" typeface="Times New Roman"/>
+        <a:font script="Thai" typeface="Angsana New"/>
+        <a:font script="Ethi" typeface="Nyala"/>
+        <a:font script="Beng" typeface="Vrinda"/>
+        <a:font script="Gujr" typeface="Shruti"/>
+        <a:font script="Khmr" typeface="MoolBoran"/>
+        <a:font script="Knda" typeface="Tunga"/>
+        <a:font script="Guru" typeface="Raavi"/>
+        <a:font script="Cans" typeface="Euphemia"/>
+        <a:font script="Cher" typeface="Plantagenet Cherokee"/>
+        <a:font script="Yiii" typeface="Microsoft Yi Baiti"/>
+        <a:font script="Tibt" typeface="Microsoft Himalaya"/>
+        <a:font script="Thaa" typeface="MV Boli"/>
+        <a:font script="Deva" typeface="Mangal"/>
+        <a:font script="Telu" typeface="Gautami"/>
+        <a:font script="Taml" typeface="Latha"/>
+        <a:font script="Syrc" typeface="Estrangelo Edessa"/>
+        <a:font script="Orya" typeface="Kalinga"/>
+        <a:font script="Mlym" typeface="Kartika"/>
+        <a:font script="Laoo" typeface="DokChampa"/>
+        <a:font script="Sinh" typeface="Iskoola Pota"/>
+        <a:font script="Mong" typeface="Mongolian Baiti"/>
+        <a:font script="Viet" typeface="Times New Roman"/>
+        <a:font script="Uigh" typeface="Microsoft Uighur"/>
+        <a:font script="Geor" typeface="Sylfaen"/>
+        <a:font script="Armn" typeface="Arial"/>
+        <a:font script="Bugi" typeface="Leelawadee UI"/>
+        <a:font script="Bopo" typeface="Microsoft JhengHei"/>
+        <a:font script="Java" typeface="Javanese Text"/>
+        <a:font script="Lisu" typeface="Segoe UI"/>
+        <a:font script="Mymr" typeface="Myanmar Text"/>
+        <a:font script="Nkoo" typeface="Ebrima"/>
+        <a:font script="Olck" typeface="Nirmala UI"/>
+        <a:font script="Osma" typeface="Ebrima"/>
+        <a:font script="Phag" typeface="Phagspa"/>
+        <a:font script="Syrn" typeface="Estrangelo Edessa"/>
+        <a:font script="Syrj" typeface="Estrangelo Edessa"/>
+        <a:font script="Syre" typeface="Estrangelo Edessa"/>
+        <a:font script="Sora" typeface="Nirmala UI"/>
+        <a:font script="Tale" typeface="Microsoft Tai Le"/>
+        <a:font script="Talu" typeface="Microsoft New Tai Lue"/>
+        <a:font script="Tfng" typeface="Ebrima"/>
+      </a:majorFont>
+      <a:minorFont>
+        <a:latin typeface="Calibri" panose="020F0502020204030204"/>
+        <a:ea typeface=""/>
+        <a:cs typeface=""/>
+        <a:font script="Jpan" typeface="游ゴシック"/>
+        <a:font script="Hang" typeface="맑은 고딕"/>
+        <a:font script="Hans" typeface="等线"/>
+        <a:font script="Hant" typeface="新細明體"/>
+        <a:font script="Arab" typeface="Arial"/>
+        <a:font script="Hebr" typeface="Arial"/>
+        <a:font script="Thai" typeface="Cordia New"/>
+        <a:font script="Ethi" typeface="Nyala"/>
+        <a:font script="Beng" typeface="Vrinda"/>
+        <a:font script="Gujr" typeface="Shruti"/>
+        <a:font script="Khmr" typeface="DaunPenh"/>
+        <a:font script="Knda" typeface="Tunga"/>
+        <a:font script="Guru" typeface="Raavi"/>
+        <a:font script="Cans" typeface="Euphemia"/>
+        <a:font script="Cher" typeface="Plantagenet Cherokee"/>
+        <a:font script="Yiii" typeface="Microsoft Yi Baiti"/>
+        <a:font script="Tibt" typeface="Microsoft Himalaya"/>
+        <a:font script="Thaa" typeface="MV Boli"/>
+        <a:font script="Deva" typeface="Mangal"/>
+        <a:font script="Telu" typeface="Gautami"/>
+        <a:font script="Taml" typeface="Latha"/>
+        <a:font script="Syrc" typeface="Estrangelo Edessa"/>
+        <a:font script="Orya" typeface="Kalinga"/>
+        <a:font script="Mlym" typeface="Kartika"/>
+        <a:font script="Laoo" typeface="DokChampa"/>
+        <a:font script="Sinh" typeface="Iskoola Pota"/>
+        <a:font script="Mong" typeface="Mongolian Baiti"/>
+        <a:font script="Viet" typeface="Arial"/>
+        <a:font script="Uigh" typeface="Microsoft Uighur"/>
+        <a:font script="Geor" typeface="Sylfaen"/>
+        <a:font script="Armn" typeface="Arial"/>
+        <a:font script="Bugi" typeface="Leelawadee UI"/>
+        <a:font script="Bopo" typeface="Microsoft JhengHei"/>
+        <a:font script="Java" typeface="Javanese Text"/>
+        <a:font script="Lisu" typeface="Segoe UI"/>
+        <a:font script="Mymr" typeface="Myanmar Text"/>
+        <a:font script="Nkoo" typeface="Ebrima"/>
+        <a:font script="Olck" typeface="Nirmala UI"/>
+        <a:font script="Osma" typeface="Ebrima"/>
+        <a:font script="Phag" typeface="Phagspa"/>
+        <a:font script="Syrn" typeface="Estrangelo Edessa"/>
+        <a:font script="Syrj" typeface="Estrangelo Edessa"/>
+        <a:font script="Syre" typeface="Estrangelo Edessa"/>
+        <a:font script="Sora" typeface="Nirmala UI"/>
+        <a:font script="Tale" typeface="Microsoft Tai Le"/>
+        <a:font script="Talu" typeface="Microsoft New Tai Lue"/>
+        <a:font script="Tfng" typeface="Ebrima"/>
+      </a:minorFont>
+    </a:fontScheme>
+    <a:fmtScheme name="Office">
+      <a:fillStyleLst>
+        <a:solidFill>
+          <a:schemeClr val="phClr"/>
+        </a:solidFill>
+        <a:gradFill rotWithShape="1">
+          <a:gsLst>
+            <a:gs pos="0">
+              <a:schemeClr val="phClr">
+                <a:lumMod val="110000"/>
+                <a:satMod val="105000"/>
+                <a:tint val="67000"/>
+              </a:schemeClr>
+            </a:gs>
+            <a:gs pos="50000">
+              <a:schemeClr val="phClr">
+                <a:lumMod val="105000"/>
+                <a:satMod val="103000"/>
+                <a:tint val="73000"/>
+              </a:schemeClr>
+            </a:gs>
+            <a:gs pos="100000">
+              <a:schemeClr val="phClr">
+                <a:lumMod val="105000"/>
+                <a:satMod val="109000"/>
+                <a:tint val="81000"/>
+              </a:schemeClr>
+            </a:gs>
+          </a:gsLst>
+          <a:lin ang="5400000" scaled="0"/>
+        </a:gradFill>
+        <a:gradFill rotWithShape="1">
+          <a:gsLst>
+            <a:gs pos="0">
+              <a:schemeClr val="phClr">
+                <a:satMod val="103000"/>
+                <a:lumMod val="102000"/>
+                <a:tint val="94000"/>
+              </a:schemeClr>
+            </a:gs>
+            <a:gs pos="50000">
+              <a:schemeClr val="phClr">
+                <a:satMod val="110000"/>
+                <a:lumMod val="100000"/>
+                <a:shade val="100000"/>
+              </a:schemeClr>
+            </a:gs>
+            <a:gs pos="100000">
+              <a:schemeClr val="phClr">
+                <a:lumMod val="99000"/>
+                <a:satMod val="120000"/>
+                <a:shade val="78000"/>
+              </a:schemeClr>
+            </a:gs>
+          </a:gsLst>
+          <a:lin ang="5400000" scaled="0"/>
+        </a:gradFill>
+      </a:fillStyleLst>
+      <a:lnStyleLst>
+        <a:ln w="6350" cap="flat" cmpd="sng" algn="ctr">
+          <a:solidFill>
+            <a:schemeClr val="phClr"/>
+          </a:solidFill>
+          <a:prstDash val="solid"/>
+          <a:miter lim="800000"/>
+        </a:ln>
+        <a:ln w="12700" cap="flat" cmpd="sng" algn="ctr">
+          <a:solidFill>
+            <a:schemeClr val="phClr"/>
+          </a:solidFill>
+          <a:prstDash val="solid"/>
+          <a:miter lim="800000"/>
+        </a:ln>
+        <a:ln w="19050" cap="flat" cmpd="sng" algn="ctr">
+          <a:solidFill>
+            <a:schemeClr val="phClr"/>
+          </a:solidFill>
+          <a:prstDash val="solid"/>
+          <a:miter lim="800000"/>
+        </a:ln>
+      </a:lnStyleLst>
+      <a:effectStyleLst>
+        <a:effectStyle>
+          <a:effectLst/>
+        </a:effectStyle>
+        <a:effectStyle>
+          <a:effectLst/>
+        </a:effectStyle>
+        <a:effectStyle>
+          <a:effectLst>
+            <a:outerShdw blurRad="57150" dist="19050" dir="5400000" algn="ctr" rotWithShape="0">
+              <a:srgbClr val="000000">
+                <a:alpha val="63000"/>
+              </a:srgbClr>
+            </a:outerShdw>
+          </a:effectLst>
+        </a:effectStyle>
+      </a:effectStyleLst>
+      <a:bgFillStyleLst>
+        <a:solidFill>
+          <a:schemeClr val="phClr"/>
+        </a:solidFill>
+        <a:solidFill>
+          <a:schemeClr val="phClr">
+            <a:tint val="95000"/>
+            <a:satMod val="170000"/>
+          </a:schemeClr>
+        </a:solidFill>
+        <a:gradFill rotWithShape="1">
+          <a:gsLst>
+            <a:gs pos="0">
+              <a:schemeClr val="phClr">
+                <a:tint val="93000"/>
+                <a:satMod val="150000"/>
+                <a:shade val="98000"/>
+                <a:lumMod val="102000"/>
+              </a:schemeClr>
+            </a:gs>
+            <a:gs pos="50000">
+              <a:schemeClr val="phClr">
+                <a:tint val="98000"/>
+                <a:satMod val="130000"/>
+                <a:shade val="90000"/>
+                <a:lumMod val="103000"/>
+              </a:schemeClr>
+            </a:gs>
+            <a:gs pos="100000">
+              <a:schemeClr val="phClr">
+                <a:shade val="63000"/>
+                <a:satMod val="120000"/>
+              </a:schemeClr>
+            </a:gs>
+          </a:gsLst>
+          <a:lin ang="5400000" scaled="0"/>
+        </a:gradFill>
+      </a:bgFillStyleLst>
+    </a:fmtScheme>
+  </a:themeElements>
+  <a:objectDefaults/>
+  <a:extraClrSchemeLst/>
+  <a:extLst>
+    <a:ext uri="{05A4C25C-085E-4340-85A3-A5531E510DB2}">
+      <thm15:themeFamily xmlns:thm15="http://schemas.microsoft.com/office/thememl/2012/main" name="Office Theme" id="{62F939B6-93AF-4DB8-9C6B-D6C7DFDC589F}" vid="{4A3C46E8-61CC-4603-A589-7422A47A8E4A}"/>
+    </a:ext>
+  </a:extLst>
+</a:theme>
 </file>
</xml_diff>